<commit_message>
[Github Actions] render website (via 47b25c449e5c8a1d64d658dba67139f1a0797728)
</commit_message>
<xml_diff>
--- a/files/Modul_4_Behandling_af_kategoriske_data.pptx
+++ b/files/Modul_4_Behandling_af_kategoriske_data.pptx
@@ -863,7 +863,7 @@
   <p:cSld>
     <p:spTree>
       <p:nvGrpSpPr>
-        <p:cNvPr id="1" name="Shape 154"/>
+        <p:cNvPr id="1" name="Shape 156"/>
         <p:cNvGrpSpPr/>
         <p:nvPr/>
       </p:nvGrpSpPr>
@@ -877,7 +877,7 @@
       </p:grpSpPr>
       <p:sp>
         <p:nvSpPr>
-          <p:cNvPr id="155" name="Google Shape;155;g1eb726d9c40_0_105:notes"/>
+          <p:cNvPr id="157" name="Google Shape;157;g1eb726d9c40_0_105:notes"/>
           <p:cNvSpPr>
             <a:spLocks noGrp="1" noRot="1" noChangeAspect="1"/>
           </p:cNvSpPr>
@@ -918,7 +918,7 @@
       </p:sp>
       <p:sp>
         <p:nvSpPr>
-          <p:cNvPr id="156" name="Google Shape;156;g1eb726d9c40_0_105:notes"/>
+          <p:cNvPr id="158" name="Google Shape;158;g1eb726d9c40_0_105:notes"/>
           <p:cNvSpPr txBox="1">
             <a:spLocks noGrp="1"/>
           </p:cNvSpPr>
@@ -971,7 +971,7 @@
   <p:cSld>
     <p:spTree>
       <p:nvGrpSpPr>
-        <p:cNvPr id="1" name="Shape 161"/>
+        <p:cNvPr id="1" name="Shape 164"/>
         <p:cNvGrpSpPr/>
         <p:nvPr/>
       </p:nvGrpSpPr>
@@ -985,7 +985,7 @@
       </p:grpSpPr>
       <p:sp>
         <p:nvSpPr>
-          <p:cNvPr id="162" name="Google Shape;162;g1eb726d9c40_0_110:notes"/>
+          <p:cNvPr id="165" name="Google Shape;165;g1eb726d9c40_0_110:notes"/>
           <p:cNvSpPr>
             <a:spLocks noGrp="1" noRot="1" noChangeAspect="1"/>
           </p:cNvSpPr>
@@ -1026,7 +1026,7 @@
       </p:sp>
       <p:sp>
         <p:nvSpPr>
-          <p:cNvPr id="163" name="Google Shape;163;g1eb726d9c40_0_110:notes"/>
+          <p:cNvPr id="166" name="Google Shape;166;g1eb726d9c40_0_110:notes"/>
           <p:cNvSpPr txBox="1">
             <a:spLocks noGrp="1"/>
           </p:cNvSpPr>
@@ -1075,7 +1075,7 @@
   <p:cSld>
     <p:spTree>
       <p:nvGrpSpPr>
-        <p:cNvPr id="1" name="Shape 167"/>
+        <p:cNvPr id="1" name="Shape 170"/>
         <p:cNvGrpSpPr/>
         <p:nvPr/>
       </p:nvGrpSpPr>
@@ -1089,7 +1089,7 @@
       </p:grpSpPr>
       <p:sp>
         <p:nvSpPr>
-          <p:cNvPr id="168" name="Google Shape;168;g1eb726d9c40_0_115:notes"/>
+          <p:cNvPr id="171" name="Google Shape;171;g1eb726d9c40_0_115:notes"/>
           <p:cNvSpPr>
             <a:spLocks noGrp="1" noRot="1" noChangeAspect="1"/>
           </p:cNvSpPr>
@@ -1130,7 +1130,7 @@
       </p:sp>
       <p:sp>
         <p:nvSpPr>
-          <p:cNvPr id="169" name="Google Shape;169;g1eb726d9c40_0_115:notes"/>
+          <p:cNvPr id="172" name="Google Shape;172;g1eb726d9c40_0_115:notes"/>
           <p:cNvSpPr txBox="1">
             <a:spLocks noGrp="1"/>
           </p:cNvSpPr>
@@ -1179,7 +1179,7 @@
   <p:cSld>
     <p:spTree>
       <p:nvGrpSpPr>
-        <p:cNvPr id="1" name="Shape 174"/>
+        <p:cNvPr id="1" name="Shape 177"/>
         <p:cNvGrpSpPr/>
         <p:nvPr/>
       </p:nvGrpSpPr>
@@ -1193,7 +1193,7 @@
       </p:grpSpPr>
       <p:sp>
         <p:nvSpPr>
-          <p:cNvPr id="175" name="Google Shape;175;g1eb726d9c40_0_121:notes"/>
+          <p:cNvPr id="178" name="Google Shape;178;g1eb726d9c40_0_121:notes"/>
           <p:cNvSpPr>
             <a:spLocks noGrp="1" noRot="1" noChangeAspect="1"/>
           </p:cNvSpPr>
@@ -1234,7 +1234,7 @@
       </p:sp>
       <p:sp>
         <p:nvSpPr>
-          <p:cNvPr id="176" name="Google Shape;176;g1eb726d9c40_0_121:notes"/>
+          <p:cNvPr id="179" name="Google Shape;179;g1eb726d9c40_0_121:notes"/>
           <p:cNvSpPr txBox="1">
             <a:spLocks noGrp="1"/>
           </p:cNvSpPr>
@@ -1323,7 +1323,7 @@
   <p:cSld>
     <p:spTree>
       <p:nvGrpSpPr>
-        <p:cNvPr id="1" name="Shape 180"/>
+        <p:cNvPr id="1" name="Shape 184"/>
         <p:cNvGrpSpPr/>
         <p:nvPr/>
       </p:nvGrpSpPr>
@@ -1337,7 +1337,7 @@
       </p:grpSpPr>
       <p:sp>
         <p:nvSpPr>
-          <p:cNvPr id="181" name="Google Shape;181;g1eb726d9c40_0_131:notes"/>
+          <p:cNvPr id="185" name="Google Shape;185;g1eb726d9c40_0_131:notes"/>
           <p:cNvSpPr>
             <a:spLocks noGrp="1" noRot="1" noChangeAspect="1"/>
           </p:cNvSpPr>
@@ -1378,7 +1378,7 @@
       </p:sp>
       <p:sp>
         <p:nvSpPr>
-          <p:cNvPr id="182" name="Google Shape;182;g1eb726d9c40_0_131:notes"/>
+          <p:cNvPr id="186" name="Google Shape;186;g1eb726d9c40_0_131:notes"/>
           <p:cNvSpPr txBox="1">
             <a:spLocks noGrp="1"/>
           </p:cNvSpPr>
@@ -1427,7 +1427,7 @@
   <p:cSld>
     <p:spTree>
       <p:nvGrpSpPr>
-        <p:cNvPr id="1" name="Shape 186"/>
+        <p:cNvPr id="1" name="Shape 190"/>
         <p:cNvGrpSpPr/>
         <p:nvPr/>
       </p:nvGrpSpPr>
@@ -1441,7 +1441,7 @@
       </p:grpSpPr>
       <p:sp>
         <p:nvSpPr>
-          <p:cNvPr id="187" name="Google Shape;187;g1eb726d9c40_0_87:notes"/>
+          <p:cNvPr id="191" name="Google Shape;191;g1eb726d9c40_0_87:notes"/>
           <p:cNvSpPr>
             <a:spLocks noGrp="1" noRot="1" noChangeAspect="1"/>
           </p:cNvSpPr>
@@ -1482,7 +1482,7 @@
       </p:sp>
       <p:sp>
         <p:nvSpPr>
-          <p:cNvPr id="188" name="Google Shape;188;g1eb726d9c40_0_87:notes"/>
+          <p:cNvPr id="192" name="Google Shape;192;g1eb726d9c40_0_87:notes"/>
           <p:cNvSpPr txBox="1">
             <a:spLocks noGrp="1"/>
           </p:cNvSpPr>
@@ -1531,7 +1531,7 @@
   <p:cSld>
     <p:spTree>
       <p:nvGrpSpPr>
-        <p:cNvPr id="1" name="Shape 193"/>
+        <p:cNvPr id="1" name="Shape 197"/>
         <p:cNvGrpSpPr/>
         <p:nvPr/>
       </p:nvGrpSpPr>
@@ -1545,7 +1545,7 @@
       </p:grpSpPr>
       <p:sp>
         <p:nvSpPr>
-          <p:cNvPr id="194" name="Google Shape;194;g29d8b367e19_0_5:notes"/>
+          <p:cNvPr id="198" name="Google Shape;198;g29d8b367e19_0_5:notes"/>
           <p:cNvSpPr>
             <a:spLocks noGrp="1" noRot="1" noChangeAspect="1"/>
           </p:cNvSpPr>
@@ -1586,7 +1586,7 @@
       </p:sp>
       <p:sp>
         <p:nvSpPr>
-          <p:cNvPr id="195" name="Google Shape;195;g29d8b367e19_0_5:notes"/>
+          <p:cNvPr id="199" name="Google Shape;199;g29d8b367e19_0_5:notes"/>
           <p:cNvSpPr txBox="1">
             <a:spLocks noGrp="1"/>
           </p:cNvSpPr>
@@ -1639,7 +1639,7 @@
   <p:cSld>
     <p:spTree>
       <p:nvGrpSpPr>
-        <p:cNvPr id="1" name="Shape 201"/>
+        <p:cNvPr id="1" name="Shape 205"/>
         <p:cNvGrpSpPr/>
         <p:nvPr/>
       </p:nvGrpSpPr>
@@ -1653,7 +1653,7 @@
       </p:grpSpPr>
       <p:sp>
         <p:nvSpPr>
-          <p:cNvPr id="202" name="Google Shape;202;g29de7e9bc02_0_5:notes"/>
+          <p:cNvPr id="206" name="Google Shape;206;g29de7e9bc02_0_5:notes"/>
           <p:cNvSpPr>
             <a:spLocks noGrp="1" noRot="1" noChangeAspect="1"/>
           </p:cNvSpPr>
@@ -1694,7 +1694,7 @@
       </p:sp>
       <p:sp>
         <p:nvSpPr>
-          <p:cNvPr id="203" name="Google Shape;203;g29de7e9bc02_0_5:notes"/>
+          <p:cNvPr id="207" name="Google Shape;207;g29de7e9bc02_0_5:notes"/>
           <p:cNvSpPr txBox="1">
             <a:spLocks noGrp="1"/>
           </p:cNvSpPr>
@@ -1855,7 +1855,7 @@
   <p:cSld>
     <p:spTree>
       <p:nvGrpSpPr>
-        <p:cNvPr id="1" name="Shape 210"/>
+        <p:cNvPr id="1" name="Shape 214"/>
         <p:cNvGrpSpPr/>
         <p:nvPr/>
       </p:nvGrpSpPr>
@@ -1869,7 +1869,7 @@
       </p:grpSpPr>
       <p:sp>
         <p:nvSpPr>
-          <p:cNvPr id="211" name="Google Shape;211;g29de7e9bc02_0_17:notes"/>
+          <p:cNvPr id="215" name="Google Shape;215;g29de7e9bc02_0_17:notes"/>
           <p:cNvSpPr>
             <a:spLocks noGrp="1" noRot="1" noChangeAspect="1"/>
           </p:cNvSpPr>
@@ -1910,7 +1910,7 @@
       </p:sp>
       <p:sp>
         <p:nvSpPr>
-          <p:cNvPr id="212" name="Google Shape;212;g29de7e9bc02_0_17:notes"/>
+          <p:cNvPr id="216" name="Google Shape;216;g29de7e9bc02_0_17:notes"/>
           <p:cNvSpPr txBox="1">
             <a:spLocks noGrp="1"/>
           </p:cNvSpPr>
@@ -1963,7 +1963,7 @@
   <p:cSld>
     <p:spTree>
       <p:nvGrpSpPr>
-        <p:cNvPr id="1" name="Shape 216"/>
+        <p:cNvPr id="1" name="Shape 220"/>
         <p:cNvGrpSpPr/>
         <p:nvPr/>
       </p:nvGrpSpPr>
@@ -1977,7 +1977,7 @@
       </p:grpSpPr>
       <p:sp>
         <p:nvSpPr>
-          <p:cNvPr id="217" name="Google Shape;217;g29e7363d9d1_2_16:notes"/>
+          <p:cNvPr id="221" name="Google Shape;221;g29e7363d9d1_2_16:notes"/>
           <p:cNvSpPr>
             <a:spLocks noGrp="1" noRot="1" noChangeAspect="1"/>
           </p:cNvSpPr>
@@ -2018,7 +2018,7 @@
       </p:sp>
       <p:sp>
         <p:nvSpPr>
-          <p:cNvPr id="218" name="Google Shape;218;g29e7363d9d1_2_16:notes"/>
+          <p:cNvPr id="222" name="Google Shape;222;g29e7363d9d1_2_16:notes"/>
           <p:cNvSpPr txBox="1">
             <a:spLocks noGrp="1"/>
           </p:cNvSpPr>
@@ -2040,594 +2040,6 @@
             <a:noAutofit/>
           </a:bodyPr>
           <a:lstStyle/>
-          <a:p>
-            <a:pPr marL="0" lvl="0" indent="0" algn="l" rtl="0">
-              <a:spcBef>
-                <a:spcPts val="0"/>
-              </a:spcBef>
-              <a:spcAft>
-                <a:spcPts val="0"/>
-              </a:spcAft>
-              <a:buClr>
-                <a:schemeClr val="dk1"/>
-              </a:buClr>
-              <a:buSzPts val="1100"/>
-              <a:buFont typeface="Arial"/>
-              <a:buNone/>
-            </a:pPr>
-            <a:r>
-              <a:rPr lang="en"/>
-              <a:t>library(tidyverse)</a:t>
-            </a:r>
-            <a:endParaRPr/>
-          </a:p>
-          <a:p>
-            <a:pPr marL="0" lvl="0" indent="0" algn="l" rtl="0">
-              <a:spcBef>
-                <a:spcPts val="0"/>
-              </a:spcBef>
-              <a:spcAft>
-                <a:spcPts val="0"/>
-              </a:spcAft>
-              <a:buClr>
-                <a:schemeClr val="dk1"/>
-              </a:buClr>
-              <a:buSzPts val="1100"/>
-              <a:buFont typeface="Arial"/>
-              <a:buNone/>
-            </a:pPr>
-            <a:r>
-              <a:rPr lang="en"/>
-              <a:t>fev &lt;- read_csv("FEV.csv")</a:t>
-            </a:r>
-            <a:endParaRPr/>
-          </a:p>
-          <a:p>
-            <a:pPr marL="0" lvl="0" indent="0" algn="l" rtl="0">
-              <a:spcBef>
-                <a:spcPts val="0"/>
-              </a:spcBef>
-              <a:spcAft>
-                <a:spcPts val="0"/>
-              </a:spcAft>
-              <a:buClr>
-                <a:schemeClr val="dk1"/>
-              </a:buClr>
-              <a:buSzPts val="1100"/>
-              <a:buFont typeface="Arial"/>
-              <a:buNone/>
-            </a:pPr>
-            <a:r>
-              <a:rPr lang="en"/>
-              <a:t>fev2 &lt;- fev</a:t>
-            </a:r>
-            <a:endParaRPr/>
-          </a:p>
-          <a:p>
-            <a:pPr marL="0" lvl="0" indent="0" algn="l" rtl="0">
-              <a:spcBef>
-                <a:spcPts val="0"/>
-              </a:spcBef>
-              <a:spcAft>
-                <a:spcPts val="0"/>
-              </a:spcAft>
-              <a:buClr>
-                <a:schemeClr val="dk1"/>
-              </a:buClr>
-              <a:buSzPts val="1100"/>
-              <a:buFont typeface="Arial"/>
-              <a:buNone/>
-            </a:pPr>
-            <a:r>
-              <a:rPr lang="en"/>
-              <a:t>for (i in 1:length(fev2$Sex)){ </a:t>
-            </a:r>
-            <a:endParaRPr/>
-          </a:p>
-          <a:p>
-            <a:pPr marL="0" lvl="0" indent="0" algn="l" rtl="0">
-              <a:spcBef>
-                <a:spcPts val="0"/>
-              </a:spcBef>
-              <a:spcAft>
-                <a:spcPts val="0"/>
-              </a:spcAft>
-              <a:buClr>
-                <a:schemeClr val="dk1"/>
-              </a:buClr>
-              <a:buSzPts val="1100"/>
-              <a:buFont typeface="Arial"/>
-              <a:buNone/>
-            </a:pPr>
-            <a:r>
-              <a:rPr lang="en"/>
-              <a:t>  fev2$Sex[i] &lt;- if(fev2$Sex[i] == 0){"female"} else {"male"}</a:t>
-            </a:r>
-            <a:endParaRPr/>
-          </a:p>
-          <a:p>
-            <a:pPr marL="0" lvl="0" indent="0" algn="l" rtl="0">
-              <a:spcBef>
-                <a:spcPts val="0"/>
-              </a:spcBef>
-              <a:spcAft>
-                <a:spcPts val="0"/>
-              </a:spcAft>
-              <a:buClr>
-                <a:schemeClr val="dk1"/>
-              </a:buClr>
-              <a:buSzPts val="1100"/>
-              <a:buFont typeface="Arial"/>
-              <a:buNone/>
-            </a:pPr>
-            <a:r>
-              <a:rPr lang="en"/>
-              <a:t>  fev2$Smoke[i] &lt;- if(fev2$Smoke[i] == 0){"non-smoker"} else {"smoker"}</a:t>
-            </a:r>
-            <a:endParaRPr/>
-          </a:p>
-          <a:p>
-            <a:pPr marL="0" lvl="0" indent="0" algn="l" rtl="0">
-              <a:spcBef>
-                <a:spcPts val="0"/>
-              </a:spcBef>
-              <a:spcAft>
-                <a:spcPts val="0"/>
-              </a:spcAft>
-              <a:buClr>
-                <a:schemeClr val="dk1"/>
-              </a:buClr>
-              <a:buSzPts val="1100"/>
-              <a:buFont typeface="Arial"/>
-              <a:buNone/>
-            </a:pPr>
-            <a:r>
-              <a:rPr lang="en"/>
-              <a:t>}</a:t>
-            </a:r>
-            <a:endParaRPr/>
-          </a:p>
-          <a:p>
-            <a:pPr marL="0" lvl="0" indent="0" algn="l" rtl="0">
-              <a:spcBef>
-                <a:spcPts val="0"/>
-              </a:spcBef>
-              <a:spcAft>
-                <a:spcPts val="0"/>
-              </a:spcAft>
-              <a:buClr>
-                <a:schemeClr val="dk1"/>
-              </a:buClr>
-              <a:buSzPts val="1100"/>
-              <a:buFont typeface="Arial"/>
-              <a:buNone/>
-            </a:pPr>
-            <a:r>
-              <a:rPr lang="en"/>
-              <a:t>fev2$Smoke &lt;- as.factor(fev2$Smoke)</a:t>
-            </a:r>
-            <a:endParaRPr/>
-          </a:p>
-          <a:p>
-            <a:pPr marL="0" lvl="0" indent="0" algn="l" rtl="0">
-              <a:spcBef>
-                <a:spcPts val="0"/>
-              </a:spcBef>
-              <a:spcAft>
-                <a:spcPts val="0"/>
-              </a:spcAft>
-              <a:buClr>
-                <a:schemeClr val="dk1"/>
-              </a:buClr>
-              <a:buSzPts val="1100"/>
-              <a:buFont typeface="Arial"/>
-              <a:buNone/>
-            </a:pPr>
-            <a:r>
-              <a:rPr lang="en"/>
-              <a:t>fev2$Sex &lt;- as.factor(fev2$Sex)</a:t>
-            </a:r>
-            <a:endParaRPr/>
-          </a:p>
-          <a:p>
-            <a:pPr marL="0" lvl="0" indent="0" algn="l" rtl="0">
-              <a:spcBef>
-                <a:spcPts val="0"/>
-              </a:spcBef>
-              <a:spcAft>
-                <a:spcPts val="0"/>
-              </a:spcAft>
-              <a:buClr>
-                <a:schemeClr val="dk1"/>
-              </a:buClr>
-              <a:buSzPts val="1100"/>
-              <a:buFont typeface="Arial"/>
-              <a:buNone/>
-            </a:pPr>
-            <a:r>
-              <a:rPr lang="en"/>
-              <a:t>fev3 &lt;- mutate(fev2, Smoke = relevel(Smoke, ref = "smoker"))</a:t>
-            </a:r>
-            <a:endParaRPr/>
-          </a:p>
-          <a:p>
-            <a:pPr marL="0" lvl="0" indent="0" algn="l" rtl="0">
-              <a:spcBef>
-                <a:spcPts val="0"/>
-              </a:spcBef>
-              <a:spcAft>
-                <a:spcPts val="0"/>
-              </a:spcAft>
-              <a:buClr>
-                <a:schemeClr val="dk1"/>
-              </a:buClr>
-              <a:buSzPts val="1100"/>
-              <a:buFont typeface="Arial"/>
-              <a:buNone/>
-            </a:pPr>
-            <a:r>
-              <a:rPr lang="en"/>
-              <a:t>cont_table_fev &lt;- table(fev3[,5:6])</a:t>
-            </a:r>
-            <a:endParaRPr/>
-          </a:p>
-          <a:p>
-            <a:pPr marL="0" lvl="0" indent="0" algn="l" rtl="0">
-              <a:spcBef>
-                <a:spcPts val="0"/>
-              </a:spcBef>
-              <a:spcAft>
-                <a:spcPts val="0"/>
-              </a:spcAft>
-              <a:buClr>
-                <a:schemeClr val="dk1"/>
-              </a:buClr>
-              <a:buSzPts val="1100"/>
-              <a:buFont typeface="Arial"/>
-              <a:buNone/>
-            </a:pPr>
-            <a:r>
-              <a:rPr lang="en"/>
-              <a:t>fisher.test(cont_table_fev)</a:t>
-            </a:r>
-            <a:endParaRPr/>
-          </a:p>
-          <a:p>
-            <a:pPr marL="0" lvl="0" indent="0" algn="l" rtl="0">
-              <a:spcBef>
-                <a:spcPts val="0"/>
-              </a:spcBef>
-              <a:spcAft>
-                <a:spcPts val="0"/>
-              </a:spcAft>
-              <a:buClr>
-                <a:schemeClr val="dk1"/>
-              </a:buClr>
-              <a:buSzPts val="1100"/>
-              <a:buFont typeface="Arial"/>
-              <a:buNone/>
-            </a:pPr>
-            <a:r>
-              <a:rPr lang="en"/>
-              <a:t>chisq.test(cont_table_fev)$expected</a:t>
-            </a:r>
-            <a:endParaRPr/>
-          </a:p>
-          <a:p>
-            <a:pPr marL="0" lvl="0" indent="0" algn="l" rtl="0">
-              <a:spcBef>
-                <a:spcPts val="0"/>
-              </a:spcBef>
-              <a:spcAft>
-                <a:spcPts val="0"/>
-              </a:spcAft>
-              <a:buClr>
-                <a:schemeClr val="dk1"/>
-              </a:buClr>
-              <a:buSzPts val="1100"/>
-              <a:buFont typeface="Arial"/>
-              <a:buNone/>
-            </a:pPr>
-            <a:r>
-              <a:rPr lang="en"/>
-              <a:t>chisq.test(cont_table_fev, correct = F)</a:t>
-            </a:r>
-            <a:endParaRPr/>
-          </a:p>
-          <a:p>
-            <a:pPr marL="0" lvl="0" indent="0" algn="l" rtl="0">
-              <a:spcBef>
-                <a:spcPts val="0"/>
-              </a:spcBef>
-              <a:spcAft>
-                <a:spcPts val="0"/>
-              </a:spcAft>
-              <a:buClr>
-                <a:schemeClr val="dk1"/>
-              </a:buClr>
-              <a:buSzPts val="1100"/>
-              <a:buFont typeface="Arial"/>
-              <a:buNone/>
-            </a:pPr>
-            <a:r>
-              <a:rPr lang="en"/>
-              <a:t>###estradl</a:t>
-            </a:r>
-            <a:endParaRPr/>
-          </a:p>
-          <a:p>
-            <a:pPr marL="0" lvl="0" indent="0" algn="l" rtl="0">
-              <a:spcBef>
-                <a:spcPts val="0"/>
-              </a:spcBef>
-              <a:spcAft>
-                <a:spcPts val="0"/>
-              </a:spcAft>
-              <a:buClr>
-                <a:schemeClr val="dk1"/>
-              </a:buClr>
-              <a:buSzPts val="1100"/>
-              <a:buFont typeface="Arial"/>
-              <a:buNone/>
-            </a:pPr>
-            <a:r>
-              <a:rPr lang="en"/>
-              <a:t>#download.file("https://raw.githubusercontent.com/KUBDatalab/R-PUFF/main/data/ESTRADL.csv", "ESTRADL.csv", mode = "wb")</a:t>
-            </a:r>
-            <a:endParaRPr/>
-          </a:p>
-          <a:p>
-            <a:pPr marL="0" lvl="0" indent="0" algn="l" rtl="0">
-              <a:spcBef>
-                <a:spcPts val="0"/>
-              </a:spcBef>
-              <a:spcAft>
-                <a:spcPts val="0"/>
-              </a:spcAft>
-              <a:buClr>
-                <a:schemeClr val="dk1"/>
-              </a:buClr>
-              <a:buSzPts val="1100"/>
-              <a:buFont typeface="Arial"/>
-              <a:buNone/>
-            </a:pPr>
-            <a:r>
-              <a:rPr lang="en"/>
-              <a:t>estr &lt;- read.csv("ESTRADL.csv")</a:t>
-            </a:r>
-            <a:endParaRPr/>
-          </a:p>
-          <a:p>
-            <a:pPr marL="0" lvl="0" indent="0" algn="l" rtl="0">
-              <a:spcBef>
-                <a:spcPts val="0"/>
-              </a:spcBef>
-              <a:spcAft>
-                <a:spcPts val="0"/>
-              </a:spcAft>
-              <a:buClr>
-                <a:schemeClr val="dk1"/>
-              </a:buClr>
-              <a:buSzPts val="1100"/>
-              <a:buFont typeface="Arial"/>
-              <a:buNone/>
-            </a:pPr>
-            <a:r>
-              <a:rPr lang="en"/>
-              <a:t>estr$Anykids=="'9'"</a:t>
-            </a:r>
-            <a:endParaRPr/>
-          </a:p>
-          <a:p>
-            <a:pPr marL="0" lvl="0" indent="0" algn="l" rtl="0">
-              <a:spcBef>
-                <a:spcPts val="0"/>
-              </a:spcBef>
-              <a:spcAft>
-                <a:spcPts val="0"/>
-              </a:spcAft>
-              <a:buClr>
-                <a:schemeClr val="dk1"/>
-              </a:buClr>
-              <a:buSzPts val="1100"/>
-              <a:buFont typeface="Arial"/>
-              <a:buNone/>
-            </a:pPr>
-            <a:r>
-              <a:rPr lang="en"/>
-              <a:t>estr2 &lt;- estr[gsub("'",'',estr$Anykids)!=9,]</a:t>
-            </a:r>
-            <a:endParaRPr/>
-          </a:p>
-          <a:p>
-            <a:pPr marL="0" lvl="0" indent="0" algn="l" rtl="0">
-              <a:spcBef>
-                <a:spcPts val="0"/>
-              </a:spcBef>
-              <a:spcAft>
-                <a:spcPts val="0"/>
-              </a:spcAft>
-              <a:buClr>
-                <a:schemeClr val="dk1"/>
-              </a:buClr>
-              <a:buSzPts val="1100"/>
-              <a:buFont typeface="Arial"/>
-              <a:buNone/>
-            </a:pPr>
-            <a:r>
-              <a:rPr lang="en"/>
-              <a:t>as.factor(gsub("'",'',estr$Anykids)[gsub("'",'',estr$Anykids)!=9])</a:t>
-            </a:r>
-            <a:endParaRPr/>
-          </a:p>
-          <a:p>
-            <a:pPr marL="0" lvl="0" indent="0" algn="l" rtl="0">
-              <a:spcBef>
-                <a:spcPts val="0"/>
-              </a:spcBef>
-              <a:spcAft>
-                <a:spcPts val="0"/>
-              </a:spcAft>
-              <a:buClr>
-                <a:schemeClr val="dk1"/>
-              </a:buClr>
-              <a:buSzPts val="1100"/>
-              <a:buFont typeface="Arial"/>
-              <a:buNone/>
-            </a:pPr>
-            <a:r>
-              <a:rPr lang="en"/>
-              <a:t>estr2$Anykids &lt;- as.factor(gsub("'",'',estr2$Anykids))</a:t>
-            </a:r>
-            <a:endParaRPr/>
-          </a:p>
-          <a:p>
-            <a:pPr marL="0" lvl="0" indent="0" algn="l" rtl="0">
-              <a:spcBef>
-                <a:spcPts val="0"/>
-              </a:spcBef>
-              <a:spcAft>
-                <a:spcPts val="0"/>
-              </a:spcAft>
-              <a:buClr>
-                <a:schemeClr val="dk1"/>
-              </a:buClr>
-              <a:buSzPts val="1100"/>
-              <a:buFont typeface="Arial"/>
-              <a:buNone/>
-            </a:pPr>
-            <a:r>
-              <a:rPr lang="en"/>
-              <a:t>estr2$Ethnic &lt;- as.factor(gsub("'",'',estr2$Ethnic))</a:t>
-            </a:r>
-            <a:endParaRPr/>
-          </a:p>
-          <a:p>
-            <a:pPr marL="0" lvl="0" indent="0" algn="l" rtl="0">
-              <a:spcBef>
-                <a:spcPts val="0"/>
-              </a:spcBef>
-              <a:spcAft>
-                <a:spcPts val="0"/>
-              </a:spcAft>
-              <a:buClr>
-                <a:schemeClr val="dk1"/>
-              </a:buClr>
-              <a:buSzPts val="1100"/>
-              <a:buFont typeface="Arial"/>
-              <a:buNone/>
-            </a:pPr>
-            <a:r>
-              <a:rPr lang="en"/>
-              <a:t>cont_table_estr &lt;- table(estr2[,c(3,7)])</a:t>
-            </a:r>
-            <a:endParaRPr/>
-          </a:p>
-          <a:p>
-            <a:pPr marL="0" lvl="0" indent="0" algn="l" rtl="0">
-              <a:spcBef>
-                <a:spcPts val="0"/>
-              </a:spcBef>
-              <a:spcAft>
-                <a:spcPts val="0"/>
-              </a:spcAft>
-              <a:buClr>
-                <a:schemeClr val="dk1"/>
-              </a:buClr>
-              <a:buSzPts val="1100"/>
-              <a:buFont typeface="Arial"/>
-              <a:buNone/>
-            </a:pPr>
-            <a:r>
-              <a:rPr lang="en"/>
-              <a:t>addmargins(cont_table_estr)</a:t>
-            </a:r>
-            <a:endParaRPr/>
-          </a:p>
-          <a:p>
-            <a:pPr marL="0" lvl="0" indent="0" algn="l" rtl="0">
-              <a:spcBef>
-                <a:spcPts val="0"/>
-              </a:spcBef>
-              <a:spcAft>
-                <a:spcPts val="0"/>
-              </a:spcAft>
-              <a:buClr>
-                <a:schemeClr val="dk1"/>
-              </a:buClr>
-              <a:buSzPts val="1100"/>
-              <a:buFont typeface="Arial"/>
-              <a:buNone/>
-            </a:pPr>
-            <a:r>
-              <a:rPr lang="en"/>
-              <a:t>fisher.test(cont_table_estr)</a:t>
-            </a:r>
-            <a:endParaRPr/>
-          </a:p>
-          <a:p>
-            <a:pPr marL="0" lvl="0" indent="0" algn="l" rtl="0">
-              <a:spcBef>
-                <a:spcPts val="0"/>
-              </a:spcBef>
-              <a:spcAft>
-                <a:spcPts val="0"/>
-              </a:spcAft>
-              <a:buClr>
-                <a:schemeClr val="dk1"/>
-              </a:buClr>
-              <a:buSzPts val="1100"/>
-              <a:buFont typeface="Arial"/>
-              <a:buNone/>
-            </a:pPr>
-            <a:r>
-              <a:rPr lang="en"/>
-              <a:t>chisq.test(cont_table_estr)$expected</a:t>
-            </a:r>
-            <a:endParaRPr/>
-          </a:p>
-          <a:p>
-            <a:pPr marL="0" lvl="0" indent="0" algn="l" rtl="0">
-              <a:spcBef>
-                <a:spcPts val="0"/>
-              </a:spcBef>
-              <a:spcAft>
-                <a:spcPts val="0"/>
-              </a:spcAft>
-              <a:buClr>
-                <a:schemeClr val="dk1"/>
-              </a:buClr>
-              <a:buSzPts val="1100"/>
-              <a:buFont typeface="Arial"/>
-              <a:buNone/>
-            </a:pPr>
-            <a:r>
-              <a:rPr lang="en"/>
-              <a:t>chisq.test(cont_table_estr, correct = F)</a:t>
-            </a:r>
-            <a:endParaRPr/>
-          </a:p>
-          <a:p>
-            <a:pPr marL="0" lvl="0" indent="0" algn="l" rtl="0">
-              <a:spcBef>
-                <a:spcPts val="0"/>
-              </a:spcBef>
-              <a:spcAft>
-                <a:spcPts val="0"/>
-              </a:spcAft>
-              <a:buClr>
-                <a:schemeClr val="dk1"/>
-              </a:buClr>
-              <a:buSzPts val="1100"/>
-              <a:buFont typeface="Arial"/>
-              <a:buNone/>
-            </a:pPr>
-            <a:r>
-              <a:rPr lang="en"/>
-              <a:t>?chisq.test</a:t>
-            </a:r>
-            <a:endParaRPr/>
-          </a:p>
           <a:p>
             <a:pPr marL="0" lvl="0" indent="0" algn="l" rtl="0">
               <a:spcBef>
@@ -2759,7 +2171,7 @@
   <p:cSld>
     <p:spTree>
       <p:nvGrpSpPr>
-        <p:cNvPr id="1" name="Shape 222"/>
+        <p:cNvPr id="1" name="Shape 226"/>
         <p:cNvGrpSpPr/>
         <p:nvPr/>
       </p:nvGrpSpPr>
@@ -2773,7 +2185,7 @@
       </p:grpSpPr>
       <p:sp>
         <p:nvSpPr>
-          <p:cNvPr id="223" name="Google Shape;223;g29e7363d9d1_2_21:notes"/>
+          <p:cNvPr id="227" name="Google Shape;227;g29e7363d9d1_2_21:notes"/>
           <p:cNvSpPr>
             <a:spLocks noGrp="1" noRot="1" noChangeAspect="1"/>
           </p:cNvSpPr>
@@ -2814,7 +2226,7 @@
       </p:sp>
       <p:sp>
         <p:nvSpPr>
-          <p:cNvPr id="224" name="Google Shape;224;g29e7363d9d1_2_21:notes"/>
+          <p:cNvPr id="228" name="Google Shape;228;g29e7363d9d1_2_21:notes"/>
           <p:cNvSpPr txBox="1">
             <a:spLocks noGrp="1"/>
           </p:cNvSpPr>
@@ -2863,7 +2275,7 @@
   <p:cSld>
     <p:spTree>
       <p:nvGrpSpPr>
-        <p:cNvPr id="1" name="Shape 228"/>
+        <p:cNvPr id="1" name="Shape 232"/>
         <p:cNvGrpSpPr/>
         <p:nvPr/>
       </p:nvGrpSpPr>
@@ -2877,7 +2289,7 @@
       </p:grpSpPr>
       <p:sp>
         <p:nvSpPr>
-          <p:cNvPr id="229" name="Google Shape;229;g29e7363d9d1_2_26:notes"/>
+          <p:cNvPr id="233" name="Google Shape;233;g29e7363d9d1_2_26:notes"/>
           <p:cNvSpPr>
             <a:spLocks noGrp="1" noRot="1" noChangeAspect="1"/>
           </p:cNvSpPr>
@@ -2918,7 +2330,7 @@
       </p:sp>
       <p:sp>
         <p:nvSpPr>
-          <p:cNvPr id="230" name="Google Shape;230;g29e7363d9d1_2_26:notes"/>
+          <p:cNvPr id="234" name="Google Shape;234;g29e7363d9d1_2_26:notes"/>
           <p:cNvSpPr txBox="1">
             <a:spLocks noGrp="1"/>
           </p:cNvSpPr>
@@ -2967,7 +2379,7 @@
   <p:cSld>
     <p:spTree>
       <p:nvGrpSpPr>
-        <p:cNvPr id="1" name="Shape 235"/>
+        <p:cNvPr id="1" name="Shape 239"/>
         <p:cNvGrpSpPr/>
         <p:nvPr/>
       </p:nvGrpSpPr>
@@ -2981,7 +2393,7 @@
       </p:grpSpPr>
       <p:sp>
         <p:nvSpPr>
-          <p:cNvPr id="236" name="Google Shape;236;g29ed3113a62_0_35:notes"/>
+          <p:cNvPr id="240" name="Google Shape;240;g29ed3113a62_0_35:notes"/>
           <p:cNvSpPr>
             <a:spLocks noGrp="1" noRot="1" noChangeAspect="1"/>
           </p:cNvSpPr>
@@ -3022,7 +2434,7 @@
       </p:sp>
       <p:sp>
         <p:nvSpPr>
-          <p:cNvPr id="237" name="Google Shape;237;g29ed3113a62_0_35:notes"/>
+          <p:cNvPr id="241" name="Google Shape;241;g29ed3113a62_0_35:notes"/>
           <p:cNvSpPr txBox="1">
             <a:spLocks noGrp="1"/>
           </p:cNvSpPr>
@@ -3071,7 +2483,7 @@
   <p:cSld>
     <p:spTree>
       <p:nvGrpSpPr>
-        <p:cNvPr id="1" name="Shape 241"/>
+        <p:cNvPr id="1" name="Shape 245"/>
         <p:cNvGrpSpPr/>
         <p:nvPr/>
       </p:nvGrpSpPr>
@@ -3085,7 +2497,7 @@
       </p:grpSpPr>
       <p:sp>
         <p:nvSpPr>
-          <p:cNvPr id="242" name="Google Shape;242;g29de7e9bc02_0_0:notes"/>
+          <p:cNvPr id="246" name="Google Shape;246;g29de7e9bc02_0_0:notes"/>
           <p:cNvSpPr>
             <a:spLocks noGrp="1" noRot="1" noChangeAspect="1"/>
           </p:cNvSpPr>
@@ -3126,7 +2538,7 @@
       </p:sp>
       <p:sp>
         <p:nvSpPr>
-          <p:cNvPr id="243" name="Google Shape;243;g29de7e9bc02_0_0:notes"/>
+          <p:cNvPr id="247" name="Google Shape;247;g29de7e9bc02_0_0:notes"/>
           <p:cNvSpPr txBox="1">
             <a:spLocks noGrp="1"/>
           </p:cNvSpPr>
@@ -3219,7 +2631,7 @@
   <p:cSld>
     <p:spTree>
       <p:nvGrpSpPr>
-        <p:cNvPr id="1" name="Shape 247"/>
+        <p:cNvPr id="1" name="Shape 251"/>
         <p:cNvGrpSpPr/>
         <p:nvPr/>
       </p:nvGrpSpPr>
@@ -3233,7 +2645,7 @@
       </p:grpSpPr>
       <p:sp>
         <p:nvSpPr>
-          <p:cNvPr id="248" name="Google Shape;248;g29ed3113a62_0_6:notes"/>
+          <p:cNvPr id="252" name="Google Shape;252;g29ed3113a62_0_6:notes"/>
           <p:cNvSpPr>
             <a:spLocks noGrp="1" noRot="1" noChangeAspect="1"/>
           </p:cNvSpPr>
@@ -3274,7 +2686,7 @@
       </p:sp>
       <p:sp>
         <p:nvSpPr>
-          <p:cNvPr id="249" name="Google Shape;249;g29ed3113a62_0_6:notes"/>
+          <p:cNvPr id="253" name="Google Shape;253;g29ed3113a62_0_6:notes"/>
           <p:cNvSpPr txBox="1">
             <a:spLocks noGrp="1"/>
           </p:cNvSpPr>
@@ -3323,7 +2735,7 @@
   <p:cSld>
     <p:spTree>
       <p:nvGrpSpPr>
-        <p:cNvPr id="1" name="Shape 255"/>
+        <p:cNvPr id="1" name="Shape 259"/>
         <p:cNvGrpSpPr/>
         <p:nvPr/>
       </p:nvGrpSpPr>
@@ -3337,7 +2749,7 @@
       </p:grpSpPr>
       <p:sp>
         <p:nvSpPr>
-          <p:cNvPr id="256" name="Google Shape;256;g29ed3113a62_0_11:notes"/>
+          <p:cNvPr id="260" name="Google Shape;260;g29ed3113a62_0_11:notes"/>
           <p:cNvSpPr>
             <a:spLocks noGrp="1" noRot="1" noChangeAspect="1"/>
           </p:cNvSpPr>
@@ -3378,7 +2790,7 @@
       </p:sp>
       <p:sp>
         <p:nvSpPr>
-          <p:cNvPr id="257" name="Google Shape;257;g29ed3113a62_0_11:notes"/>
+          <p:cNvPr id="261" name="Google Shape;261;g29ed3113a62_0_11:notes"/>
           <p:cNvSpPr txBox="1">
             <a:spLocks noGrp="1"/>
           </p:cNvSpPr>
@@ -3427,7 +2839,7 @@
   <p:cSld>
     <p:spTree>
       <p:nvGrpSpPr>
-        <p:cNvPr id="1" name="Shape 261"/>
+        <p:cNvPr id="1" name="Shape 265"/>
         <p:cNvGrpSpPr/>
         <p:nvPr/>
       </p:nvGrpSpPr>
@@ -3441,7 +2853,7 @@
       </p:grpSpPr>
       <p:sp>
         <p:nvSpPr>
-          <p:cNvPr id="262" name="Google Shape;262;g29ed3113a62_0_19:notes"/>
+          <p:cNvPr id="266" name="Google Shape;266;g29ed3113a62_0_19:notes"/>
           <p:cNvSpPr>
             <a:spLocks noGrp="1" noRot="1" noChangeAspect="1"/>
           </p:cNvSpPr>
@@ -3482,7 +2894,7 @@
       </p:sp>
       <p:sp>
         <p:nvSpPr>
-          <p:cNvPr id="263" name="Google Shape;263;g29ed3113a62_0_19:notes"/>
+          <p:cNvPr id="267" name="Google Shape;267;g29ed3113a62_0_19:notes"/>
           <p:cNvSpPr txBox="1">
             <a:spLocks noGrp="1"/>
           </p:cNvSpPr>
@@ -3531,7 +2943,7 @@
   <p:cSld>
     <p:spTree>
       <p:nvGrpSpPr>
-        <p:cNvPr id="1" name="Shape 268"/>
+        <p:cNvPr id="1" name="Shape 272"/>
         <p:cNvGrpSpPr/>
         <p:nvPr/>
       </p:nvGrpSpPr>
@@ -3545,7 +2957,7 @@
       </p:grpSpPr>
       <p:sp>
         <p:nvSpPr>
-          <p:cNvPr id="269" name="Google Shape;269;g29ed3113a62_0_25:notes"/>
+          <p:cNvPr id="273" name="Google Shape;273;g29ed3113a62_0_25:notes"/>
           <p:cNvSpPr>
             <a:spLocks noGrp="1" noRot="1" noChangeAspect="1"/>
           </p:cNvSpPr>
@@ -3586,7 +2998,7 @@
       </p:sp>
       <p:sp>
         <p:nvSpPr>
-          <p:cNvPr id="270" name="Google Shape;270;g29ed3113a62_0_25:notes"/>
+          <p:cNvPr id="274" name="Google Shape;274;g29ed3113a62_0_25:notes"/>
           <p:cNvSpPr txBox="1">
             <a:spLocks noGrp="1"/>
           </p:cNvSpPr>
@@ -3635,7 +3047,7 @@
   <p:cSld>
     <p:spTree>
       <p:nvGrpSpPr>
-        <p:cNvPr id="1" name="Shape 274"/>
+        <p:cNvPr id="1" name="Shape 278"/>
         <p:cNvGrpSpPr/>
         <p:nvPr/>
       </p:nvGrpSpPr>
@@ -3649,7 +3061,7 @@
       </p:grpSpPr>
       <p:sp>
         <p:nvSpPr>
-          <p:cNvPr id="275" name="Google Shape;275;g29ed3113a62_0_0:notes"/>
+          <p:cNvPr id="279" name="Google Shape;279;g29ed3113a62_0_0:notes"/>
           <p:cNvSpPr>
             <a:spLocks noGrp="1" noRot="1" noChangeAspect="1"/>
           </p:cNvSpPr>
@@ -3690,7 +3102,7 @@
       </p:sp>
       <p:sp>
         <p:nvSpPr>
-          <p:cNvPr id="276" name="Google Shape;276;g29ed3113a62_0_0:notes"/>
+          <p:cNvPr id="280" name="Google Shape;280;g29ed3113a62_0_0:notes"/>
           <p:cNvSpPr txBox="1">
             <a:spLocks noGrp="1"/>
           </p:cNvSpPr>
@@ -3739,7 +3151,7 @@
   <p:cSld>
     <p:spTree>
       <p:nvGrpSpPr>
-        <p:cNvPr id="1" name="Shape 282"/>
+        <p:cNvPr id="1" name="Shape 286"/>
         <p:cNvGrpSpPr/>
         <p:nvPr/>
       </p:nvGrpSpPr>
@@ -3753,7 +3165,7 @@
       </p:grpSpPr>
       <p:sp>
         <p:nvSpPr>
-          <p:cNvPr id="283" name="Google Shape;283;g29ed3113a62_0_30:notes"/>
+          <p:cNvPr id="287" name="Google Shape;287;g29ed3113a62_0_30:notes"/>
           <p:cNvSpPr>
             <a:spLocks noGrp="1" noRot="1" noChangeAspect="1"/>
           </p:cNvSpPr>
@@ -3794,7 +3206,7 @@
       </p:sp>
       <p:sp>
         <p:nvSpPr>
-          <p:cNvPr id="284" name="Google Shape;284;g29ed3113a62_0_30:notes"/>
+          <p:cNvPr id="288" name="Google Shape;288;g29ed3113a62_0_30:notes"/>
           <p:cNvSpPr txBox="1">
             <a:spLocks noGrp="1"/>
           </p:cNvSpPr>
@@ -3843,7 +3255,7 @@
   <p:cSld>
     <p:spTree>
       <p:nvGrpSpPr>
-        <p:cNvPr id="1" name="Shape 105"/>
+        <p:cNvPr id="1" name="Shape 106"/>
         <p:cNvGrpSpPr/>
         <p:nvPr/>
       </p:nvGrpSpPr>
@@ -3857,7 +3269,7 @@
       </p:grpSpPr>
       <p:sp>
         <p:nvSpPr>
-          <p:cNvPr id="106" name="Google Shape;106;p:notes"/>
+          <p:cNvPr id="107" name="Google Shape;107;p:notes"/>
           <p:cNvSpPr>
             <a:spLocks noGrp="1" noRot="1" noChangeAspect="1"/>
           </p:cNvSpPr>
@@ -3898,7 +3310,7 @@
       </p:sp>
       <p:sp>
         <p:nvSpPr>
-          <p:cNvPr id="107" name="Google Shape;107;p:notes"/>
+          <p:cNvPr id="108" name="Google Shape;108;p:notes"/>
           <p:cNvSpPr txBox="1">
             <a:spLocks noGrp="1"/>
           </p:cNvSpPr>
@@ -3947,7 +3359,7 @@
   <p:cSld>
     <p:spTree>
       <p:nvGrpSpPr>
-        <p:cNvPr id="1" name="Shape 289"/>
+        <p:cNvPr id="1" name="Shape 293"/>
         <p:cNvGrpSpPr/>
         <p:nvPr/>
       </p:nvGrpSpPr>
@@ -3961,7 +3373,7 @@
       </p:grpSpPr>
       <p:sp>
         <p:nvSpPr>
-          <p:cNvPr id="290" name="Google Shape;290;g29ed3113a62_0_40:notes"/>
+          <p:cNvPr id="294" name="Google Shape;294;g29ed3113a62_0_40:notes"/>
           <p:cNvSpPr>
             <a:spLocks noGrp="1" noRot="1" noChangeAspect="1"/>
           </p:cNvSpPr>
@@ -4002,7 +3414,7 @@
       </p:sp>
       <p:sp>
         <p:nvSpPr>
-          <p:cNvPr id="291" name="Google Shape;291;g29ed3113a62_0_40:notes"/>
+          <p:cNvPr id="295" name="Google Shape;295;g29ed3113a62_0_40:notes"/>
           <p:cNvSpPr txBox="1">
             <a:spLocks noGrp="1"/>
           </p:cNvSpPr>
@@ -4051,7 +3463,7 @@
   <p:cSld>
     <p:spTree>
       <p:nvGrpSpPr>
-        <p:cNvPr id="1" name="Shape 295"/>
+        <p:cNvPr id="1" name="Shape 299"/>
         <p:cNvGrpSpPr/>
         <p:nvPr/>
       </p:nvGrpSpPr>
@@ -4065,7 +3477,7 @@
       </p:grpSpPr>
       <p:sp>
         <p:nvSpPr>
-          <p:cNvPr id="296" name="Google Shape;296;g29ed3113a62_0_45:notes"/>
+          <p:cNvPr id="300" name="Google Shape;300;g29ed3113a62_0_45:notes"/>
           <p:cNvSpPr>
             <a:spLocks noGrp="1" noRot="1" noChangeAspect="1"/>
           </p:cNvSpPr>
@@ -4106,7 +3518,7 @@
       </p:sp>
       <p:sp>
         <p:nvSpPr>
-          <p:cNvPr id="297" name="Google Shape;297;g29ed3113a62_0_45:notes"/>
+          <p:cNvPr id="301" name="Google Shape;301;g29ed3113a62_0_45:notes"/>
           <p:cNvSpPr txBox="1">
             <a:spLocks noGrp="1"/>
           </p:cNvSpPr>
@@ -4199,7 +3611,7 @@
   <p:cSld>
     <p:spTree>
       <p:nvGrpSpPr>
-        <p:cNvPr id="1" name="Shape 304"/>
+        <p:cNvPr id="1" name="Shape 308"/>
         <p:cNvGrpSpPr/>
         <p:nvPr/>
       </p:nvGrpSpPr>
@@ -4213,7 +3625,7 @@
       </p:grpSpPr>
       <p:sp>
         <p:nvSpPr>
-          <p:cNvPr id="305" name="Google Shape;305;g29ed3113a62_0_64:notes"/>
+          <p:cNvPr id="309" name="Google Shape;309;g29ed3113a62_0_64:notes"/>
           <p:cNvSpPr>
             <a:spLocks noGrp="1" noRot="1" noChangeAspect="1"/>
           </p:cNvSpPr>
@@ -4254,7 +3666,7 @@
       </p:sp>
       <p:sp>
         <p:nvSpPr>
-          <p:cNvPr id="306" name="Google Shape;306;g29ed3113a62_0_64:notes"/>
+          <p:cNvPr id="310" name="Google Shape;310;g29ed3113a62_0_64:notes"/>
           <p:cNvSpPr txBox="1">
             <a:spLocks noGrp="1"/>
           </p:cNvSpPr>
@@ -4303,7 +3715,7 @@
   <p:cSld>
     <p:spTree>
       <p:nvGrpSpPr>
-        <p:cNvPr id="1" name="Shape 310"/>
+        <p:cNvPr id="1" name="Shape 314"/>
         <p:cNvGrpSpPr/>
         <p:nvPr/>
       </p:nvGrpSpPr>
@@ -4317,7 +3729,7 @@
       </p:grpSpPr>
       <p:sp>
         <p:nvSpPr>
-          <p:cNvPr id="311" name="Google Shape;311;g29ed3113a62_0_69:notes"/>
+          <p:cNvPr id="315" name="Google Shape;315;g29ed3113a62_0_69:notes"/>
           <p:cNvSpPr>
             <a:spLocks noGrp="1" noRot="1" noChangeAspect="1"/>
           </p:cNvSpPr>
@@ -4358,7 +3770,7 @@
       </p:sp>
       <p:sp>
         <p:nvSpPr>
-          <p:cNvPr id="312" name="Google Shape;312;g29ed3113a62_0_69:notes"/>
+          <p:cNvPr id="316" name="Google Shape;316;g29ed3113a62_0_69:notes"/>
           <p:cNvSpPr txBox="1">
             <a:spLocks noGrp="1"/>
           </p:cNvSpPr>
@@ -4455,7 +3867,7 @@
   <p:cSld>
     <p:spTree>
       <p:nvGrpSpPr>
-        <p:cNvPr id="1" name="Shape 319"/>
+        <p:cNvPr id="1" name="Shape 323"/>
         <p:cNvGrpSpPr/>
         <p:nvPr/>
       </p:nvGrpSpPr>
@@ -4469,7 +3881,7 @@
       </p:grpSpPr>
       <p:sp>
         <p:nvSpPr>
-          <p:cNvPr id="320" name="Google Shape;320;g29ed3113a62_0_77:notes"/>
+          <p:cNvPr id="324" name="Google Shape;324;g29ed3113a62_0_77:notes"/>
           <p:cNvSpPr>
             <a:spLocks noGrp="1" noRot="1" noChangeAspect="1"/>
           </p:cNvSpPr>
@@ -4510,7 +3922,7 @@
       </p:sp>
       <p:sp>
         <p:nvSpPr>
-          <p:cNvPr id="321" name="Google Shape;321;g29ed3113a62_0_77:notes"/>
+          <p:cNvPr id="325" name="Google Shape;325;g29ed3113a62_0_77:notes"/>
           <p:cNvSpPr txBox="1">
             <a:spLocks noGrp="1"/>
           </p:cNvSpPr>
@@ -4595,7 +4007,7 @@
   <p:cSld>
     <p:spTree>
       <p:nvGrpSpPr>
-        <p:cNvPr id="1" name="Shape 326"/>
+        <p:cNvPr id="1" name="Shape 330"/>
         <p:cNvGrpSpPr/>
         <p:nvPr/>
       </p:nvGrpSpPr>
@@ -4609,7 +4021,7 @@
       </p:grpSpPr>
       <p:sp>
         <p:nvSpPr>
-          <p:cNvPr id="327" name="Google Shape;327;g29ed3113a62_0_83:notes"/>
+          <p:cNvPr id="331" name="Google Shape;331;g29ed3113a62_0_83:notes"/>
           <p:cNvSpPr>
             <a:spLocks noGrp="1" noRot="1" noChangeAspect="1"/>
           </p:cNvSpPr>
@@ -4650,7 +4062,7 @@
       </p:sp>
       <p:sp>
         <p:nvSpPr>
-          <p:cNvPr id="328" name="Google Shape;328;g29ed3113a62_0_83:notes"/>
+          <p:cNvPr id="332" name="Google Shape;332;g29ed3113a62_0_83:notes"/>
           <p:cNvSpPr txBox="1">
             <a:spLocks noGrp="1"/>
           </p:cNvSpPr>
@@ -4735,7 +4147,7 @@
   <p:cSld>
     <p:spTree>
       <p:nvGrpSpPr>
-        <p:cNvPr id="1" name="Shape 335"/>
+        <p:cNvPr id="1" name="Shape 339"/>
         <p:cNvGrpSpPr/>
         <p:nvPr/>
       </p:nvGrpSpPr>
@@ -4749,7 +4161,7 @@
       </p:grpSpPr>
       <p:sp>
         <p:nvSpPr>
-          <p:cNvPr id="336" name="Google Shape;336;g29ed3113a62_0_91:notes"/>
+          <p:cNvPr id="340" name="Google Shape;340;g29ed3113a62_0_91:notes"/>
           <p:cNvSpPr>
             <a:spLocks noGrp="1" noRot="1" noChangeAspect="1"/>
           </p:cNvSpPr>
@@ -4790,7 +4202,7 @@
       </p:sp>
       <p:sp>
         <p:nvSpPr>
-          <p:cNvPr id="337" name="Google Shape;337;g29ed3113a62_0_91:notes"/>
+          <p:cNvPr id="341" name="Google Shape;341;g29ed3113a62_0_91:notes"/>
           <p:cNvSpPr txBox="1">
             <a:spLocks noGrp="1"/>
           </p:cNvSpPr>
@@ -4946,7 +4358,7 @@
   <p:cSld>
     <p:spTree>
       <p:nvGrpSpPr>
-        <p:cNvPr id="1" name="Shape 341"/>
+        <p:cNvPr id="1" name="Shape 345"/>
         <p:cNvGrpSpPr/>
         <p:nvPr/>
       </p:nvGrpSpPr>
@@ -4960,7 +4372,7 @@
       </p:grpSpPr>
       <p:sp>
         <p:nvSpPr>
-          <p:cNvPr id="342" name="Google Shape;342;g29f1ebe4c89_0_2:notes"/>
+          <p:cNvPr id="346" name="Google Shape;346;g29f1ebe4c89_0_2:notes"/>
           <p:cNvSpPr>
             <a:spLocks noGrp="1" noRot="1" noChangeAspect="1"/>
           </p:cNvSpPr>
@@ -5001,7 +4413,7 @@
       </p:sp>
       <p:sp>
         <p:nvSpPr>
-          <p:cNvPr id="343" name="Google Shape;343;g29f1ebe4c89_0_2:notes"/>
+          <p:cNvPr id="347" name="Google Shape;347;g29f1ebe4c89_0_2:notes"/>
           <p:cNvSpPr txBox="1">
             <a:spLocks noGrp="1"/>
           </p:cNvSpPr>
@@ -5101,7 +4513,7 @@
   <p:cSld>
     <p:spTree>
       <p:nvGrpSpPr>
-        <p:cNvPr id="1" name="Shape 347"/>
+        <p:cNvPr id="1" name="Shape 351"/>
         <p:cNvGrpSpPr/>
         <p:nvPr/>
       </p:nvGrpSpPr>
@@ -5115,7 +4527,7 @@
       </p:grpSpPr>
       <p:sp>
         <p:nvSpPr>
-          <p:cNvPr id="348" name="Google Shape;348;g29f1ebe4c89_0_7:notes"/>
+          <p:cNvPr id="352" name="Google Shape;352;g29f1ebe4c89_0_7:notes"/>
           <p:cNvSpPr>
             <a:spLocks noGrp="1" noRot="1" noChangeAspect="1"/>
           </p:cNvSpPr>
@@ -5156,7 +4568,7 @@
       </p:sp>
       <p:sp>
         <p:nvSpPr>
-          <p:cNvPr id="349" name="Google Shape;349;g29f1ebe4c89_0_7:notes"/>
+          <p:cNvPr id="353" name="Google Shape;353;g29f1ebe4c89_0_7:notes"/>
           <p:cNvSpPr txBox="1">
             <a:spLocks noGrp="1"/>
           </p:cNvSpPr>
@@ -5205,7 +4617,7 @@
   <p:cSld>
     <p:spTree>
       <p:nvGrpSpPr>
-        <p:cNvPr id="1" name="Shape 111"/>
+        <p:cNvPr id="1" name="Shape 112"/>
         <p:cNvGrpSpPr/>
         <p:nvPr/>
       </p:nvGrpSpPr>
@@ -5219,7 +4631,7 @@
       </p:grpSpPr>
       <p:sp>
         <p:nvSpPr>
-          <p:cNvPr id="112" name="Google Shape;112;g29e7363d9d1_0_0:notes"/>
+          <p:cNvPr id="113" name="Google Shape;113;g29e7363d9d1_0_0:notes"/>
           <p:cNvSpPr>
             <a:spLocks noGrp="1" noRot="1" noChangeAspect="1"/>
           </p:cNvSpPr>
@@ -5260,7 +4672,7 @@
       </p:sp>
       <p:sp>
         <p:nvSpPr>
-          <p:cNvPr id="113" name="Google Shape;113;g29e7363d9d1_0_0:notes"/>
+          <p:cNvPr id="114" name="Google Shape;114;g29e7363d9d1_0_0:notes"/>
           <p:cNvSpPr txBox="1">
             <a:spLocks noGrp="1"/>
           </p:cNvSpPr>
@@ -5329,7 +4741,7 @@
   <p:cSld>
     <p:spTree>
       <p:nvGrpSpPr>
-        <p:cNvPr id="1" name="Shape 120"/>
+        <p:cNvPr id="1" name="Shape 121"/>
         <p:cNvGrpSpPr/>
         <p:nvPr/>
       </p:nvGrpSpPr>
@@ -5343,7 +4755,7 @@
       </p:grpSpPr>
       <p:sp>
         <p:nvSpPr>
-          <p:cNvPr id="121" name="Google Shape;121;g1eb726d9c40_0_92:notes"/>
+          <p:cNvPr id="122" name="Google Shape;122;g1eb726d9c40_0_92:notes"/>
           <p:cNvSpPr>
             <a:spLocks noGrp="1" noRot="1" noChangeAspect="1"/>
           </p:cNvSpPr>
@@ -5384,7 +4796,7 @@
       </p:sp>
       <p:sp>
         <p:nvSpPr>
-          <p:cNvPr id="122" name="Google Shape;122;g1eb726d9c40_0_92:notes"/>
+          <p:cNvPr id="123" name="Google Shape;123;g1eb726d9c40_0_92:notes"/>
           <p:cNvSpPr txBox="1">
             <a:spLocks noGrp="1"/>
           </p:cNvSpPr>
@@ -5433,7 +4845,7 @@
   <p:cSld>
     <p:spTree>
       <p:nvGrpSpPr>
-        <p:cNvPr id="1" name="Shape 126"/>
+        <p:cNvPr id="1" name="Shape 127"/>
         <p:cNvGrpSpPr/>
         <p:nvPr/>
       </p:nvGrpSpPr>
@@ -5447,7 +4859,7 @@
       </p:grpSpPr>
       <p:sp>
         <p:nvSpPr>
-          <p:cNvPr id="127" name="Google Shape;127;g29d8b367e19_0_0:notes"/>
+          <p:cNvPr id="128" name="Google Shape;128;g29d8b367e19_0_0:notes"/>
           <p:cNvSpPr>
             <a:spLocks noGrp="1" noRot="1" noChangeAspect="1"/>
           </p:cNvSpPr>
@@ -5488,7 +4900,7 @@
       </p:sp>
       <p:sp>
         <p:nvSpPr>
-          <p:cNvPr id="128" name="Google Shape;128;g29d8b367e19_0_0:notes"/>
+          <p:cNvPr id="129" name="Google Shape;129;g29d8b367e19_0_0:notes"/>
           <p:cNvSpPr txBox="1">
             <a:spLocks noGrp="1"/>
           </p:cNvSpPr>
@@ -5537,7 +4949,7 @@
   <p:cSld>
     <p:spTree>
       <p:nvGrpSpPr>
-        <p:cNvPr id="1" name="Shape 132"/>
+        <p:cNvPr id="1" name="Shape 133"/>
         <p:cNvGrpSpPr/>
         <p:nvPr/>
       </p:nvGrpSpPr>
@@ -5551,7 +4963,7 @@
       </p:grpSpPr>
       <p:sp>
         <p:nvSpPr>
-          <p:cNvPr id="133" name="Google Shape;133;g1eb726d9c40_0_77:notes"/>
+          <p:cNvPr id="134" name="Google Shape;134;g1eb726d9c40_0_77:notes"/>
           <p:cNvSpPr>
             <a:spLocks noGrp="1" noRot="1" noChangeAspect="1"/>
           </p:cNvSpPr>
@@ -5592,7 +5004,7 @@
       </p:sp>
       <p:sp>
         <p:nvSpPr>
-          <p:cNvPr id="134" name="Google Shape;134;g1eb726d9c40_0_77:notes"/>
+          <p:cNvPr id="135" name="Google Shape;135;g1eb726d9c40_0_77:notes"/>
           <p:cNvSpPr txBox="1">
             <a:spLocks noGrp="1"/>
           </p:cNvSpPr>
@@ -5641,7 +5053,7 @@
   <p:cSld>
     <p:spTree>
       <p:nvGrpSpPr>
-        <p:cNvPr id="1" name="Shape 140"/>
+        <p:cNvPr id="1" name="Shape 141"/>
         <p:cNvGrpSpPr/>
         <p:nvPr/>
       </p:nvGrpSpPr>
@@ -5655,7 +5067,7 @@
       </p:grpSpPr>
       <p:sp>
         <p:nvSpPr>
-          <p:cNvPr id="141" name="Google Shape;141;g1eb726d9c40_0_82:notes"/>
+          <p:cNvPr id="142" name="Google Shape;142;g1eb726d9c40_0_82:notes"/>
           <p:cNvSpPr>
             <a:spLocks noGrp="1" noRot="1" noChangeAspect="1"/>
           </p:cNvSpPr>
@@ -5696,7 +5108,7 @@
       </p:sp>
       <p:sp>
         <p:nvSpPr>
-          <p:cNvPr id="142" name="Google Shape;142;g1eb726d9c40_0_82:notes"/>
+          <p:cNvPr id="143" name="Google Shape;143;g1eb726d9c40_0_82:notes"/>
           <p:cNvSpPr txBox="1">
             <a:spLocks noGrp="1"/>
           </p:cNvSpPr>
@@ -5728,6 +5140,10 @@
               </a:spcAft>
               <a:buNone/>
             </a:pPr>
+            <a:r>
+              <a:rPr lang="en"/>
+              <a:t>Der er ikke som sådan et krav om, at sandsynlighederne er ‘vandrette’. Fortolkningen ændrer sig bare. Her udregner vi sandsynligheden for rygestatus for kvinder henholdsvis mænd. Hvis vi gør det lodret, udregner vi sandsynligheden for kønsstatus for ikke-ryger henholdsvis rygere.</a:t>
+            </a:r>
             <a:endParaRPr/>
           </a:p>
         </p:txBody>
@@ -5745,7 +5161,7 @@
   <p:cSld>
     <p:spTree>
       <p:nvGrpSpPr>
-        <p:cNvPr id="1" name="Shape 149"/>
+        <p:cNvPr id="1" name="Shape 151"/>
         <p:cNvGrpSpPr/>
         <p:nvPr/>
       </p:nvGrpSpPr>
@@ -5759,7 +5175,7 @@
       </p:grpSpPr>
       <p:sp>
         <p:nvSpPr>
-          <p:cNvPr id="150" name="Google Shape;150;g1eb726d9c40_0_100:notes"/>
+          <p:cNvPr id="152" name="Google Shape;152;g1eb726d9c40_0_100:notes"/>
           <p:cNvSpPr>
             <a:spLocks noGrp="1" noRot="1" noChangeAspect="1"/>
           </p:cNvSpPr>
@@ -5800,7 +5216,7 @@
       </p:sp>
       <p:sp>
         <p:nvSpPr>
-          <p:cNvPr id="151" name="Google Shape;151;g1eb726d9c40_0_100:notes"/>
+          <p:cNvPr id="153" name="Google Shape;153;g1eb726d9c40_0_100:notes"/>
           <p:cNvSpPr txBox="1">
             <a:spLocks noGrp="1"/>
           </p:cNvSpPr>
@@ -12805,7 +12221,7 @@
   <p:cSld>
     <p:spTree>
       <p:nvGrpSpPr>
-        <p:cNvPr id="1" name="Shape 157"/>
+        <p:cNvPr id="1" name="Shape 159"/>
         <p:cNvGrpSpPr/>
         <p:nvPr/>
       </p:nvGrpSpPr>
@@ -12819,7 +12235,7 @@
       </p:grpSpPr>
       <p:sp>
         <p:nvSpPr>
-          <p:cNvPr id="158" name="Google Shape;158;p22"/>
+          <p:cNvPr id="160" name="Google Shape;160;p22"/>
           <p:cNvSpPr txBox="1">
             <a:spLocks noGrp="1"/>
           </p:cNvSpPr>
@@ -12861,7 +12277,7 @@
       </p:sp>
       <p:sp>
         <p:nvSpPr>
-          <p:cNvPr id="159" name="Google Shape;159;p22"/>
+          <p:cNvPr id="161" name="Google Shape;161;p22"/>
           <p:cNvSpPr txBox="1">
             <a:spLocks noGrp="1"/>
           </p:cNvSpPr>
@@ -12963,7 +12379,7 @@
       </p:sp>
       <p:pic>
         <p:nvPicPr>
-          <p:cNvPr id="160" name="Google Shape;160;p22" descr="{&quot;mathml&quot;:&quot;&lt;math style=\&quot;font-family:stix;font-size:16px;\&quot; xmlns=\&quot;http://www.w3.org/1998/Math/MathML\&quot;&gt;&lt;mstyle mathsize=\&quot;16px\&quot;&gt;&lt;mi&gt;s&lt;/mi&gt;&lt;mi&gt;d&lt;/mi&gt;&lt;mfenced&gt;&lt;mrow&gt;&lt;msub&gt;&lt;mi&gt;&amp;#x3C0;&lt;/mi&gt;&lt;mrow&gt;&lt;mi&gt;m&lt;/mi&gt;&lt;mi&gt;a&lt;/mi&gt;&lt;mi&gt;l&lt;/mi&gt;&lt;mi&gt;e&lt;/mi&gt;&lt;/mrow&gt;&lt;/msub&gt;&lt;mo&gt;-&lt;/mo&gt;&lt;msub&gt;&lt;mi&gt;&amp;#x3C0;&lt;/mi&gt;&lt;mrow&gt;&lt;mi&gt;f&lt;/mi&gt;&lt;mi&gt;e&lt;/mi&gt;&lt;mi&gt;m&lt;/mi&gt;&lt;mi&gt;a&lt;/mi&gt;&lt;mi&gt;l&lt;/mi&gt;&lt;mi&gt;e&lt;/mi&gt;&lt;/mrow&gt;&lt;/msub&gt;&lt;/mrow&gt;&lt;/mfenced&gt;&lt;mo&gt;&amp;#xA0;&lt;/mo&gt;&lt;mo&gt;=&lt;/mo&gt;&lt;mo&gt;&amp;#x2009;&lt;/mo&gt;&lt;msqrt&gt;&lt;msup&gt;&lt;mrow&gt;&lt;mi&gt;s&lt;/mi&gt;&lt;mi&gt;d&lt;/mi&gt;&lt;mfenced&gt;&lt;msub&gt;&lt;mi&gt;&amp;#x3C0;&lt;/mi&gt;&lt;mrow&gt;&lt;mi&gt;m&lt;/mi&gt;&lt;mi&gt;a&lt;/mi&gt;&lt;mi&gt;l&lt;/mi&gt;&lt;mi&gt;e&lt;/mi&gt;&lt;/mrow&gt;&lt;/msub&gt;&lt;/mfenced&gt;&lt;/mrow&gt;&lt;mn&gt;2&lt;/mn&gt;&lt;/msup&gt;&lt;mo&gt;+&lt;/mo&gt;&lt;msup&gt;&lt;mrow&gt;&lt;mi&gt;s&lt;/mi&gt;&lt;mi&gt;d&lt;/mi&gt;&lt;mfenced&gt;&lt;msub&gt;&lt;mi&gt;&amp;#x3C0;&lt;/mi&gt;&lt;mrow&gt;&lt;mi&gt;f&lt;/mi&gt;&lt;mi&gt;e&lt;/mi&gt;&lt;mi&gt;m&lt;/mi&gt;&lt;mi&gt;a&lt;/mi&gt;&lt;mi&gt;l&lt;/mi&gt;&lt;mi&gt;e&lt;/mi&gt;&lt;/mrow&gt;&lt;/msub&gt;&lt;/mfenced&gt;&lt;/mrow&gt;&lt;mn&gt;2&lt;/mn&gt;&lt;/msup&gt;&lt;/msqrt&gt;&lt;mo&gt;&amp;#xA0;&lt;/mo&gt;&lt;mo&gt;=&lt;/mo&gt;&lt;mo&gt;&amp;#xA0;&lt;/mo&gt;&lt;mn&gt;0&lt;/mn&gt;&lt;mo&gt;.&lt;/mo&gt;&lt;mn&gt;0235&lt;/mn&gt;&lt;/mstyle&gt;&lt;/math&gt;&quot;,&quot;truncated&quot;:false}" title="s d open parentheses pi subscript m a l e end subscript minus pi subscript f e m a l e end subscript close parentheses space equals thin space square root of s d open parentheses pi subscript m a l e end subscript close parentheses squared plus s d open parentheses pi subscript f e m a l e end subscript close parentheses squared end root space equals space 0.0235"/>
+          <p:cNvPr id="162" name="Google Shape;162;p22" descr="{&quot;mathml&quot;:&quot;&lt;math style=\&quot;font-family:stix;font-size:16px;\&quot; xmlns=\&quot;http://www.w3.org/1998/Math/MathML\&quot;&gt;&lt;mstyle mathsize=\&quot;16px\&quot;&gt;&lt;mi&gt;s&lt;/mi&gt;&lt;mi&gt;d&lt;/mi&gt;&lt;mfenced&gt;&lt;mrow&gt;&lt;msub&gt;&lt;mi&gt;&amp;#x3C0;&lt;/mi&gt;&lt;mrow&gt;&lt;mi&gt;m&lt;/mi&gt;&lt;mi&gt;a&lt;/mi&gt;&lt;mi&gt;l&lt;/mi&gt;&lt;mi&gt;e&lt;/mi&gt;&lt;/mrow&gt;&lt;/msub&gt;&lt;mo&gt;-&lt;/mo&gt;&lt;msub&gt;&lt;mi&gt;&amp;#x3C0;&lt;/mi&gt;&lt;mrow&gt;&lt;mi&gt;f&lt;/mi&gt;&lt;mi&gt;e&lt;/mi&gt;&lt;mi&gt;m&lt;/mi&gt;&lt;mi&gt;a&lt;/mi&gt;&lt;mi&gt;l&lt;/mi&gt;&lt;mi&gt;e&lt;/mi&gt;&lt;/mrow&gt;&lt;/msub&gt;&lt;/mrow&gt;&lt;/mfenced&gt;&lt;mo&gt;&amp;#xA0;&lt;/mo&gt;&lt;mo&gt;=&lt;/mo&gt;&lt;mo&gt;&amp;#x2009;&lt;/mo&gt;&lt;msqrt&gt;&lt;msup&gt;&lt;mrow&gt;&lt;mi&gt;s&lt;/mi&gt;&lt;mi&gt;d&lt;/mi&gt;&lt;mfenced&gt;&lt;msub&gt;&lt;mi&gt;&amp;#x3C0;&lt;/mi&gt;&lt;mrow&gt;&lt;mi&gt;m&lt;/mi&gt;&lt;mi&gt;a&lt;/mi&gt;&lt;mi&gt;l&lt;/mi&gt;&lt;mi&gt;e&lt;/mi&gt;&lt;/mrow&gt;&lt;/msub&gt;&lt;/mfenced&gt;&lt;/mrow&gt;&lt;mn&gt;2&lt;/mn&gt;&lt;/msup&gt;&lt;mo&gt;+&lt;/mo&gt;&lt;msup&gt;&lt;mrow&gt;&lt;mi&gt;s&lt;/mi&gt;&lt;mi&gt;d&lt;/mi&gt;&lt;mfenced&gt;&lt;msub&gt;&lt;mi&gt;&amp;#x3C0;&lt;/mi&gt;&lt;mrow&gt;&lt;mi&gt;f&lt;/mi&gt;&lt;mi&gt;e&lt;/mi&gt;&lt;mi&gt;m&lt;/mi&gt;&lt;mi&gt;a&lt;/mi&gt;&lt;mi&gt;l&lt;/mi&gt;&lt;mi&gt;e&lt;/mi&gt;&lt;/mrow&gt;&lt;/msub&gt;&lt;/mfenced&gt;&lt;/mrow&gt;&lt;mn&gt;2&lt;/mn&gt;&lt;/msup&gt;&lt;/msqrt&gt;&lt;mo&gt;&amp;#xA0;&lt;/mo&gt;&lt;mo&gt;=&lt;/mo&gt;&lt;mo&gt;&amp;#xA0;&lt;/mo&gt;&lt;mn&gt;0&lt;/mn&gt;&lt;mo&gt;.&lt;/mo&gt;&lt;mn&gt;0235&lt;/mn&gt;&lt;/mstyle&gt;&lt;/math&gt;&quot;,&quot;truncated&quot;:false}" title="s d open parentheses pi subscript m a l e end subscript minus pi subscript f e m a l e end subscript close parentheses space equals thin space square root of s d open parentheses pi subscript m a l e end subscript close parentheses squared plus s d open parentheses pi subscript f e m a l e end subscript close parentheses squared end root space equals space 0.0235"/>
           <p:cNvPicPr preferRelativeResize="0"/>
           <p:nvPr/>
         </p:nvPicPr>
@@ -12989,11 +12405,359 @@
           </a:ln>
         </p:spPr>
       </p:pic>
+      <p:pic>
+        <p:nvPicPr>
+          <p:cNvPr id="163" name="Google Shape;163;p22"/>
+          <p:cNvPicPr preferRelativeResize="0"/>
+          <p:nvPr/>
+        </p:nvPicPr>
+        <p:blipFill>
+          <a:blip r:embed="rId4">
+            <a:alphaModFix/>
+          </a:blip>
+          <a:stretch>
+            <a:fillRect/>
+          </a:stretch>
+        </p:blipFill>
+        <p:spPr>
+          <a:xfrm>
+            <a:off x="6492950" y="1139475"/>
+            <a:ext cx="2324100" cy="714375"/>
+          </a:xfrm>
+          <a:prstGeom prst="rect">
+            <a:avLst/>
+          </a:prstGeom>
+          <a:noFill/>
+          <a:ln>
+            <a:noFill/>
+          </a:ln>
+        </p:spPr>
+      </p:pic>
     </p:spTree>
   </p:cSld>
   <p:clrMapOvr>
     <a:masterClrMapping/>
   </p:clrMapOvr>
+  <p:timing>
+    <p:tnLst>
+      <p:par>
+        <p:cTn id="1" dur="indefinite" restart="never" nodeType="tmRoot">
+          <p:childTnLst>
+            <p:seq concurrent="1" nextAc="seek">
+              <p:cTn id="2" dur="indefinite" nodeType="mainSeq">
+                <p:childTnLst>
+                  <p:par>
+                    <p:cTn id="3" fill="hold">
+                      <p:stCondLst>
+                        <p:cond delay="indefinite"/>
+                      </p:stCondLst>
+                      <p:childTnLst>
+                        <p:par>
+                          <p:cTn id="4" fill="hold">
+                            <p:stCondLst>
+                              <p:cond delay="0"/>
+                            </p:stCondLst>
+                            <p:childTnLst>
+                              <p:par>
+                                <p:cTn id="5" presetID="1" presetClass="entr" presetSubtype="0" fill="hold" nodeType="clickEffect">
+                                  <p:stCondLst>
+                                    <p:cond delay="0"/>
+                                  </p:stCondLst>
+                                  <p:childTnLst>
+                                    <p:set>
+                                      <p:cBhvr>
+                                        <p:cTn id="6" dur="1" fill="hold">
+                                          <p:stCondLst>
+                                            <p:cond delay="0"/>
+                                          </p:stCondLst>
+                                        </p:cTn>
+                                        <p:tgtEl>
+                                          <p:spTgt spid="161">
+                                            <p:txEl>
+                                              <p:pRg st="0" end="0"/>
+                                            </p:txEl>
+                                          </p:spTgt>
+                                        </p:tgtEl>
+                                        <p:attrNameLst>
+                                          <p:attrName>style.visibility</p:attrName>
+                                        </p:attrNameLst>
+                                      </p:cBhvr>
+                                      <p:to>
+                                        <p:strVal val="visible"/>
+                                      </p:to>
+                                    </p:set>
+                                  </p:childTnLst>
+                                </p:cTn>
+                              </p:par>
+                            </p:childTnLst>
+                          </p:cTn>
+                        </p:par>
+                      </p:childTnLst>
+                    </p:cTn>
+                  </p:par>
+                  <p:par>
+                    <p:cTn id="7" fill="hold">
+                      <p:stCondLst>
+                        <p:cond delay="indefinite"/>
+                      </p:stCondLst>
+                      <p:childTnLst>
+                        <p:par>
+                          <p:cTn id="8" fill="hold">
+                            <p:stCondLst>
+                              <p:cond delay="0"/>
+                            </p:stCondLst>
+                            <p:childTnLst>
+                              <p:par>
+                                <p:cTn id="9" presetID="1" presetClass="entr" presetSubtype="0" fill="hold" nodeType="clickEffect">
+                                  <p:stCondLst>
+                                    <p:cond delay="0"/>
+                                  </p:stCondLst>
+                                  <p:childTnLst>
+                                    <p:set>
+                                      <p:cBhvr>
+                                        <p:cTn id="10" dur="1" fill="hold">
+                                          <p:stCondLst>
+                                            <p:cond delay="0"/>
+                                          </p:stCondLst>
+                                        </p:cTn>
+                                        <p:tgtEl>
+                                          <p:spTgt spid="161">
+                                            <p:txEl>
+                                              <p:pRg st="1" end="1"/>
+                                            </p:txEl>
+                                          </p:spTgt>
+                                        </p:tgtEl>
+                                        <p:attrNameLst>
+                                          <p:attrName>style.visibility</p:attrName>
+                                        </p:attrNameLst>
+                                      </p:cBhvr>
+                                      <p:to>
+                                        <p:strVal val="visible"/>
+                                      </p:to>
+                                    </p:set>
+                                  </p:childTnLst>
+                                </p:cTn>
+                              </p:par>
+                            </p:childTnLst>
+                          </p:cTn>
+                        </p:par>
+                      </p:childTnLst>
+                    </p:cTn>
+                  </p:par>
+                  <p:par>
+                    <p:cTn id="11" fill="hold">
+                      <p:stCondLst>
+                        <p:cond delay="indefinite"/>
+                      </p:stCondLst>
+                      <p:childTnLst>
+                        <p:par>
+                          <p:cTn id="12" fill="hold">
+                            <p:stCondLst>
+                              <p:cond delay="0"/>
+                            </p:stCondLst>
+                            <p:childTnLst>
+                              <p:par>
+                                <p:cTn id="13" presetID="1" presetClass="entr" presetSubtype="0" fill="hold" nodeType="clickEffect">
+                                  <p:stCondLst>
+                                    <p:cond delay="0"/>
+                                  </p:stCondLst>
+                                  <p:childTnLst>
+                                    <p:set>
+                                      <p:cBhvr>
+                                        <p:cTn id="14" dur="1" fill="hold">
+                                          <p:stCondLst>
+                                            <p:cond delay="0"/>
+                                          </p:stCondLst>
+                                        </p:cTn>
+                                        <p:tgtEl>
+                                          <p:spTgt spid="161">
+                                            <p:txEl>
+                                              <p:pRg st="2" end="2"/>
+                                            </p:txEl>
+                                          </p:spTgt>
+                                        </p:tgtEl>
+                                        <p:attrNameLst>
+                                          <p:attrName>style.visibility</p:attrName>
+                                        </p:attrNameLst>
+                                      </p:cBhvr>
+                                      <p:to>
+                                        <p:strVal val="visible"/>
+                                      </p:to>
+                                    </p:set>
+                                  </p:childTnLst>
+                                </p:cTn>
+                              </p:par>
+                            </p:childTnLst>
+                          </p:cTn>
+                        </p:par>
+                      </p:childTnLst>
+                    </p:cTn>
+                  </p:par>
+                  <p:par>
+                    <p:cTn id="15" fill="hold">
+                      <p:stCondLst>
+                        <p:cond delay="indefinite"/>
+                      </p:stCondLst>
+                      <p:childTnLst>
+                        <p:par>
+                          <p:cTn id="16" fill="hold">
+                            <p:stCondLst>
+                              <p:cond delay="0"/>
+                            </p:stCondLst>
+                            <p:childTnLst>
+                              <p:par>
+                                <p:cTn id="17" presetID="1" presetClass="entr" presetSubtype="0" fill="hold" nodeType="clickEffect">
+                                  <p:stCondLst>
+                                    <p:cond delay="0"/>
+                                  </p:stCondLst>
+                                  <p:childTnLst>
+                                    <p:set>
+                                      <p:cBhvr>
+                                        <p:cTn id="18" dur="1" fill="hold">
+                                          <p:stCondLst>
+                                            <p:cond delay="0"/>
+                                          </p:stCondLst>
+                                        </p:cTn>
+                                        <p:tgtEl>
+                                          <p:spTgt spid="161">
+                                            <p:txEl>
+                                              <p:pRg st="3" end="3"/>
+                                            </p:txEl>
+                                          </p:spTgt>
+                                        </p:tgtEl>
+                                        <p:attrNameLst>
+                                          <p:attrName>style.visibility</p:attrName>
+                                        </p:attrNameLst>
+                                      </p:cBhvr>
+                                      <p:to>
+                                        <p:strVal val="visible"/>
+                                      </p:to>
+                                    </p:set>
+                                  </p:childTnLst>
+                                </p:cTn>
+                              </p:par>
+                            </p:childTnLst>
+                          </p:cTn>
+                        </p:par>
+                      </p:childTnLst>
+                    </p:cTn>
+                  </p:par>
+                  <p:par>
+                    <p:cTn id="19" fill="hold">
+                      <p:stCondLst>
+                        <p:cond delay="indefinite"/>
+                      </p:stCondLst>
+                      <p:childTnLst>
+                        <p:par>
+                          <p:cTn id="20" fill="hold">
+                            <p:stCondLst>
+                              <p:cond delay="0"/>
+                            </p:stCondLst>
+                            <p:childTnLst>
+                              <p:par>
+                                <p:cTn id="21" presetID="1" presetClass="entr" presetSubtype="0" fill="hold" nodeType="clickEffect">
+                                  <p:stCondLst>
+                                    <p:cond delay="0"/>
+                                  </p:stCondLst>
+                                  <p:childTnLst>
+                                    <p:set>
+                                      <p:cBhvr>
+                                        <p:cTn id="22" dur="1" fill="hold">
+                                          <p:stCondLst>
+                                            <p:cond delay="0"/>
+                                          </p:stCondLst>
+                                        </p:cTn>
+                                        <p:tgtEl>
+                                          <p:spTgt spid="161">
+                                            <p:txEl>
+                                              <p:pRg st="4" end="4"/>
+                                            </p:txEl>
+                                          </p:spTgt>
+                                        </p:tgtEl>
+                                        <p:attrNameLst>
+                                          <p:attrName>style.visibility</p:attrName>
+                                        </p:attrNameLst>
+                                      </p:cBhvr>
+                                      <p:to>
+                                        <p:strVal val="visible"/>
+                                      </p:to>
+                                    </p:set>
+                                  </p:childTnLst>
+                                </p:cTn>
+                              </p:par>
+                            </p:childTnLst>
+                          </p:cTn>
+                        </p:par>
+                      </p:childTnLst>
+                    </p:cTn>
+                  </p:par>
+                  <p:par>
+                    <p:cTn id="23" fill="hold">
+                      <p:stCondLst>
+                        <p:cond delay="indefinite"/>
+                      </p:stCondLst>
+                      <p:childTnLst>
+                        <p:par>
+                          <p:cTn id="24" fill="hold">
+                            <p:stCondLst>
+                              <p:cond delay="0"/>
+                            </p:stCondLst>
+                            <p:childTnLst>
+                              <p:par>
+                                <p:cTn id="25" presetID="1" presetClass="entr" presetSubtype="0" fill="hold" nodeType="clickEffect">
+                                  <p:stCondLst>
+                                    <p:cond delay="0"/>
+                                  </p:stCondLst>
+                                  <p:childTnLst>
+                                    <p:set>
+                                      <p:cBhvr>
+                                        <p:cTn id="26" dur="1" fill="hold">
+                                          <p:stCondLst>
+                                            <p:cond delay="0"/>
+                                          </p:stCondLst>
+                                        </p:cTn>
+                                        <p:tgtEl>
+                                          <p:spTgt spid="162"/>
+                                        </p:tgtEl>
+                                        <p:attrNameLst>
+                                          <p:attrName>style.visibility</p:attrName>
+                                        </p:attrNameLst>
+                                      </p:cBhvr>
+                                      <p:to>
+                                        <p:strVal val="visible"/>
+                                      </p:to>
+                                    </p:set>
+                                  </p:childTnLst>
+                                </p:cTn>
+                              </p:par>
+                            </p:childTnLst>
+                          </p:cTn>
+                        </p:par>
+                      </p:childTnLst>
+                    </p:cTn>
+                  </p:par>
+                </p:childTnLst>
+              </p:cTn>
+              <p:prevCondLst>
+                <p:cond evt="onPrev" delay="0">
+                  <p:tgtEl>
+                    <p:sldTgt/>
+                  </p:tgtEl>
+                </p:cond>
+              </p:prevCondLst>
+              <p:nextCondLst>
+                <p:cond evt="onNext" delay="0">
+                  <p:tgtEl>
+                    <p:sldTgt/>
+                  </p:tgtEl>
+                </p:cond>
+              </p:nextCondLst>
+            </p:seq>
+          </p:childTnLst>
+        </p:cTn>
+      </p:par>
+    </p:tnLst>
+  </p:timing>
 </p:sld>
 </file>
 
@@ -13002,7 +12766,7 @@
   <p:cSld>
     <p:spTree>
       <p:nvGrpSpPr>
-        <p:cNvPr id="1" name="Shape 164"/>
+        <p:cNvPr id="1" name="Shape 167"/>
         <p:cNvGrpSpPr/>
         <p:nvPr/>
       </p:nvGrpSpPr>
@@ -13016,7 +12780,7 @@
       </p:grpSpPr>
       <p:sp>
         <p:nvSpPr>
-          <p:cNvPr id="165" name="Google Shape;165;p23"/>
+          <p:cNvPr id="168" name="Google Shape;168;p23"/>
           <p:cNvSpPr txBox="1">
             <a:spLocks noGrp="1"/>
           </p:cNvSpPr>
@@ -13058,7 +12822,7 @@
       </p:sp>
       <p:sp>
         <p:nvSpPr>
-          <p:cNvPr id="166" name="Google Shape;166;p23"/>
+          <p:cNvPr id="169" name="Google Shape;169;p23"/>
           <p:cNvSpPr txBox="1">
             <a:spLocks noGrp="1"/>
           </p:cNvSpPr>
@@ -13143,7 +12907,7 @@
   <p:cSld>
     <p:spTree>
       <p:nvGrpSpPr>
-        <p:cNvPr id="1" name="Shape 170"/>
+        <p:cNvPr id="1" name="Shape 173"/>
         <p:cNvGrpSpPr/>
         <p:nvPr/>
       </p:nvGrpSpPr>
@@ -13157,7 +12921,7 @@
       </p:grpSpPr>
       <p:sp>
         <p:nvSpPr>
-          <p:cNvPr id="171" name="Google Shape;171;p24"/>
+          <p:cNvPr id="174" name="Google Shape;174;p24"/>
           <p:cNvSpPr txBox="1">
             <a:spLocks noGrp="1"/>
           </p:cNvSpPr>
@@ -13199,7 +12963,7 @@
       </p:sp>
       <p:sp>
         <p:nvSpPr>
-          <p:cNvPr id="172" name="Google Shape;172;p24"/>
+          <p:cNvPr id="175" name="Google Shape;175;p24"/>
           <p:cNvSpPr txBox="1">
             <a:spLocks noGrp="1"/>
           </p:cNvSpPr>
@@ -13325,7 +13089,7 @@
       </p:sp>
       <p:pic>
         <p:nvPicPr>
-          <p:cNvPr id="173" name="Google Shape;173;p24"/>
+          <p:cNvPr id="176" name="Google Shape;176;p24"/>
           <p:cNvPicPr preferRelativeResize="0"/>
           <p:nvPr/>
         </p:nvPicPr>
@@ -13390,7 +13154,7 @@
                                           </p:stCondLst>
                                         </p:cTn>
                                         <p:tgtEl>
-                                          <p:spTgt spid="172">
+                                          <p:spTgt spid="175">
                                             <p:txEl>
                                               <p:pRg st="0" end="0"/>
                                             </p:txEl>
@@ -13439,7 +13203,7 @@
                                           </p:stCondLst>
                                         </p:cTn>
                                         <p:tgtEl>
-                                          <p:spTgt spid="172">
+                                          <p:spTgt spid="175">
                                             <p:txEl>
                                               <p:pRg st="1" end="1"/>
                                             </p:txEl>
@@ -13488,7 +13252,7 @@
                                           </p:stCondLst>
                                         </p:cTn>
                                         <p:tgtEl>
-                                          <p:spTgt spid="172">
+                                          <p:spTgt spid="175">
                                             <p:txEl>
                                               <p:pRg st="2" end="2"/>
                                             </p:txEl>
@@ -13537,7 +13301,7 @@
                                           </p:stCondLst>
                                         </p:cTn>
                                         <p:tgtEl>
-                                          <p:spTgt spid="172">
+                                          <p:spTgt spid="175">
                                             <p:txEl>
                                               <p:pRg st="3" end="3"/>
                                             </p:txEl>
@@ -13586,7 +13350,7 @@
                                           </p:stCondLst>
                                         </p:cTn>
                                         <p:tgtEl>
-                                          <p:spTgt spid="172">
+                                          <p:spTgt spid="175">
                                             <p:txEl>
                                               <p:pRg st="4" end="4"/>
                                             </p:txEl>
@@ -13635,7 +13399,7 @@
                                           </p:stCondLst>
                                         </p:cTn>
                                         <p:tgtEl>
-                                          <p:spTgt spid="172">
+                                          <p:spTgt spid="175">
                                             <p:txEl>
                                               <p:pRg st="5" end="5"/>
                                             </p:txEl>
@@ -13684,7 +13448,7 @@
                                           </p:stCondLst>
                                         </p:cTn>
                                         <p:tgtEl>
-                                          <p:spTgt spid="172">
+                                          <p:spTgt spid="175">
                                             <p:txEl>
                                               <p:pRg st="6" end="6"/>
                                             </p:txEl>
@@ -13737,7 +13501,7 @@
   <p:cSld>
     <p:spTree>
       <p:nvGrpSpPr>
-        <p:cNvPr id="1" name="Shape 177"/>
+        <p:cNvPr id="1" name="Shape 180"/>
         <p:cNvGrpSpPr/>
         <p:nvPr/>
       </p:nvGrpSpPr>
@@ -13751,7 +13515,7 @@
       </p:grpSpPr>
       <p:sp>
         <p:nvSpPr>
-          <p:cNvPr id="178" name="Google Shape;178;p25"/>
+          <p:cNvPr id="181" name="Google Shape;181;p25"/>
           <p:cNvSpPr txBox="1">
             <a:spLocks noGrp="1"/>
           </p:cNvSpPr>
@@ -13793,7 +13557,7 @@
       </p:sp>
       <p:sp>
         <p:nvSpPr>
-          <p:cNvPr id="179" name="Google Shape;179;p25"/>
+          <p:cNvPr id="182" name="Google Shape;182;p25"/>
           <p:cNvSpPr txBox="1">
             <a:spLocks noGrp="1"/>
           </p:cNvSpPr>
@@ -13881,6 +13645,34 @@
           </a:p>
         </p:txBody>
       </p:sp>
+      <p:pic>
+        <p:nvPicPr>
+          <p:cNvPr id="183" name="Google Shape;183;p25"/>
+          <p:cNvPicPr preferRelativeResize="0"/>
+          <p:nvPr/>
+        </p:nvPicPr>
+        <p:blipFill>
+          <a:blip r:embed="rId3">
+            <a:alphaModFix/>
+          </a:blip>
+          <a:stretch>
+            <a:fillRect/>
+          </a:stretch>
+        </p:blipFill>
+        <p:spPr>
+          <a:xfrm>
+            <a:off x="6562475" y="1229063"/>
+            <a:ext cx="2324100" cy="714375"/>
+          </a:xfrm>
+          <a:prstGeom prst="rect">
+            <a:avLst/>
+          </a:prstGeom>
+          <a:noFill/>
+          <a:ln>
+            <a:noFill/>
+          </a:ln>
+        </p:spPr>
+      </p:pic>
     </p:spTree>
   </p:cSld>
   <p:clrMapOvr>
@@ -13920,7 +13712,7 @@
                                           </p:stCondLst>
                                         </p:cTn>
                                         <p:tgtEl>
-                                          <p:spTgt spid="179">
+                                          <p:spTgt spid="182">
                                             <p:txEl>
                                               <p:pRg st="0" end="0"/>
                                             </p:txEl>
@@ -13969,7 +13761,7 @@
                                           </p:stCondLst>
                                         </p:cTn>
                                         <p:tgtEl>
-                                          <p:spTgt spid="179">
+                                          <p:spTgt spid="182">
                                             <p:txEl>
                                               <p:pRg st="1" end="1"/>
                                             </p:txEl>
@@ -14018,7 +13810,7 @@
                                           </p:stCondLst>
                                         </p:cTn>
                                         <p:tgtEl>
-                                          <p:spTgt spid="179">
+                                          <p:spTgt spid="182">
                                             <p:txEl>
                                               <p:pRg st="2" end="2"/>
                                             </p:txEl>
@@ -14067,7 +13859,7 @@
                                           </p:stCondLst>
                                         </p:cTn>
                                         <p:tgtEl>
-                                          <p:spTgt spid="179">
+                                          <p:spTgt spid="182">
                                             <p:txEl>
                                               <p:pRg st="3" end="3"/>
                                             </p:txEl>
@@ -14120,7 +13912,7 @@
   <p:cSld>
     <p:spTree>
       <p:nvGrpSpPr>
-        <p:cNvPr id="1" name="Shape 183"/>
+        <p:cNvPr id="1" name="Shape 187"/>
         <p:cNvGrpSpPr/>
         <p:nvPr/>
       </p:nvGrpSpPr>
@@ -14134,7 +13926,7 @@
       </p:grpSpPr>
       <p:sp>
         <p:nvSpPr>
-          <p:cNvPr id="184" name="Google Shape;184;p26"/>
+          <p:cNvPr id="188" name="Google Shape;188;p26"/>
           <p:cNvSpPr txBox="1">
             <a:spLocks noGrp="1"/>
           </p:cNvSpPr>
@@ -14176,7 +13968,7 @@
       </p:sp>
       <p:sp>
         <p:nvSpPr>
-          <p:cNvPr id="185" name="Google Shape;185;p26"/>
+          <p:cNvPr id="189" name="Google Shape;189;p26"/>
           <p:cNvSpPr txBox="1">
             <a:spLocks noGrp="1"/>
           </p:cNvSpPr>
@@ -14277,7 +14069,7 @@
   <p:cSld>
     <p:spTree>
       <p:nvGrpSpPr>
-        <p:cNvPr id="1" name="Shape 189"/>
+        <p:cNvPr id="1" name="Shape 193"/>
         <p:cNvGrpSpPr/>
         <p:nvPr/>
       </p:nvGrpSpPr>
@@ -14291,7 +14083,7 @@
       </p:grpSpPr>
       <p:sp>
         <p:nvSpPr>
-          <p:cNvPr id="190" name="Google Shape;190;p27"/>
+          <p:cNvPr id="194" name="Google Shape;194;p27"/>
           <p:cNvSpPr txBox="1">
             <a:spLocks noGrp="1"/>
           </p:cNvSpPr>
@@ -14333,7 +14125,7 @@
       </p:sp>
       <p:sp>
         <p:nvSpPr>
-          <p:cNvPr id="191" name="Google Shape;191;p27"/>
+          <p:cNvPr id="195" name="Google Shape;195;p27"/>
           <p:cNvSpPr txBox="1">
             <a:spLocks noGrp="1"/>
           </p:cNvSpPr>
@@ -14443,7 +14235,7 @@
       </p:sp>
       <p:pic>
         <p:nvPicPr>
-          <p:cNvPr id="192" name="Google Shape;192;p27" descr="{&quot;mathml&quot;:&quot;&lt;math style=\&quot;font-family:stix;font-size:16px;\&quot; xmlns=\&quot;http://www.w3.org/1998/Math/MathML\&quot;&gt;&lt;mstyle mathsize=\&quot;16px\&quot;&gt;&lt;mi&gt;O&lt;/mi&gt;&lt;mi&gt;d&lt;/mi&gt;&lt;mi&gt;d&lt;/mi&gt;&lt;mi&gt;s&lt;/mi&gt;&lt;mo&gt;&amp;#xA0;&lt;/mo&gt;&lt;mo&gt;=&lt;/mo&gt;&lt;mo&gt;&amp;#xA0;&lt;/mo&gt;&lt;mfrac&gt;&lt;mi&gt;A&lt;/mi&gt;&lt;mi&gt;B&lt;/mi&gt;&lt;/mfrac&gt;&lt;mo&gt;&amp;#x2009;&lt;/mo&gt;&lt;mo&gt;=&lt;/mo&gt;&lt;mo&gt;&amp;#xA0;&lt;/mo&gt;&lt;mfrac&gt;&lt;mstyle displaystyle=\&quot;true\&quot;&gt;&lt;mfrac&gt;&lt;mi&gt;A&lt;/mi&gt;&lt;mrow&gt;&lt;mi&gt;A&lt;/mi&gt;&lt;mo&gt;+&lt;/mo&gt;&lt;mi&gt;B&lt;/mi&gt;&lt;/mrow&gt;&lt;/mfrac&gt;&lt;/mstyle&gt;&lt;mstyle displaystyle=\&quot;true\&quot;&gt;&lt;mfrac&gt;&lt;mi&gt;B&lt;/mi&gt;&lt;mrow&gt;&lt;mi&gt;A&lt;/mi&gt;&lt;mo&gt;+&lt;/mo&gt;&lt;mi&gt;B&lt;/mi&gt;&lt;/mrow&gt;&lt;/mfrac&gt;&lt;/mstyle&gt;&lt;/mfrac&gt;&lt;mo&gt;&amp;#xA0;&lt;/mo&gt;&lt;mo&gt;=&lt;/mo&gt;&lt;mo&gt;&amp;#xA0;&lt;/mo&gt;&lt;mo&gt;&amp;#x2009;&lt;/mo&gt;&lt;mfrac&gt;&lt;mstyle displaystyle=\&quot;true\&quot;&gt;&lt;mfrac&gt;&lt;mi&gt;A&lt;/mi&gt;&lt;mrow&gt;&lt;mi&gt;A&lt;/mi&gt;&lt;mo&gt;+&lt;/mo&gt;&lt;mi&gt;B&lt;/mi&gt;&lt;/mrow&gt;&lt;/mfrac&gt;&lt;/mstyle&gt;&lt;mstyle displaystyle=\&quot;true\&quot;&gt;&lt;mfrac&gt;&lt;mrow&gt;&lt;mi&gt;A&lt;/mi&gt;&lt;mo&gt;+&lt;/mo&gt;&lt;mi&gt;B&lt;/mi&gt;&lt;/mrow&gt;&lt;mrow&gt;&lt;mi&gt;A&lt;/mi&gt;&lt;mo&gt;+&lt;/mo&gt;&lt;mi&gt;B&lt;/mi&gt;&lt;/mrow&gt;&lt;/mfrac&gt;&lt;mo&gt;-&lt;/mo&gt;&lt;mfrac&gt;&lt;mi&gt;A&lt;/mi&gt;&lt;mrow&gt;&lt;mi&gt;A&lt;/mi&gt;&lt;mo&gt;+&lt;/mo&gt;&lt;mi&gt;B&lt;/mi&gt;&lt;/mrow&gt;&lt;/mfrac&gt;&lt;/mstyle&gt;&lt;/mfrac&gt;&lt;mo&gt;&amp;#xA0;&lt;/mo&gt;&lt;mo&gt;=&lt;/mo&gt;&lt;mo&gt;&amp;#x2009;&lt;/mo&gt;&lt;mfrac&gt;&lt;mstyle displaystyle=\&quot;true\&quot;&gt;&lt;mfrac&gt;&lt;mi&gt;A&lt;/mi&gt;&lt;mrow&gt;&lt;mi&gt;A&lt;/mi&gt;&lt;mo&gt;+&lt;/mo&gt;&lt;mi&gt;B&lt;/mi&gt;&lt;/mrow&gt;&lt;/mfrac&gt;&lt;/mstyle&gt;&lt;mrow&gt;&lt;mn&gt;1&lt;/mn&gt;&lt;mo&gt;-&lt;/mo&gt;&lt;mstyle displaystyle=\&quot;true\&quot;&gt;&lt;mfrac&gt;&lt;mi&gt;A&lt;/mi&gt;&lt;mrow&gt;&lt;mi&gt;A&lt;/mi&gt;&lt;mo&gt;+&lt;/mo&gt;&lt;mi&gt;B&lt;/mi&gt;&lt;/mrow&gt;&lt;/mfrac&gt;&lt;/mstyle&gt;&lt;/mrow&gt;&lt;/mfrac&gt;&lt;mo&gt;&amp;#x2009;&lt;/mo&gt;&lt;mo&gt;=&lt;/mo&gt;&lt;mo&gt;&amp;#xA0;&lt;/mo&gt;&lt;mo&gt;&amp;#x2009;&lt;/mo&gt;&lt;mfrac&gt;&lt;mi&gt;p&lt;/mi&gt;&lt;mrow&gt;&lt;mn&gt;1&lt;/mn&gt;&lt;mo&gt;-&lt;/mo&gt;&lt;mi&gt;p&lt;/mi&gt;&lt;/mrow&gt;&lt;/mfrac&gt;&lt;mo&gt;&amp;#x2009;&lt;/mo&gt;&lt;mo&gt;&amp;#xA0;&lt;/mo&gt;&lt;/mstyle&gt;&lt;/math&gt;&quot;,&quot;truncated&quot;:false}" title="O d d s space equals space A over B thin space equals space fraction numerator fraction numerator A over denominator A plus B end fraction over denominator fraction numerator B over denominator A plus B end fraction end fraction space equals space thin space fraction numerator fraction numerator A over denominator A plus B end fraction over denominator fraction numerator A plus B over denominator A plus B end fraction minus fraction numerator A over denominator A plus B end fraction end fraction space equals thin space fraction numerator fraction numerator A over denominator A plus B end fraction over denominator 1 minus fraction numerator A over denominator A plus B end fraction end fraction thin space equals space thin space fraction numerator p over denominator 1 minus p end fraction thin space space"/>
+          <p:cNvPr id="196" name="Google Shape;196;p27" descr="{&quot;mathml&quot;:&quot;&lt;math style=\&quot;font-family:stix;font-size:16px;\&quot; xmlns=\&quot;http://www.w3.org/1998/Math/MathML\&quot;&gt;&lt;mstyle mathsize=\&quot;16px\&quot;&gt;&lt;mi&gt;O&lt;/mi&gt;&lt;mi&gt;d&lt;/mi&gt;&lt;mi&gt;d&lt;/mi&gt;&lt;mi&gt;s&lt;/mi&gt;&lt;mo&gt;&amp;#xA0;&lt;/mo&gt;&lt;mo&gt;=&lt;/mo&gt;&lt;mo&gt;&amp;#xA0;&lt;/mo&gt;&lt;mfrac&gt;&lt;mi&gt;A&lt;/mi&gt;&lt;mi&gt;B&lt;/mi&gt;&lt;/mfrac&gt;&lt;mo&gt;&amp;#x2009;&lt;/mo&gt;&lt;mo&gt;=&lt;/mo&gt;&lt;mo&gt;&amp;#xA0;&lt;/mo&gt;&lt;mfrac&gt;&lt;mstyle displaystyle=\&quot;true\&quot;&gt;&lt;mfrac&gt;&lt;mi&gt;A&lt;/mi&gt;&lt;mrow&gt;&lt;mi&gt;A&lt;/mi&gt;&lt;mo&gt;+&lt;/mo&gt;&lt;mi&gt;B&lt;/mi&gt;&lt;/mrow&gt;&lt;/mfrac&gt;&lt;/mstyle&gt;&lt;mstyle displaystyle=\&quot;true\&quot;&gt;&lt;mfrac&gt;&lt;mi&gt;B&lt;/mi&gt;&lt;mrow&gt;&lt;mi&gt;A&lt;/mi&gt;&lt;mo&gt;+&lt;/mo&gt;&lt;mi&gt;B&lt;/mi&gt;&lt;/mrow&gt;&lt;/mfrac&gt;&lt;/mstyle&gt;&lt;/mfrac&gt;&lt;mo&gt;&amp;#xA0;&lt;/mo&gt;&lt;mo&gt;=&lt;/mo&gt;&lt;mo&gt;&amp;#xA0;&lt;/mo&gt;&lt;mo&gt;&amp;#x2009;&lt;/mo&gt;&lt;mfrac&gt;&lt;mstyle displaystyle=\&quot;true\&quot;&gt;&lt;mfrac&gt;&lt;mi&gt;A&lt;/mi&gt;&lt;mrow&gt;&lt;mi&gt;A&lt;/mi&gt;&lt;mo&gt;+&lt;/mo&gt;&lt;mi&gt;B&lt;/mi&gt;&lt;/mrow&gt;&lt;/mfrac&gt;&lt;/mstyle&gt;&lt;mstyle displaystyle=\&quot;true\&quot;&gt;&lt;mfrac&gt;&lt;mrow&gt;&lt;mi&gt;A&lt;/mi&gt;&lt;mo&gt;+&lt;/mo&gt;&lt;mi&gt;B&lt;/mi&gt;&lt;/mrow&gt;&lt;mrow&gt;&lt;mi&gt;A&lt;/mi&gt;&lt;mo&gt;+&lt;/mo&gt;&lt;mi&gt;B&lt;/mi&gt;&lt;/mrow&gt;&lt;/mfrac&gt;&lt;mo&gt;-&lt;/mo&gt;&lt;mfrac&gt;&lt;mi&gt;A&lt;/mi&gt;&lt;mrow&gt;&lt;mi&gt;A&lt;/mi&gt;&lt;mo&gt;+&lt;/mo&gt;&lt;mi&gt;B&lt;/mi&gt;&lt;/mrow&gt;&lt;/mfrac&gt;&lt;/mstyle&gt;&lt;/mfrac&gt;&lt;mo&gt;&amp;#xA0;&lt;/mo&gt;&lt;mo&gt;=&lt;/mo&gt;&lt;mo&gt;&amp;#x2009;&lt;/mo&gt;&lt;mfrac&gt;&lt;mstyle displaystyle=\&quot;true\&quot;&gt;&lt;mfrac&gt;&lt;mi&gt;A&lt;/mi&gt;&lt;mrow&gt;&lt;mi&gt;A&lt;/mi&gt;&lt;mo&gt;+&lt;/mo&gt;&lt;mi&gt;B&lt;/mi&gt;&lt;/mrow&gt;&lt;/mfrac&gt;&lt;/mstyle&gt;&lt;mrow&gt;&lt;mn&gt;1&lt;/mn&gt;&lt;mo&gt;-&lt;/mo&gt;&lt;mstyle displaystyle=\&quot;true\&quot;&gt;&lt;mfrac&gt;&lt;mi&gt;A&lt;/mi&gt;&lt;mrow&gt;&lt;mi&gt;A&lt;/mi&gt;&lt;mo&gt;+&lt;/mo&gt;&lt;mi&gt;B&lt;/mi&gt;&lt;/mrow&gt;&lt;/mfrac&gt;&lt;/mstyle&gt;&lt;/mrow&gt;&lt;/mfrac&gt;&lt;mo&gt;&amp;#x2009;&lt;/mo&gt;&lt;mo&gt;=&lt;/mo&gt;&lt;mo&gt;&amp;#xA0;&lt;/mo&gt;&lt;mo&gt;&amp;#x2009;&lt;/mo&gt;&lt;mfrac&gt;&lt;mi&gt;p&lt;/mi&gt;&lt;mrow&gt;&lt;mn&gt;1&lt;/mn&gt;&lt;mo&gt;-&lt;/mo&gt;&lt;mi&gt;p&lt;/mi&gt;&lt;/mrow&gt;&lt;/mfrac&gt;&lt;mo&gt;&amp;#x2009;&lt;/mo&gt;&lt;mo&gt;&amp;#xA0;&lt;/mo&gt;&lt;/mstyle&gt;&lt;/math&gt;&quot;,&quot;truncated&quot;:false}" title="O d d s space equals space A over B thin space equals space fraction numerator fraction numerator A over denominator A plus B end fraction over denominator fraction numerator B over denominator A plus B end fraction end fraction space equals space thin space fraction numerator fraction numerator A over denominator A plus B end fraction over denominator fraction numerator A plus B over denominator A plus B end fraction minus fraction numerator A over denominator A plus B end fraction end fraction space equals thin space fraction numerator fraction numerator A over denominator A plus B end fraction over denominator 1 minus fraction numerator A over denominator A plus B end fraction end fraction thin space equals space thin space fraction numerator p over denominator 1 minus p end fraction thin space space"/>
           <p:cNvPicPr preferRelativeResize="0"/>
           <p:nvPr/>
         </p:nvPicPr>
@@ -14508,7 +14300,7 @@
                                           </p:stCondLst>
                                         </p:cTn>
                                         <p:tgtEl>
-                                          <p:spTgt spid="191">
+                                          <p:spTgt spid="195">
                                             <p:txEl>
                                               <p:pRg st="0" end="0"/>
                                             </p:txEl>
@@ -14557,7 +14349,7 @@
                                           </p:stCondLst>
                                         </p:cTn>
                                         <p:tgtEl>
-                                          <p:spTgt spid="191">
+                                          <p:spTgt spid="195">
                                             <p:txEl>
                                               <p:pRg st="1" end="1"/>
                                             </p:txEl>
@@ -14606,7 +14398,7 @@
                                           </p:stCondLst>
                                         </p:cTn>
                                         <p:tgtEl>
-                                          <p:spTgt spid="191">
+                                          <p:spTgt spid="195">
                                             <p:txEl>
                                               <p:pRg st="2" end="2"/>
                                             </p:txEl>
@@ -14655,7 +14447,7 @@
                                           </p:stCondLst>
                                         </p:cTn>
                                         <p:tgtEl>
-                                          <p:spTgt spid="191">
+                                          <p:spTgt spid="195">
                                             <p:txEl>
                                               <p:pRg st="3" end="3"/>
                                             </p:txEl>
@@ -14704,7 +14496,7 @@
                                           </p:stCondLst>
                                         </p:cTn>
                                         <p:tgtEl>
-                                          <p:spTgt spid="191">
+                                          <p:spTgt spid="195">
                                             <p:txEl>
                                               <p:pRg st="4" end="4"/>
                                             </p:txEl>
@@ -14753,11 +14545,56 @@
                                           </p:stCondLst>
                                         </p:cTn>
                                         <p:tgtEl>
-                                          <p:spTgt spid="191">
+                                          <p:spTgt spid="195">
                                             <p:txEl>
                                               <p:pRg st="5" end="5"/>
                                             </p:txEl>
                                           </p:spTgt>
+                                        </p:tgtEl>
+                                        <p:attrNameLst>
+                                          <p:attrName>style.visibility</p:attrName>
+                                        </p:attrNameLst>
+                                      </p:cBhvr>
+                                      <p:to>
+                                        <p:strVal val="visible"/>
+                                      </p:to>
+                                    </p:set>
+                                  </p:childTnLst>
+                                </p:cTn>
+                              </p:par>
+                            </p:childTnLst>
+                          </p:cTn>
+                        </p:par>
+                      </p:childTnLst>
+                    </p:cTn>
+                  </p:par>
+                  <p:par>
+                    <p:cTn id="27" fill="hold">
+                      <p:stCondLst>
+                        <p:cond delay="indefinite"/>
+                      </p:stCondLst>
+                      <p:childTnLst>
+                        <p:par>
+                          <p:cTn id="28" fill="hold">
+                            <p:stCondLst>
+                              <p:cond delay="0"/>
+                            </p:stCondLst>
+                            <p:childTnLst>
+                              <p:par>
+                                <p:cTn id="29" presetID="1" presetClass="entr" presetSubtype="0" fill="hold" nodeType="clickEffect">
+                                  <p:stCondLst>
+                                    <p:cond delay="0"/>
+                                  </p:stCondLst>
+                                  <p:childTnLst>
+                                    <p:set>
+                                      <p:cBhvr>
+                                        <p:cTn id="30" dur="1" fill="hold">
+                                          <p:stCondLst>
+                                            <p:cond delay="0"/>
+                                          </p:stCondLst>
+                                        </p:cTn>
+                                        <p:tgtEl>
+                                          <p:spTgt spid="196"/>
                                         </p:tgtEl>
                                         <p:attrNameLst>
                                           <p:attrName>style.visibility</p:attrName>
@@ -14806,7 +14643,7 @@
   <p:cSld>
     <p:spTree>
       <p:nvGrpSpPr>
-        <p:cNvPr id="1" name="Shape 196"/>
+        <p:cNvPr id="1" name="Shape 200"/>
         <p:cNvGrpSpPr/>
         <p:nvPr/>
       </p:nvGrpSpPr>
@@ -14820,7 +14657,7 @@
       </p:grpSpPr>
       <p:sp>
         <p:nvSpPr>
-          <p:cNvPr id="197" name="Google Shape;197;p28"/>
+          <p:cNvPr id="201" name="Google Shape;201;p28"/>
           <p:cNvSpPr txBox="1">
             <a:spLocks noGrp="1"/>
           </p:cNvSpPr>
@@ -14862,7 +14699,7 @@
       </p:sp>
       <p:sp>
         <p:nvSpPr>
-          <p:cNvPr id="198" name="Google Shape;198;p28"/>
+          <p:cNvPr id="202" name="Google Shape;202;p28"/>
           <p:cNvSpPr txBox="1">
             <a:spLocks noGrp="1"/>
           </p:cNvSpPr>
@@ -14980,7 +14817,7 @@
       </p:sp>
       <p:pic>
         <p:nvPicPr>
-          <p:cNvPr id="199" name="Google Shape;199;p28"/>
+          <p:cNvPr id="203" name="Google Shape;203;p28"/>
           <p:cNvPicPr preferRelativeResize="0"/>
           <p:nvPr/>
         </p:nvPicPr>
@@ -15008,7 +14845,7 @@
       </p:pic>
       <p:pic>
         <p:nvPicPr>
-          <p:cNvPr id="200" name="Google Shape;200;p28" descr="{&quot;mathml&quot;:&quot;&lt;math style=\&quot;font-family:stix;font-size:16px;\&quot; xmlns=\&quot;http://www.w3.org/1998/Math/MathML\&quot;&gt;&lt;mstyle mathsize=\&quot;16px\&quot;&gt;&lt;mi&gt;O&lt;/mi&gt;&lt;mi&gt;R&lt;/mi&gt;&lt;mo&gt;&amp;#x2009;&lt;/mo&gt;&lt;mo&gt;=&lt;/mo&gt;&lt;mo&gt;&amp;#x2009;&lt;/mo&gt;&lt;mfrac&gt;&lt;mstyle displaystyle=\&quot;true\&quot;&gt;&lt;mfrac&gt;&lt;mn&gt;39&lt;/mn&gt;&lt;mn&gt;279&lt;/mn&gt;&lt;/mfrac&gt;&lt;/mstyle&gt;&lt;mstyle displaystyle=\&quot;true\&quot;&gt;&lt;mfrac&gt;&lt;mn&gt;26&lt;/mn&gt;&lt;mn&gt;310&lt;/mn&gt;&lt;/mfrac&gt;&lt;/mstyle&gt;&lt;/mfrac&gt;&lt;mo&gt;&amp;#x2009;&lt;/mo&gt;&lt;mo&gt;=&lt;/mo&gt;&lt;mo&gt;&amp;#x2009;&lt;/mo&gt;&lt;mn&gt;1&lt;/mn&gt;&lt;mo&gt;.&lt;/mo&gt;&lt;mn&gt;667&lt;/mn&gt;&lt;mo&gt;&amp;#xA0;&lt;/mo&gt;&lt;mo&gt;&amp;#xA0;&lt;/mo&gt;&lt;mo&gt;&amp;#xA0;&lt;/mo&gt;&lt;mo&gt;&amp;#xA0;&lt;/mo&gt;&lt;mo&gt;&amp;#xA0;&lt;/mo&gt;&lt;mo&gt;&amp;#xA0;&lt;/mo&gt;&lt;mo&gt;&amp;#xA0;&lt;/mo&gt;&lt;mo&gt;&amp;#xA0;&lt;/mo&gt;&lt;mo&gt;&amp;#xA0;&lt;/mo&gt;&lt;mo&gt;&amp;#xA0;&lt;/mo&gt;&lt;mo&gt;&amp;#xA0;&lt;/mo&gt;&lt;mo&gt;&amp;#xA0;&lt;/mo&gt;&lt;mo&gt;&amp;#xA0;&lt;/mo&gt;&lt;mo&gt;&amp;#xA0;&lt;/mo&gt;&lt;mi&gt;R&lt;/mi&gt;&lt;mi&gt;R&lt;/mi&gt;&lt;mo&gt;&amp;#x2009;&lt;/mo&gt;&lt;mo&gt;=&lt;/mo&gt;&lt;mo&gt;&amp;#x2009;&lt;/mo&gt;&lt;mfrac&gt;&lt;mstyle displaystyle=\&quot;true\&quot;&gt;&lt;mfrac&gt;&lt;mn&gt;39&lt;/mn&gt;&lt;mn&gt;318&lt;/mn&gt;&lt;/mfrac&gt;&lt;/mstyle&gt;&lt;mstyle displaystyle=\&quot;true\&quot;&gt;&lt;mfrac&gt;&lt;mn&gt;26&lt;/mn&gt;&lt;mn&gt;336&lt;/mn&gt;&lt;/mfrac&gt;&lt;/mstyle&gt;&lt;/mfrac&gt;&lt;mo&gt;=&lt;/mo&gt;&lt;mn&gt;1&lt;/mn&gt;&lt;mo&gt;.&lt;/mo&gt;&lt;mn&gt;585&lt;/mn&gt;&lt;/mstyle&gt;&lt;/math&gt;&quot;,&quot;truncated&quot;:false}" title="O R thin space equals thin space fraction numerator 39 over 279 over denominator 26 over 310 end fraction thin space equals thin space 1.667 space space space space space space space space space space space space space space R R thin space equals thin space fraction numerator 39 over 318 over denominator 26 over 336 end fraction equals 1.585"/>
+          <p:cNvPr id="204" name="Google Shape;204;p28" descr="{&quot;mathml&quot;:&quot;&lt;math style=\&quot;font-family:stix;font-size:16px;\&quot; xmlns=\&quot;http://www.w3.org/1998/Math/MathML\&quot;&gt;&lt;mstyle mathsize=\&quot;16px\&quot;&gt;&lt;mi&gt;O&lt;/mi&gt;&lt;mi&gt;R&lt;/mi&gt;&lt;mo&gt;&amp;#x2009;&lt;/mo&gt;&lt;mo&gt;=&lt;/mo&gt;&lt;mo&gt;&amp;#x2009;&lt;/mo&gt;&lt;mfrac&gt;&lt;mstyle displaystyle=\&quot;true\&quot;&gt;&lt;mfrac&gt;&lt;mn&gt;39&lt;/mn&gt;&lt;mn&gt;279&lt;/mn&gt;&lt;/mfrac&gt;&lt;/mstyle&gt;&lt;mstyle displaystyle=\&quot;true\&quot;&gt;&lt;mfrac&gt;&lt;mn&gt;26&lt;/mn&gt;&lt;mn&gt;310&lt;/mn&gt;&lt;/mfrac&gt;&lt;/mstyle&gt;&lt;/mfrac&gt;&lt;mo&gt;&amp;#x2009;&lt;/mo&gt;&lt;mo&gt;=&lt;/mo&gt;&lt;mo&gt;&amp;#x2009;&lt;/mo&gt;&lt;mn&gt;1&lt;/mn&gt;&lt;mo&gt;.&lt;/mo&gt;&lt;mn&gt;667&lt;/mn&gt;&lt;mo&gt;&amp;#xA0;&lt;/mo&gt;&lt;mo&gt;&amp;#xA0;&lt;/mo&gt;&lt;mo&gt;&amp;#xA0;&lt;/mo&gt;&lt;mo&gt;&amp;#xA0;&lt;/mo&gt;&lt;mo&gt;&amp;#xA0;&lt;/mo&gt;&lt;mo&gt;&amp;#xA0;&lt;/mo&gt;&lt;mo&gt;&amp;#xA0;&lt;/mo&gt;&lt;mo&gt;&amp;#xA0;&lt;/mo&gt;&lt;mo&gt;&amp;#xA0;&lt;/mo&gt;&lt;mo&gt;&amp;#xA0;&lt;/mo&gt;&lt;mo&gt;&amp;#xA0;&lt;/mo&gt;&lt;mo&gt;&amp;#xA0;&lt;/mo&gt;&lt;mo&gt;&amp;#xA0;&lt;/mo&gt;&lt;mo&gt;&amp;#xA0;&lt;/mo&gt;&lt;mi&gt;R&lt;/mi&gt;&lt;mi&gt;R&lt;/mi&gt;&lt;mo&gt;&amp;#x2009;&lt;/mo&gt;&lt;mo&gt;=&lt;/mo&gt;&lt;mo&gt;&amp;#x2009;&lt;/mo&gt;&lt;mfrac&gt;&lt;mstyle displaystyle=\&quot;true\&quot;&gt;&lt;mfrac&gt;&lt;mn&gt;39&lt;/mn&gt;&lt;mn&gt;318&lt;/mn&gt;&lt;/mfrac&gt;&lt;/mstyle&gt;&lt;mstyle displaystyle=\&quot;true\&quot;&gt;&lt;mfrac&gt;&lt;mn&gt;26&lt;/mn&gt;&lt;mn&gt;336&lt;/mn&gt;&lt;/mfrac&gt;&lt;/mstyle&gt;&lt;/mfrac&gt;&lt;mo&gt;=&lt;/mo&gt;&lt;mn&gt;1&lt;/mn&gt;&lt;mo&gt;.&lt;/mo&gt;&lt;mn&gt;585&lt;/mn&gt;&lt;/mstyle&gt;&lt;/math&gt;&quot;,&quot;truncated&quot;:false}" title="O R thin space equals thin space fraction numerator 39 over 279 over denominator 26 over 310 end fraction thin space equals thin space 1.667 space space space space space space space space space space space space space space R R thin space equals thin space fraction numerator 39 over 318 over denominator 26 over 336 end fraction equals 1.585"/>
           <p:cNvPicPr preferRelativeResize="0"/>
           <p:nvPr/>
         </p:nvPicPr>
@@ -15039,6 +14876,126 @@
   <p:clrMapOvr>
     <a:masterClrMapping/>
   </p:clrMapOvr>
+  <p:timing>
+    <p:tnLst>
+      <p:par>
+        <p:cTn id="1" dur="indefinite" restart="never" nodeType="tmRoot">
+          <p:childTnLst>
+            <p:seq concurrent="1" nextAc="seek">
+              <p:cTn id="2" dur="indefinite" nodeType="mainSeq">
+                <p:childTnLst>
+                  <p:par>
+                    <p:cTn id="3" fill="hold">
+                      <p:stCondLst>
+                        <p:cond delay="indefinite"/>
+                      </p:stCondLst>
+                      <p:childTnLst>
+                        <p:par>
+                          <p:cTn id="4" fill="hold">
+                            <p:stCondLst>
+                              <p:cond delay="0"/>
+                            </p:stCondLst>
+                            <p:childTnLst>
+                              <p:par>
+                                <p:cTn id="5" presetID="1" presetClass="entr" presetSubtype="0" fill="hold" nodeType="clickEffect">
+                                  <p:stCondLst>
+                                    <p:cond delay="0"/>
+                                  </p:stCondLst>
+                                  <p:childTnLst>
+                                    <p:set>
+                                      <p:cBhvr>
+                                        <p:cTn id="6" dur="1" fill="hold">
+                                          <p:stCondLst>
+                                            <p:cond delay="0"/>
+                                          </p:stCondLst>
+                                        </p:cTn>
+                                        <p:tgtEl>
+                                          <p:spTgt spid="202"/>
+                                        </p:tgtEl>
+                                        <p:attrNameLst>
+                                          <p:attrName>style.visibility</p:attrName>
+                                        </p:attrNameLst>
+                                      </p:cBhvr>
+                                      <p:to>
+                                        <p:strVal val="visible"/>
+                                      </p:to>
+                                    </p:set>
+                                  </p:childTnLst>
+                                </p:cTn>
+                              </p:par>
+                            </p:childTnLst>
+                          </p:cTn>
+                        </p:par>
+                      </p:childTnLst>
+                    </p:cTn>
+                  </p:par>
+                  <p:par>
+                    <p:cTn id="7" fill="hold">
+                      <p:stCondLst>
+                        <p:cond delay="indefinite"/>
+                      </p:stCondLst>
+                      <p:childTnLst>
+                        <p:par>
+                          <p:cTn id="8" fill="hold">
+                            <p:stCondLst>
+                              <p:cond delay="0"/>
+                            </p:stCondLst>
+                            <p:childTnLst>
+                              <p:par>
+                                <p:cTn id="9" presetID="1" presetClass="entr" presetSubtype="0" fill="hold" nodeType="clickEffect">
+                                  <p:stCondLst>
+                                    <p:cond delay="0"/>
+                                  </p:stCondLst>
+                                  <p:childTnLst>
+                                    <p:set>
+                                      <p:cBhvr>
+                                        <p:cTn id="10" dur="1" fill="hold">
+                                          <p:stCondLst>
+                                            <p:cond delay="0"/>
+                                          </p:stCondLst>
+                                        </p:cTn>
+                                        <p:tgtEl>
+                                          <p:spTgt spid="204"/>
+                                        </p:tgtEl>
+                                        <p:attrNameLst>
+                                          <p:attrName>style.visibility</p:attrName>
+                                        </p:attrNameLst>
+                                      </p:cBhvr>
+                                      <p:to>
+                                        <p:strVal val="visible"/>
+                                      </p:to>
+                                    </p:set>
+                                  </p:childTnLst>
+                                </p:cTn>
+                              </p:par>
+                            </p:childTnLst>
+                          </p:cTn>
+                        </p:par>
+                      </p:childTnLst>
+                    </p:cTn>
+                  </p:par>
+                </p:childTnLst>
+              </p:cTn>
+              <p:prevCondLst>
+                <p:cond evt="onPrev" delay="0">
+                  <p:tgtEl>
+                    <p:sldTgt/>
+                  </p:tgtEl>
+                </p:cond>
+              </p:prevCondLst>
+              <p:nextCondLst>
+                <p:cond evt="onNext" delay="0">
+                  <p:tgtEl>
+                    <p:sldTgt/>
+                  </p:tgtEl>
+                </p:cond>
+              </p:nextCondLst>
+            </p:seq>
+          </p:childTnLst>
+        </p:cTn>
+      </p:par>
+    </p:tnLst>
+  </p:timing>
 </p:sld>
 </file>
 
@@ -15047,7 +15004,7 @@
   <p:cSld>
     <p:spTree>
       <p:nvGrpSpPr>
-        <p:cNvPr id="1" name="Shape 204"/>
+        <p:cNvPr id="1" name="Shape 208"/>
         <p:cNvGrpSpPr/>
         <p:nvPr/>
       </p:nvGrpSpPr>
@@ -15061,7 +15018,7 @@
       </p:grpSpPr>
       <p:sp>
         <p:nvSpPr>
-          <p:cNvPr id="205" name="Google Shape;205;p29"/>
+          <p:cNvPr id="209" name="Google Shape;209;p29"/>
           <p:cNvSpPr txBox="1">
             <a:spLocks noGrp="1"/>
           </p:cNvSpPr>
@@ -15103,7 +15060,7 @@
       </p:sp>
       <p:pic>
         <p:nvPicPr>
-          <p:cNvPr id="206" name="Google Shape;206;p29"/>
+          <p:cNvPr id="210" name="Google Shape;210;p29"/>
           <p:cNvPicPr preferRelativeResize="0"/>
           <p:nvPr/>
         </p:nvPicPr>
@@ -15131,7 +15088,7 @@
       </p:pic>
       <p:pic>
         <p:nvPicPr>
-          <p:cNvPr id="207" name="Google Shape;207;p29"/>
+          <p:cNvPr id="211" name="Google Shape;211;p29"/>
           <p:cNvPicPr preferRelativeResize="0"/>
           <p:nvPr/>
         </p:nvPicPr>
@@ -15159,7 +15116,7 @@
       </p:pic>
       <p:pic>
         <p:nvPicPr>
-          <p:cNvPr id="208" name="Google Shape;208;p29"/>
+          <p:cNvPr id="212" name="Google Shape;212;p29"/>
           <p:cNvPicPr preferRelativeResize="0"/>
           <p:nvPr/>
         </p:nvPicPr>
@@ -15187,7 +15144,7 @@
       </p:pic>
       <p:pic>
         <p:nvPicPr>
-          <p:cNvPr id="209" name="Google Shape;209;p29"/>
+          <p:cNvPr id="213" name="Google Shape;213;p29"/>
           <p:cNvPicPr preferRelativeResize="0"/>
           <p:nvPr/>
         </p:nvPicPr>
@@ -15218,6 +15175,216 @@
   <p:clrMapOvr>
     <a:masterClrMapping/>
   </p:clrMapOvr>
+  <p:timing>
+    <p:tnLst>
+      <p:par>
+        <p:cTn id="1" dur="indefinite" restart="never" nodeType="tmRoot">
+          <p:childTnLst>
+            <p:seq concurrent="1" nextAc="seek">
+              <p:cTn id="2" dur="indefinite" nodeType="mainSeq">
+                <p:childTnLst>
+                  <p:par>
+                    <p:cTn id="3" fill="hold">
+                      <p:stCondLst>
+                        <p:cond delay="indefinite"/>
+                      </p:stCondLst>
+                      <p:childTnLst>
+                        <p:par>
+                          <p:cTn id="4" fill="hold">
+                            <p:stCondLst>
+                              <p:cond delay="0"/>
+                            </p:stCondLst>
+                            <p:childTnLst>
+                              <p:par>
+                                <p:cTn id="5" presetID="1" presetClass="entr" presetSubtype="0" fill="hold" nodeType="clickEffect">
+                                  <p:stCondLst>
+                                    <p:cond delay="0"/>
+                                  </p:stCondLst>
+                                  <p:childTnLst>
+                                    <p:set>
+                                      <p:cBhvr>
+                                        <p:cTn id="6" dur="1" fill="hold">
+                                          <p:stCondLst>
+                                            <p:cond delay="0"/>
+                                          </p:stCondLst>
+                                        </p:cTn>
+                                        <p:tgtEl>
+                                          <p:spTgt spid="210"/>
+                                        </p:tgtEl>
+                                        <p:attrNameLst>
+                                          <p:attrName>style.visibility</p:attrName>
+                                        </p:attrNameLst>
+                                      </p:cBhvr>
+                                      <p:to>
+                                        <p:strVal val="visible"/>
+                                      </p:to>
+                                    </p:set>
+                                  </p:childTnLst>
+                                </p:cTn>
+                              </p:par>
+                            </p:childTnLst>
+                          </p:cTn>
+                        </p:par>
+                      </p:childTnLst>
+                    </p:cTn>
+                  </p:par>
+                  <p:par>
+                    <p:cTn id="7" fill="hold">
+                      <p:stCondLst>
+                        <p:cond delay="indefinite"/>
+                      </p:stCondLst>
+                      <p:childTnLst>
+                        <p:par>
+                          <p:cTn id="8" fill="hold">
+                            <p:stCondLst>
+                              <p:cond delay="0"/>
+                            </p:stCondLst>
+                            <p:childTnLst>
+                              <p:par>
+                                <p:cTn id="9" presetID="1" presetClass="entr" presetSubtype="0" fill="hold" nodeType="clickEffect">
+                                  <p:stCondLst>
+                                    <p:cond delay="0"/>
+                                  </p:stCondLst>
+                                  <p:childTnLst>
+                                    <p:set>
+                                      <p:cBhvr>
+                                        <p:cTn id="10" dur="1" fill="hold">
+                                          <p:stCondLst>
+                                            <p:cond delay="0"/>
+                                          </p:stCondLst>
+                                        </p:cTn>
+                                        <p:tgtEl>
+                                          <p:spTgt spid="211"/>
+                                        </p:tgtEl>
+                                        <p:attrNameLst>
+                                          <p:attrName>style.visibility</p:attrName>
+                                        </p:attrNameLst>
+                                      </p:cBhvr>
+                                      <p:to>
+                                        <p:strVal val="visible"/>
+                                      </p:to>
+                                    </p:set>
+                                  </p:childTnLst>
+                                </p:cTn>
+                              </p:par>
+                            </p:childTnLst>
+                          </p:cTn>
+                        </p:par>
+                      </p:childTnLst>
+                    </p:cTn>
+                  </p:par>
+                  <p:par>
+                    <p:cTn id="11" fill="hold">
+                      <p:stCondLst>
+                        <p:cond delay="indefinite"/>
+                      </p:stCondLst>
+                      <p:childTnLst>
+                        <p:par>
+                          <p:cTn id="12" fill="hold">
+                            <p:stCondLst>
+                              <p:cond delay="0"/>
+                            </p:stCondLst>
+                            <p:childTnLst>
+                              <p:par>
+                                <p:cTn id="13" presetID="1" presetClass="entr" presetSubtype="0" fill="hold" nodeType="clickEffect">
+                                  <p:stCondLst>
+                                    <p:cond delay="0"/>
+                                  </p:stCondLst>
+                                  <p:childTnLst>
+                                    <p:set>
+                                      <p:cBhvr>
+                                        <p:cTn id="14" dur="1" fill="hold">
+                                          <p:stCondLst>
+                                            <p:cond delay="0"/>
+                                          </p:stCondLst>
+                                        </p:cTn>
+                                        <p:tgtEl>
+                                          <p:spTgt spid="213"/>
+                                        </p:tgtEl>
+                                        <p:attrNameLst>
+                                          <p:attrName>style.visibility</p:attrName>
+                                        </p:attrNameLst>
+                                      </p:cBhvr>
+                                      <p:to>
+                                        <p:strVal val="visible"/>
+                                      </p:to>
+                                    </p:set>
+                                  </p:childTnLst>
+                                </p:cTn>
+                              </p:par>
+                            </p:childTnLst>
+                          </p:cTn>
+                        </p:par>
+                      </p:childTnLst>
+                    </p:cTn>
+                  </p:par>
+                  <p:par>
+                    <p:cTn id="15" fill="hold">
+                      <p:stCondLst>
+                        <p:cond delay="indefinite"/>
+                      </p:stCondLst>
+                      <p:childTnLst>
+                        <p:par>
+                          <p:cTn id="16" fill="hold">
+                            <p:stCondLst>
+                              <p:cond delay="0"/>
+                            </p:stCondLst>
+                            <p:childTnLst>
+                              <p:par>
+                                <p:cTn id="17" presetID="1" presetClass="entr" presetSubtype="0" fill="hold" nodeType="clickEffect">
+                                  <p:stCondLst>
+                                    <p:cond delay="0"/>
+                                  </p:stCondLst>
+                                  <p:childTnLst>
+                                    <p:set>
+                                      <p:cBhvr>
+                                        <p:cTn id="18" dur="1" fill="hold">
+                                          <p:stCondLst>
+                                            <p:cond delay="0"/>
+                                          </p:stCondLst>
+                                        </p:cTn>
+                                        <p:tgtEl>
+                                          <p:spTgt spid="212"/>
+                                        </p:tgtEl>
+                                        <p:attrNameLst>
+                                          <p:attrName>style.visibility</p:attrName>
+                                        </p:attrNameLst>
+                                      </p:cBhvr>
+                                      <p:to>
+                                        <p:strVal val="visible"/>
+                                      </p:to>
+                                    </p:set>
+                                  </p:childTnLst>
+                                </p:cTn>
+                              </p:par>
+                            </p:childTnLst>
+                          </p:cTn>
+                        </p:par>
+                      </p:childTnLst>
+                    </p:cTn>
+                  </p:par>
+                </p:childTnLst>
+              </p:cTn>
+              <p:prevCondLst>
+                <p:cond evt="onPrev" delay="0">
+                  <p:tgtEl>
+                    <p:sldTgt/>
+                  </p:tgtEl>
+                </p:cond>
+              </p:prevCondLst>
+              <p:nextCondLst>
+                <p:cond evt="onNext" delay="0">
+                  <p:tgtEl>
+                    <p:sldTgt/>
+                  </p:tgtEl>
+                </p:cond>
+              </p:nextCondLst>
+            </p:seq>
+          </p:childTnLst>
+        </p:cTn>
+      </p:par>
+    </p:tnLst>
+  </p:timing>
 </p:sld>
 </file>
 
@@ -15226,7 +15393,7 @@
   <p:cSld>
     <p:spTree>
       <p:nvGrpSpPr>
-        <p:cNvPr id="1" name="Shape 213"/>
+        <p:cNvPr id="1" name="Shape 217"/>
         <p:cNvGrpSpPr/>
         <p:nvPr/>
       </p:nvGrpSpPr>
@@ -15240,7 +15407,7 @@
       </p:grpSpPr>
       <p:sp>
         <p:nvSpPr>
-          <p:cNvPr id="214" name="Google Shape;214;p30"/>
+          <p:cNvPr id="218" name="Google Shape;218;p30"/>
           <p:cNvSpPr txBox="1">
             <a:spLocks noGrp="1"/>
           </p:cNvSpPr>
@@ -15282,7 +15449,7 @@
       </p:sp>
       <p:sp>
         <p:nvSpPr>
-          <p:cNvPr id="215" name="Google Shape;215;p30"/>
+          <p:cNvPr id="219" name="Google Shape;219;p30"/>
           <p:cNvSpPr txBox="1">
             <a:spLocks noGrp="1"/>
           </p:cNvSpPr>
@@ -15425,7 +15592,7 @@
                                           </p:stCondLst>
                                         </p:cTn>
                                         <p:tgtEl>
-                                          <p:spTgt spid="215">
+                                          <p:spTgt spid="219">
                                             <p:txEl>
                                               <p:pRg st="0" end="0"/>
                                             </p:txEl>
@@ -15474,7 +15641,7 @@
                                           </p:stCondLst>
                                         </p:cTn>
                                         <p:tgtEl>
-                                          <p:spTgt spid="215">
+                                          <p:spTgt spid="219">
                                             <p:txEl>
                                               <p:pRg st="1" end="1"/>
                                             </p:txEl>
@@ -15523,7 +15690,7 @@
                                           </p:stCondLst>
                                         </p:cTn>
                                         <p:tgtEl>
-                                          <p:spTgt spid="215">
+                                          <p:spTgt spid="219">
                                             <p:txEl>
                                               <p:pRg st="2" end="2"/>
                                             </p:txEl>
@@ -15572,7 +15739,7 @@
                                           </p:stCondLst>
                                         </p:cTn>
                                         <p:tgtEl>
-                                          <p:spTgt spid="215">
+                                          <p:spTgt spid="219">
                                             <p:txEl>
                                               <p:pRg st="3" end="3"/>
                                             </p:txEl>
@@ -15621,7 +15788,7 @@
                                           </p:stCondLst>
                                         </p:cTn>
                                         <p:tgtEl>
-                                          <p:spTgt spid="215">
+                                          <p:spTgt spid="219">
                                             <p:txEl>
                                               <p:pRg st="4" end="4"/>
                                             </p:txEl>
@@ -15674,7 +15841,7 @@
   <p:cSld>
     <p:spTree>
       <p:nvGrpSpPr>
-        <p:cNvPr id="1" name="Shape 219"/>
+        <p:cNvPr id="1" name="Shape 223"/>
         <p:cNvGrpSpPr/>
         <p:nvPr/>
       </p:nvGrpSpPr>
@@ -15688,7 +15855,7 @@
       </p:grpSpPr>
       <p:sp>
         <p:nvSpPr>
-          <p:cNvPr id="220" name="Google Shape;220;p31"/>
+          <p:cNvPr id="224" name="Google Shape;224;p31"/>
           <p:cNvSpPr txBox="1">
             <a:spLocks noGrp="1"/>
           </p:cNvSpPr>
@@ -15730,7 +15897,7 @@
       </p:sp>
       <p:sp>
         <p:nvSpPr>
-          <p:cNvPr id="221" name="Google Shape;221;p31"/>
+          <p:cNvPr id="225" name="Google Shape;225;p31"/>
           <p:cNvSpPr txBox="1">
             <a:spLocks noGrp="1"/>
           </p:cNvSpPr>
@@ -15779,18 +15946,10 @@
               <a:buNone/>
             </a:pPr>
             <a:r>
-              <a:rPr lang="en">
-                <a:highlight>
-                  <a:srgbClr val="93C47D"/>
-                </a:highlight>
-              </a:rPr>
+              <a:rPr lang="en"/>
               <a:t>Nullhypotesen om ingen sammenhæng, dvs. π_female = π_male (RD = 0, RR = 1, OR = 1) kan testes via R ved en chi-squared test, hvis der er mere end 5 observationer for hver type. Ellers Fishers test.</a:t>
             </a:r>
-            <a:endParaRPr>
-              <a:highlight>
-                <a:srgbClr val="93C47D"/>
-              </a:highlight>
-            </a:endParaRPr>
+            <a:endParaRPr/>
           </a:p>
           <a:p>
             <a:pPr marL="0" lvl="0" indent="0" algn="l" rtl="0">
@@ -15803,18 +15962,10 @@
               <a:buNone/>
             </a:pPr>
             <a:r>
-              <a:rPr lang="en">
-                <a:highlight>
-                  <a:srgbClr val="93C47D"/>
-                </a:highlight>
-              </a:rPr>
+              <a:rPr lang="en"/>
               <a:t>Eksempelvis: chisq.test(matrix(c(279,310,39,26), 2, 2),correct=F), hvilket giver p-værdi &gt; 0.05.0</a:t>
             </a:r>
-            <a:endParaRPr>
-              <a:highlight>
-                <a:srgbClr val="93C47D"/>
-              </a:highlight>
-            </a:endParaRPr>
+            <a:endParaRPr/>
           </a:p>
           <a:p>
             <a:pPr marL="0" lvl="0" indent="0" algn="l" rtl="0">
@@ -15909,7 +16060,7 @@
                                           </p:stCondLst>
                                         </p:cTn>
                                         <p:tgtEl>
-                                          <p:spTgt spid="221">
+                                          <p:spTgt spid="225">
                                             <p:txEl>
                                               <p:pRg st="0" end="0"/>
                                             </p:txEl>
@@ -15958,7 +16109,7 @@
                                           </p:stCondLst>
                                         </p:cTn>
                                         <p:tgtEl>
-                                          <p:spTgt spid="221">
+                                          <p:spTgt spid="225">
                                             <p:txEl>
                                               <p:pRg st="1" end="1"/>
                                             </p:txEl>
@@ -16007,7 +16158,7 @@
                                           </p:stCondLst>
                                         </p:cTn>
                                         <p:tgtEl>
-                                          <p:spTgt spid="221">
+                                          <p:spTgt spid="225">
                                             <p:txEl>
                                               <p:pRg st="2" end="2"/>
                                             </p:txEl>
@@ -16056,7 +16207,7 @@
                                           </p:stCondLst>
                                         </p:cTn>
                                         <p:tgtEl>
-                                          <p:spTgt spid="221">
+                                          <p:spTgt spid="225">
                                             <p:txEl>
                                               <p:pRg st="3" end="3"/>
                                             </p:txEl>
@@ -16105,7 +16256,7 @@
                                           </p:stCondLst>
                                         </p:cTn>
                                         <p:tgtEl>
-                                          <p:spTgt spid="221">
+                                          <p:spTgt spid="225">
                                             <p:txEl>
                                               <p:pRg st="4" end="4"/>
                                             </p:txEl>
@@ -16154,7 +16305,7 @@
                                           </p:stCondLst>
                                         </p:cTn>
                                         <p:tgtEl>
-                                          <p:spTgt spid="221">
+                                          <p:spTgt spid="225">
                                             <p:txEl>
                                               <p:pRg st="5" end="5"/>
                                             </p:txEl>
@@ -16447,6 +16598,34 @@
           <a:xfrm>
             <a:off x="5761678" y="1370625"/>
             <a:ext cx="3257000" cy="3535275"/>
+          </a:xfrm>
+          <a:prstGeom prst="rect">
+            <a:avLst/>
+          </a:prstGeom>
+          <a:noFill/>
+          <a:ln>
+            <a:noFill/>
+          </a:ln>
+        </p:spPr>
+      </p:pic>
+      <p:pic>
+        <p:nvPicPr>
+          <p:cNvPr id="105" name="Google Shape;105;p14"/>
+          <p:cNvPicPr preferRelativeResize="0"/>
+          <p:nvPr/>
+        </p:nvPicPr>
+        <p:blipFill>
+          <a:blip r:embed="rId10">
+            <a:alphaModFix/>
+          </a:blip>
+          <a:stretch>
+            <a:fillRect/>
+          </a:stretch>
+        </p:blipFill>
+        <p:spPr>
+          <a:xfrm>
+            <a:off x="2010000" y="1285013"/>
+            <a:ext cx="3371425" cy="3683737"/>
           </a:xfrm>
           <a:prstGeom prst="rect">
             <a:avLst/>
@@ -16893,6 +17072,51 @@
                       </p:childTnLst>
                     </p:cTn>
                   </p:par>
+                  <p:par>
+                    <p:cTn id="39" fill="hold">
+                      <p:stCondLst>
+                        <p:cond delay="indefinite"/>
+                      </p:stCondLst>
+                      <p:childTnLst>
+                        <p:par>
+                          <p:cTn id="40" fill="hold">
+                            <p:stCondLst>
+                              <p:cond delay="0"/>
+                            </p:stCondLst>
+                            <p:childTnLst>
+                              <p:par>
+                                <p:cTn id="41" presetID="1" presetClass="entr" presetSubtype="0" fill="hold" nodeType="clickEffect">
+                                  <p:stCondLst>
+                                    <p:cond delay="0"/>
+                                  </p:stCondLst>
+                                  <p:childTnLst>
+                                    <p:set>
+                                      <p:cBhvr>
+                                        <p:cTn id="42" dur="1" fill="hold">
+                                          <p:stCondLst>
+                                            <p:cond delay="0"/>
+                                          </p:stCondLst>
+                                        </p:cTn>
+                                        <p:tgtEl>
+                                          <p:spTgt spid="105"/>
+                                        </p:tgtEl>
+                                        <p:attrNameLst>
+                                          <p:attrName>style.visibility</p:attrName>
+                                        </p:attrNameLst>
+                                      </p:cBhvr>
+                                      <p:to>
+                                        <p:strVal val="visible"/>
+                                      </p:to>
+                                    </p:set>
+                                  </p:childTnLst>
+                                </p:cTn>
+                              </p:par>
+                            </p:childTnLst>
+                          </p:cTn>
+                        </p:par>
+                      </p:childTnLst>
+                    </p:cTn>
+                  </p:par>
                 </p:childTnLst>
               </p:cTn>
               <p:prevCondLst>
@@ -16923,7 +17147,7 @@
   <p:cSld>
     <p:spTree>
       <p:nvGrpSpPr>
-        <p:cNvPr id="1" name="Shape 225"/>
+        <p:cNvPr id="1" name="Shape 229"/>
         <p:cNvGrpSpPr/>
         <p:nvPr/>
       </p:nvGrpSpPr>
@@ -16937,7 +17161,7 @@
       </p:grpSpPr>
       <p:sp>
         <p:nvSpPr>
-          <p:cNvPr id="226" name="Google Shape;226;p32"/>
+          <p:cNvPr id="230" name="Google Shape;230;p32"/>
           <p:cNvSpPr txBox="1">
             <a:spLocks noGrp="1"/>
           </p:cNvSpPr>
@@ -16979,7 +17203,7 @@
       </p:sp>
       <p:sp>
         <p:nvSpPr>
-          <p:cNvPr id="227" name="Google Shape;227;p32"/>
+          <p:cNvPr id="231" name="Google Shape;231;p32"/>
           <p:cNvSpPr txBox="1">
             <a:spLocks noGrp="1"/>
           </p:cNvSpPr>
@@ -17106,7 +17330,7 @@
                                           </p:stCondLst>
                                         </p:cTn>
                                         <p:tgtEl>
-                                          <p:spTgt spid="227">
+                                          <p:spTgt spid="231">
                                             <p:txEl>
                                               <p:pRg st="0" end="0"/>
                                             </p:txEl>
@@ -17155,7 +17379,7 @@
                                           </p:stCondLst>
                                         </p:cTn>
                                         <p:tgtEl>
-                                          <p:spTgt spid="227">
+                                          <p:spTgt spid="231">
                                             <p:txEl>
                                               <p:pRg st="1" end="1"/>
                                             </p:txEl>
@@ -17204,7 +17428,7 @@
                                           </p:stCondLst>
                                         </p:cTn>
                                         <p:tgtEl>
-                                          <p:spTgt spid="227">
+                                          <p:spTgt spid="231">
                                             <p:txEl>
                                               <p:pRg st="2" end="2"/>
                                             </p:txEl>
@@ -17253,7 +17477,7 @@
                                           </p:stCondLst>
                                         </p:cTn>
                                         <p:tgtEl>
-                                          <p:spTgt spid="227">
+                                          <p:spTgt spid="231">
                                             <p:txEl>
                                               <p:pRg st="3" end="3"/>
                                             </p:txEl>
@@ -17306,7 +17530,7 @@
   <p:cSld>
     <p:spTree>
       <p:nvGrpSpPr>
-        <p:cNvPr id="1" name="Shape 231"/>
+        <p:cNvPr id="1" name="Shape 235"/>
         <p:cNvGrpSpPr/>
         <p:nvPr/>
       </p:nvGrpSpPr>
@@ -17320,7 +17544,7 @@
       </p:grpSpPr>
       <p:sp>
         <p:nvSpPr>
-          <p:cNvPr id="232" name="Google Shape;232;p33"/>
+          <p:cNvPr id="236" name="Google Shape;236;p33"/>
           <p:cNvSpPr txBox="1">
             <a:spLocks noGrp="1"/>
           </p:cNvSpPr>
@@ -17362,7 +17586,7 @@
       </p:sp>
       <p:sp>
         <p:nvSpPr>
-          <p:cNvPr id="233" name="Google Shape;233;p33"/>
+          <p:cNvPr id="237" name="Google Shape;237;p33"/>
           <p:cNvSpPr txBox="1">
             <a:spLocks noGrp="1"/>
           </p:cNvSpPr>
@@ -17420,7 +17644,7 @@
       </p:sp>
       <p:pic>
         <p:nvPicPr>
-          <p:cNvPr id="234" name="Google Shape;234;p33"/>
+          <p:cNvPr id="238" name="Google Shape;238;p33"/>
           <p:cNvPicPr preferRelativeResize="0"/>
           <p:nvPr/>
         </p:nvPicPr>
@@ -17459,7 +17683,7 @@
   <p:cSld>
     <p:spTree>
       <p:nvGrpSpPr>
-        <p:cNvPr id="1" name="Shape 238"/>
+        <p:cNvPr id="1" name="Shape 242"/>
         <p:cNvGrpSpPr/>
         <p:nvPr/>
       </p:nvGrpSpPr>
@@ -17473,7 +17697,7 @@
       </p:grpSpPr>
       <p:sp>
         <p:nvSpPr>
-          <p:cNvPr id="239" name="Google Shape;239;p34"/>
+          <p:cNvPr id="243" name="Google Shape;243;p34"/>
           <p:cNvSpPr txBox="1">
             <a:spLocks noGrp="1"/>
           </p:cNvSpPr>
@@ -17515,7 +17739,7 @@
       </p:sp>
       <p:sp>
         <p:nvSpPr>
-          <p:cNvPr id="240" name="Google Shape;240;p34"/>
+          <p:cNvPr id="244" name="Google Shape;244;p34"/>
           <p:cNvSpPr txBox="1">
             <a:spLocks noGrp="1"/>
           </p:cNvSpPr>
@@ -17626,7 +17850,7 @@
                                           </p:stCondLst>
                                         </p:cTn>
                                         <p:tgtEl>
-                                          <p:spTgt spid="240">
+                                          <p:spTgt spid="244">
                                             <p:txEl>
                                               <p:pRg st="0" end="0"/>
                                             </p:txEl>
@@ -17675,7 +17899,7 @@
                                           </p:stCondLst>
                                         </p:cTn>
                                         <p:tgtEl>
-                                          <p:spTgt spid="240">
+                                          <p:spTgt spid="244">
                                             <p:txEl>
                                               <p:pRg st="1" end="1"/>
                                             </p:txEl>
@@ -17724,7 +17948,7 @@
                                           </p:stCondLst>
                                         </p:cTn>
                                         <p:tgtEl>
-                                          <p:spTgt spid="240">
+                                          <p:spTgt spid="244">
                                             <p:txEl>
                                               <p:pRg st="2" end="2"/>
                                             </p:txEl>
@@ -17777,7 +18001,7 @@
   <p:cSld>
     <p:spTree>
       <p:nvGrpSpPr>
-        <p:cNvPr id="1" name="Shape 244"/>
+        <p:cNvPr id="1" name="Shape 248"/>
         <p:cNvGrpSpPr/>
         <p:nvPr/>
       </p:nvGrpSpPr>
@@ -17791,7 +18015,7 @@
       </p:grpSpPr>
       <p:sp>
         <p:nvSpPr>
-          <p:cNvPr id="245" name="Google Shape;245;p35"/>
+          <p:cNvPr id="249" name="Google Shape;249;p35"/>
           <p:cNvSpPr txBox="1">
             <a:spLocks noGrp="1"/>
           </p:cNvSpPr>
@@ -17833,7 +18057,7 @@
       </p:sp>
       <p:sp>
         <p:nvSpPr>
-          <p:cNvPr id="246" name="Google Shape;246;p35"/>
+          <p:cNvPr id="250" name="Google Shape;250;p35"/>
           <p:cNvSpPr txBox="1">
             <a:spLocks noGrp="1"/>
           </p:cNvSpPr>
@@ -17960,7 +18184,7 @@
                                           </p:stCondLst>
                                         </p:cTn>
                                         <p:tgtEl>
-                                          <p:spTgt spid="246">
+                                          <p:spTgt spid="250">
                                             <p:txEl>
                                               <p:pRg st="0" end="0"/>
                                             </p:txEl>
@@ -18009,7 +18233,7 @@
                                           </p:stCondLst>
                                         </p:cTn>
                                         <p:tgtEl>
-                                          <p:spTgt spid="246">
+                                          <p:spTgt spid="250">
                                             <p:txEl>
                                               <p:pRg st="1" end="1"/>
                                             </p:txEl>
@@ -18058,7 +18282,7 @@
                                           </p:stCondLst>
                                         </p:cTn>
                                         <p:tgtEl>
-                                          <p:spTgt spid="246">
+                                          <p:spTgt spid="250">
                                             <p:txEl>
                                               <p:pRg st="2" end="2"/>
                                             </p:txEl>
@@ -18107,7 +18331,7 @@
                                           </p:stCondLst>
                                         </p:cTn>
                                         <p:tgtEl>
-                                          <p:spTgt spid="246">
+                                          <p:spTgt spid="250">
                                             <p:txEl>
                                               <p:pRg st="3" end="3"/>
                                             </p:txEl>
@@ -18160,7 +18384,7 @@
   <p:cSld>
     <p:spTree>
       <p:nvGrpSpPr>
-        <p:cNvPr id="1" name="Shape 250"/>
+        <p:cNvPr id="1" name="Shape 254"/>
         <p:cNvGrpSpPr/>
         <p:nvPr/>
       </p:nvGrpSpPr>
@@ -18174,7 +18398,7 @@
       </p:grpSpPr>
       <p:sp>
         <p:nvSpPr>
-          <p:cNvPr id="251" name="Google Shape;251;p36"/>
+          <p:cNvPr id="255" name="Google Shape;255;p36"/>
           <p:cNvSpPr txBox="1">
             <a:spLocks noGrp="1"/>
           </p:cNvSpPr>
@@ -18216,7 +18440,7 @@
       </p:sp>
       <p:sp>
         <p:nvSpPr>
-          <p:cNvPr id="252" name="Google Shape;252;p36"/>
+          <p:cNvPr id="256" name="Google Shape;256;p36"/>
           <p:cNvSpPr txBox="1">
             <a:spLocks noGrp="1"/>
           </p:cNvSpPr>
@@ -18314,7 +18538,7 @@
       </p:sp>
       <p:pic>
         <p:nvPicPr>
-          <p:cNvPr id="253" name="Google Shape;253;p36" descr="{&quot;mathml&quot;:&quot;&lt;math style=\&quot;font-family:stix;font-size:16px;\&quot; xmlns=\&quot;http://www.w3.org/1998/Math/MathML\&quot;&gt;&lt;mstyle mathsize=\&quot;16px\&quot;&gt;&lt;mi&gt;log&lt;/mi&gt;&lt;mfenced&gt;&lt;mrow&gt;&lt;mi&gt;O&lt;/mi&gt;&lt;mi&gt;R&lt;/mi&gt;&lt;/mrow&gt;&lt;/mfenced&gt;&lt;mo&gt;&amp;#x2009;&lt;/mo&gt;&lt;mo&gt;=&lt;/mo&gt;&lt;mo&gt;&amp;#x2009;&lt;/mo&gt;&lt;mi&gt;log&lt;/mi&gt;&lt;mfenced&gt;&lt;mfrac&gt;&lt;mi&gt;p&lt;/mi&gt;&lt;mrow&gt;&lt;mn&gt;1&lt;/mn&gt;&lt;mo&gt;-&lt;/mo&gt;&lt;mi&gt;p&lt;/mi&gt;&lt;/mrow&gt;&lt;/mfrac&gt;&lt;/mfenced&gt;&lt;mo&gt;&amp;#xA0;&lt;/mo&gt;&lt;mo&gt;=&lt;/mo&gt;&lt;mo&gt;&amp;#x2009;&lt;/mo&gt;&lt;msub&gt;&lt;mi&gt;&amp;#x3B2;&lt;/mi&gt;&lt;mn&gt;0&lt;/mn&gt;&lt;/msub&gt;&lt;mo&gt;+&lt;/mo&gt;&lt;msub&gt;&lt;mi&gt;&amp;#x3B2;&lt;/mi&gt;&lt;mn&gt;1&lt;/mn&gt;&lt;/msub&gt;&lt;msub&gt;&lt;mi&gt;X&lt;/mi&gt;&lt;mn&gt;1&lt;/mn&gt;&lt;/msub&gt;&lt;mo&gt;+&lt;/mo&gt;&lt;mo&gt;.&lt;/mo&gt;&lt;mo&gt;.&lt;/mo&gt;&lt;mo&gt;.&lt;/mo&gt;&lt;mo&gt;+&lt;/mo&gt;&lt;msub&gt;&lt;mi&gt;&amp;#x3B2;&lt;/mi&gt;&lt;mi&gt;k&lt;/mi&gt;&lt;/msub&gt;&lt;msub&gt;&lt;mi&gt;X&lt;/mi&gt;&lt;mi&gt;k&lt;/mi&gt;&lt;/msub&gt;&lt;/mstyle&gt;&lt;/math&gt;&quot;,&quot;truncated&quot;:false}" title="log open parentheses O R close parentheses thin space equals thin space log open parentheses fraction numerator p over denominator 1 minus p end fraction close parentheses space equals thin space beta subscript 0 plus beta subscript 1 X subscript 1 plus... plus beta subscript k X subscript k"/>
+          <p:cNvPr id="257" name="Google Shape;257;p36" descr="{&quot;mathml&quot;:&quot;&lt;math style=\&quot;font-family:stix;font-size:16px;\&quot; xmlns=\&quot;http://www.w3.org/1998/Math/MathML\&quot;&gt;&lt;mstyle mathsize=\&quot;16px\&quot;&gt;&lt;mi&gt;log&lt;/mi&gt;&lt;mfenced&gt;&lt;mrow&gt;&lt;mi&gt;O&lt;/mi&gt;&lt;mi&gt;R&lt;/mi&gt;&lt;/mrow&gt;&lt;/mfenced&gt;&lt;mo&gt;&amp;#x2009;&lt;/mo&gt;&lt;mo&gt;=&lt;/mo&gt;&lt;mo&gt;&amp;#x2009;&lt;/mo&gt;&lt;mi&gt;log&lt;/mi&gt;&lt;mfenced&gt;&lt;mfrac&gt;&lt;mi&gt;p&lt;/mi&gt;&lt;mrow&gt;&lt;mn&gt;1&lt;/mn&gt;&lt;mo&gt;-&lt;/mo&gt;&lt;mi&gt;p&lt;/mi&gt;&lt;/mrow&gt;&lt;/mfrac&gt;&lt;/mfenced&gt;&lt;mo&gt;&amp;#xA0;&lt;/mo&gt;&lt;mo&gt;=&lt;/mo&gt;&lt;mo&gt;&amp;#x2009;&lt;/mo&gt;&lt;msub&gt;&lt;mi&gt;&amp;#x3B2;&lt;/mi&gt;&lt;mn&gt;0&lt;/mn&gt;&lt;/msub&gt;&lt;mo&gt;+&lt;/mo&gt;&lt;msub&gt;&lt;mi&gt;&amp;#x3B2;&lt;/mi&gt;&lt;mn&gt;1&lt;/mn&gt;&lt;/msub&gt;&lt;msub&gt;&lt;mi&gt;X&lt;/mi&gt;&lt;mn&gt;1&lt;/mn&gt;&lt;/msub&gt;&lt;mo&gt;+&lt;/mo&gt;&lt;mo&gt;.&lt;/mo&gt;&lt;mo&gt;.&lt;/mo&gt;&lt;mo&gt;.&lt;/mo&gt;&lt;mo&gt;+&lt;/mo&gt;&lt;msub&gt;&lt;mi&gt;&amp;#x3B2;&lt;/mi&gt;&lt;mi&gt;k&lt;/mi&gt;&lt;/msub&gt;&lt;msub&gt;&lt;mi&gt;X&lt;/mi&gt;&lt;mi&gt;k&lt;/mi&gt;&lt;/msub&gt;&lt;/mstyle&gt;&lt;/math&gt;&quot;,&quot;truncated&quot;:false}" title="log open parentheses O R close parentheses thin space equals thin space log open parentheses fraction numerator p over denominator 1 minus p end fraction close parentheses space equals thin space beta subscript 0 plus beta subscript 1 X subscript 1 plus... plus beta subscript k X subscript k"/>
           <p:cNvPicPr preferRelativeResize="0"/>
           <p:nvPr/>
         </p:nvPicPr>
@@ -18342,7 +18566,7 @@
       </p:pic>
       <p:pic>
         <p:nvPicPr>
-          <p:cNvPr id="254" name="Google Shape;254;p36" descr="{&quot;mathml&quot;:&quot;&lt;math style=\&quot;font-family:stix;font-size:16px;\&quot; xmlns=\&quot;http://www.w3.org/1998/Math/MathML\&quot;&gt;&lt;mstyle mathsize=\&quot;16px\&quot;&gt;&lt;mi&gt;p&lt;/mi&gt;&lt;mfenced&gt;&lt;mi&gt;x&lt;/mi&gt;&lt;/mfenced&gt;&lt;mo&gt;&amp;#x2009;&lt;/mo&gt;&lt;mo&gt;=&lt;/mo&gt;&lt;mo&gt;&amp;#x2009;&lt;/mo&gt;&lt;mfrac&gt;&lt;msup&gt;&lt;mi&gt;e&lt;/mi&gt;&lt;mi&gt;x&lt;/mi&gt;&lt;/msup&gt;&lt;mrow&gt;&lt;mn&gt;1&lt;/mn&gt;&lt;mo&gt;+&lt;/mo&gt;&lt;msup&gt;&lt;mi&gt;e&lt;/mi&gt;&lt;mi&gt;x&lt;/mi&gt;&lt;/msup&gt;&lt;/mrow&gt;&lt;/mfrac&gt;&lt;/mstyle&gt;&lt;/math&gt;&quot;,&quot;truncated&quot;:false}" title="p open parentheses x close parentheses thin space equals thin space fraction numerator e to the power of x over denominator 1 plus e to the power of x end fraction"/>
+          <p:cNvPr id="258" name="Google Shape;258;p36" descr="{&quot;mathml&quot;:&quot;&lt;math style=\&quot;font-family:stix;font-size:16px;\&quot; xmlns=\&quot;http://www.w3.org/1998/Math/MathML\&quot;&gt;&lt;mstyle mathsize=\&quot;16px\&quot;&gt;&lt;mi&gt;p&lt;/mi&gt;&lt;mfenced&gt;&lt;mi&gt;x&lt;/mi&gt;&lt;/mfenced&gt;&lt;mo&gt;&amp;#x2009;&lt;/mo&gt;&lt;mo&gt;=&lt;/mo&gt;&lt;mo&gt;&amp;#x2009;&lt;/mo&gt;&lt;mfrac&gt;&lt;msup&gt;&lt;mi&gt;e&lt;/mi&gt;&lt;mi&gt;x&lt;/mi&gt;&lt;/msup&gt;&lt;mrow&gt;&lt;mn&gt;1&lt;/mn&gt;&lt;mo&gt;+&lt;/mo&gt;&lt;msup&gt;&lt;mi&gt;e&lt;/mi&gt;&lt;mi&gt;x&lt;/mi&gt;&lt;/msup&gt;&lt;/mrow&gt;&lt;/mfrac&gt;&lt;/mstyle&gt;&lt;/math&gt;&quot;,&quot;truncated&quot;:false}" title="p open parentheses x close parentheses thin space equals thin space fraction numerator e to the power of x over denominator 1 plus e to the power of x end fraction"/>
           <p:cNvPicPr preferRelativeResize="0"/>
           <p:nvPr/>
         </p:nvPicPr>
@@ -18381,7 +18605,7 @@
   <p:cSld>
     <p:spTree>
       <p:nvGrpSpPr>
-        <p:cNvPr id="1" name="Shape 258"/>
+        <p:cNvPr id="1" name="Shape 262"/>
         <p:cNvGrpSpPr/>
         <p:nvPr/>
       </p:nvGrpSpPr>
@@ -18395,7 +18619,7 @@
       </p:grpSpPr>
       <p:sp>
         <p:nvSpPr>
-          <p:cNvPr id="259" name="Google Shape;259;p37"/>
+          <p:cNvPr id="263" name="Google Shape;263;p37"/>
           <p:cNvSpPr txBox="1">
             <a:spLocks noGrp="1"/>
           </p:cNvSpPr>
@@ -18437,7 +18661,7 @@
       </p:sp>
       <p:pic>
         <p:nvPicPr>
-          <p:cNvPr id="260" name="Google Shape;260;p37" descr="{&quot;mathml&quot;:&quot;&lt;math style=\&quot;font-family:stix;font-size:16px;\&quot; xmlns=\&quot;http://www.w3.org/1998/Math/MathML\&quot;&gt;&lt;mstyle mathsize=\&quot;16px\&quot;&gt;&lt;mi&gt;p&lt;/mi&gt;&lt;mfenced&gt;&lt;mi&gt;x&lt;/mi&gt;&lt;/mfenced&gt;&lt;mo&gt;&amp;#x2009;&lt;/mo&gt;&lt;mo&gt;=&lt;/mo&gt;&lt;mo&gt;&amp;#x2009;&lt;/mo&gt;&lt;mfrac&gt;&lt;msup&gt;&lt;mi&gt;e&lt;/mi&gt;&lt;mi&gt;x&lt;/mi&gt;&lt;/msup&gt;&lt;mrow&gt;&lt;mn&gt;1&lt;/mn&gt;&lt;mo&gt;+&lt;/mo&gt;&lt;msup&gt;&lt;mi&gt;e&lt;/mi&gt;&lt;mi&gt;x&lt;/mi&gt;&lt;/msup&gt;&lt;/mrow&gt;&lt;/mfrac&gt;&lt;mo&gt;,&lt;/mo&gt;&lt;mo&gt;&amp;#xA0;&lt;/mo&gt;&lt;mi&gt;p&lt;/mi&gt;&lt;mfenced&gt;&lt;mrow&gt;&lt;mi&gt;log&lt;/mi&gt;&lt;mfenced&gt;&lt;mfrac&gt;&lt;mi&gt;p&lt;/mi&gt;&lt;mrow&gt;&lt;mn&gt;1&lt;/mn&gt;&lt;mo&gt;-&lt;/mo&gt;&lt;mi&gt;p&lt;/mi&gt;&lt;/mrow&gt;&lt;/mfrac&gt;&lt;/mfenced&gt;&lt;/mrow&gt;&lt;/mfenced&gt;&lt;mo&gt;&amp;#x2009;&lt;/mo&gt;&lt;mo&gt;=&lt;/mo&gt;&lt;mo&gt;&amp;#x2009;&lt;/mo&gt;&lt;mfrac&gt;&lt;msup&gt;&lt;mi&gt;e&lt;/mi&gt;&lt;mrow&gt;&lt;mi&gt;log&lt;/mi&gt;&lt;mfenced&gt;&lt;mstyle displaystyle=\&quot;true\&quot;&gt;&lt;mfrac&gt;&lt;mi&gt;p&lt;/mi&gt;&lt;mrow&gt;&lt;mn&gt;1&lt;/mn&gt;&lt;mo&gt;-&lt;/mo&gt;&lt;mi&gt;p&lt;/mi&gt;&lt;/mrow&gt;&lt;/mfrac&gt;&lt;/mstyle&gt;&lt;/mfenced&gt;&lt;/mrow&gt;&lt;/msup&gt;&lt;mrow&gt;&lt;mn&gt;1&lt;/mn&gt;&lt;mo&gt;+&lt;/mo&gt;&lt;msup&gt;&lt;mi&gt;e&lt;/mi&gt;&lt;mrow&gt;&lt;mi&gt;log&lt;/mi&gt;&lt;mfenced&gt;&lt;mfrac&gt;&lt;mi&gt;p&lt;/mi&gt;&lt;mrow&gt;&lt;mn&gt;1&lt;/mn&gt;&lt;mo&gt;-&lt;/mo&gt;&lt;mi&gt;p&lt;/mi&gt;&lt;/mrow&gt;&lt;/mfrac&gt;&lt;/mfenced&gt;&lt;/mrow&gt;&lt;/msup&gt;&lt;/mrow&gt;&lt;/mfrac&gt;&lt;mo&gt;&amp;#xA0;&lt;/mo&gt;&lt;mo&gt;=&lt;/mo&gt;&lt;mo&gt;&amp;#x2009;&lt;/mo&gt;&lt;mspace linebreak=\&quot;newline\&quot;/&gt;&lt;mfrac&gt;&lt;mstyle displaystyle=\&quot;true\&quot;&gt;&lt;mfrac&gt;&lt;mi&gt;p&lt;/mi&gt;&lt;mrow&gt;&lt;mn&gt;1&lt;/mn&gt;&lt;mo&gt;-&lt;/mo&gt;&lt;mi&gt;p&lt;/mi&gt;&lt;/mrow&gt;&lt;/mfrac&gt;&lt;/mstyle&gt;&lt;mrow&gt;&lt;mn&gt;1&lt;/mn&gt;&lt;mo&gt;+&lt;/mo&gt;&lt;mstyle displaystyle=\&quot;true\&quot;&gt;&lt;mfrac&gt;&lt;mi&gt;p&lt;/mi&gt;&lt;mrow&gt;&lt;mn&gt;1&lt;/mn&gt;&lt;mo&gt;-&lt;/mo&gt;&lt;mi&gt;p&lt;/mi&gt;&lt;/mrow&gt;&lt;/mfrac&gt;&lt;/mstyle&gt;&lt;/mrow&gt;&lt;/mfrac&gt;&lt;mo&gt;=&lt;/mo&gt;&lt;mo&gt;&amp;#xA0;&lt;/mo&gt;&lt;mfrac&gt;&lt;mstyle displaystyle=\&quot;true\&quot;&gt;&lt;mfrac&gt;&lt;mi&gt;p&lt;/mi&gt;&lt;mrow&gt;&lt;mn&gt;1&lt;/mn&gt;&lt;mo&gt;-&lt;/mo&gt;&lt;mi&gt;p&lt;/mi&gt;&lt;/mrow&gt;&lt;/mfrac&gt;&lt;/mstyle&gt;&lt;mrow&gt;&lt;mstyle displaystyle=\&quot;true\&quot;&gt;&lt;mfrac&gt;&lt;mrow&gt;&lt;mn&gt;1&lt;/mn&gt;&lt;mo&gt;-&lt;/mo&gt;&lt;mi&gt;p&lt;/mi&gt;&lt;/mrow&gt;&lt;mrow&gt;&lt;mn&gt;1&lt;/mn&gt;&lt;mo&gt;-&lt;/mo&gt;&lt;mi&gt;p&lt;/mi&gt;&lt;/mrow&gt;&lt;/mfrac&gt;&lt;/mstyle&gt;&lt;mo&gt;+&lt;/mo&gt;&lt;mstyle displaystyle=\&quot;true\&quot;&gt;&lt;mfrac&gt;&lt;mi&gt;p&lt;/mi&gt;&lt;mrow&gt;&lt;mn&gt;1&lt;/mn&gt;&lt;mo&gt;-&lt;/mo&gt;&lt;mi&gt;p&lt;/mi&gt;&lt;/mrow&gt;&lt;/mfrac&gt;&lt;/mstyle&gt;&lt;/mrow&gt;&lt;/mfrac&gt;&lt;mo&gt;&amp;#x2009;&lt;/mo&gt;&lt;mo&gt;=&lt;/mo&gt;&lt;mo&gt;&amp;#x2009;&lt;/mo&gt;&lt;mfrac&gt;&lt;mstyle displaystyle=\&quot;true\&quot;&gt;&lt;mfrac&gt;&lt;mi&gt;p&lt;/mi&gt;&lt;mrow&gt;&lt;mn&gt;1&lt;/mn&gt;&lt;mo&gt;-&lt;/mo&gt;&lt;mi&gt;p&lt;/mi&gt;&lt;/mrow&gt;&lt;/mfrac&gt;&lt;/mstyle&gt;&lt;mstyle displaystyle=\&quot;true\&quot;&gt;&lt;mfrac&gt;&lt;mn&gt;1&lt;/mn&gt;&lt;mrow&gt;&lt;mn&gt;1&lt;/mn&gt;&lt;mo&gt;-&lt;/mo&gt;&lt;mi&gt;p&lt;/mi&gt;&lt;/mrow&gt;&lt;/mfrac&gt;&lt;/mstyle&gt;&lt;/mfrac&gt;&lt;mo&gt;&amp;#x2009;&lt;/mo&gt;&lt;mo&gt;=&lt;/mo&gt;&lt;mo&gt;&amp;#x2009;&lt;/mo&gt;&lt;mfrac&gt;&lt;mrow&gt;&lt;mi&gt;p&lt;/mi&gt;&lt;mfenced&gt;&lt;mrow&gt;&lt;mn&gt;1&lt;/mn&gt;&lt;mo&gt;-&lt;/mo&gt;&lt;mi&gt;p&lt;/mi&gt;&lt;/mrow&gt;&lt;/mfenced&gt;&lt;/mrow&gt;&lt;mrow&gt;&lt;mn&gt;1&lt;/mn&gt;&lt;mfenced&gt;&lt;mrow&gt;&lt;mn&gt;1&lt;/mn&gt;&lt;mo&gt;-&lt;/mo&gt;&lt;mi&gt;p&lt;/mi&gt;&lt;/mrow&gt;&lt;/mfenced&gt;&lt;/mrow&gt;&lt;/mfrac&gt;&lt;mo&gt;&amp;#x2009;&lt;/mo&gt;&lt;mo&gt;=&lt;/mo&gt;&lt;mo&gt;&amp;#xA0;&lt;/mo&gt;&lt;mi&gt;p&lt;/mi&gt;&lt;/mstyle&gt;&lt;/math&gt;&quot;,&quot;truncated&quot;:false}" title="p open parentheses x close parentheses thin space equals thin space fraction numerator e to the power of x over denominator 1 plus e to the power of x end fraction comma space p open parentheses log open parentheses fraction numerator p over denominator 1 minus p end fraction close parentheses close parentheses thin space equals thin space fraction numerator e to the power of log open parentheses fraction numerator p over denominator 1 minus p end fraction close parentheses end exponent over denominator 1 plus e to the power of log open parentheses fraction numerator p over denominator 1 minus p end fraction close parentheses end exponent end fraction space equals thin space&#10;fraction numerator fraction numerator p over denominator 1 minus p end fraction over denominator 1 plus fraction numerator p over denominator 1 minus p end fraction end fraction equals space fraction numerator fraction numerator p over denominator 1 minus p end fraction over denominator fraction numerator 1 minus p over denominator 1 minus p end fraction plus fraction numerator p over denominator 1 minus p end fraction end fraction thin space equals thin space fraction numerator fraction numerator p over denominator 1 minus p end fraction over denominator fraction numerator 1 over denominator 1 minus p end fraction end fraction thin space equals thin space fraction numerator p open parentheses 1 minus p close parentheses over denominator 1 open parentheses 1 minus p close parentheses end fraction thin space equals space p"/>
+          <p:cNvPr id="264" name="Google Shape;264;p37" descr="{&quot;mathml&quot;:&quot;&lt;math style=\&quot;font-family:stix;font-size:16px;\&quot; xmlns=\&quot;http://www.w3.org/1998/Math/MathML\&quot;&gt;&lt;mstyle mathsize=\&quot;16px\&quot;&gt;&lt;mi&gt;p&lt;/mi&gt;&lt;mfenced&gt;&lt;mi&gt;x&lt;/mi&gt;&lt;/mfenced&gt;&lt;mo&gt;&amp;#x2009;&lt;/mo&gt;&lt;mo&gt;=&lt;/mo&gt;&lt;mo&gt;&amp;#x2009;&lt;/mo&gt;&lt;mfrac&gt;&lt;msup&gt;&lt;mi&gt;e&lt;/mi&gt;&lt;mi&gt;x&lt;/mi&gt;&lt;/msup&gt;&lt;mrow&gt;&lt;mn&gt;1&lt;/mn&gt;&lt;mo&gt;+&lt;/mo&gt;&lt;msup&gt;&lt;mi&gt;e&lt;/mi&gt;&lt;mi&gt;x&lt;/mi&gt;&lt;/msup&gt;&lt;/mrow&gt;&lt;/mfrac&gt;&lt;mo&gt;,&lt;/mo&gt;&lt;mo&gt;&amp;#xA0;&lt;/mo&gt;&lt;mi&gt;p&lt;/mi&gt;&lt;mfenced&gt;&lt;mrow&gt;&lt;mi&gt;log&lt;/mi&gt;&lt;mfenced&gt;&lt;mfrac&gt;&lt;mi&gt;p&lt;/mi&gt;&lt;mrow&gt;&lt;mn&gt;1&lt;/mn&gt;&lt;mo&gt;-&lt;/mo&gt;&lt;mi&gt;p&lt;/mi&gt;&lt;/mrow&gt;&lt;/mfrac&gt;&lt;/mfenced&gt;&lt;/mrow&gt;&lt;/mfenced&gt;&lt;mo&gt;&amp;#x2009;&lt;/mo&gt;&lt;mo&gt;=&lt;/mo&gt;&lt;mo&gt;&amp;#x2009;&lt;/mo&gt;&lt;mfrac&gt;&lt;msup&gt;&lt;mi&gt;e&lt;/mi&gt;&lt;mrow&gt;&lt;mi&gt;log&lt;/mi&gt;&lt;mfenced&gt;&lt;mstyle displaystyle=\&quot;true\&quot;&gt;&lt;mfrac&gt;&lt;mi&gt;p&lt;/mi&gt;&lt;mrow&gt;&lt;mn&gt;1&lt;/mn&gt;&lt;mo&gt;-&lt;/mo&gt;&lt;mi&gt;p&lt;/mi&gt;&lt;/mrow&gt;&lt;/mfrac&gt;&lt;/mstyle&gt;&lt;/mfenced&gt;&lt;/mrow&gt;&lt;/msup&gt;&lt;mrow&gt;&lt;mn&gt;1&lt;/mn&gt;&lt;mo&gt;+&lt;/mo&gt;&lt;msup&gt;&lt;mi&gt;e&lt;/mi&gt;&lt;mrow&gt;&lt;mi&gt;log&lt;/mi&gt;&lt;mfenced&gt;&lt;mfrac&gt;&lt;mi&gt;p&lt;/mi&gt;&lt;mrow&gt;&lt;mn&gt;1&lt;/mn&gt;&lt;mo&gt;-&lt;/mo&gt;&lt;mi&gt;p&lt;/mi&gt;&lt;/mrow&gt;&lt;/mfrac&gt;&lt;/mfenced&gt;&lt;/mrow&gt;&lt;/msup&gt;&lt;/mrow&gt;&lt;/mfrac&gt;&lt;mo&gt;&amp;#xA0;&lt;/mo&gt;&lt;mo&gt;=&lt;/mo&gt;&lt;mo&gt;&amp;#x2009;&lt;/mo&gt;&lt;mspace linebreak=\&quot;newline\&quot;/&gt;&lt;mfrac&gt;&lt;mstyle displaystyle=\&quot;true\&quot;&gt;&lt;mfrac&gt;&lt;mi&gt;p&lt;/mi&gt;&lt;mrow&gt;&lt;mn&gt;1&lt;/mn&gt;&lt;mo&gt;-&lt;/mo&gt;&lt;mi&gt;p&lt;/mi&gt;&lt;/mrow&gt;&lt;/mfrac&gt;&lt;/mstyle&gt;&lt;mrow&gt;&lt;mn&gt;1&lt;/mn&gt;&lt;mo&gt;+&lt;/mo&gt;&lt;mstyle displaystyle=\&quot;true\&quot;&gt;&lt;mfrac&gt;&lt;mi&gt;p&lt;/mi&gt;&lt;mrow&gt;&lt;mn&gt;1&lt;/mn&gt;&lt;mo&gt;-&lt;/mo&gt;&lt;mi&gt;p&lt;/mi&gt;&lt;/mrow&gt;&lt;/mfrac&gt;&lt;/mstyle&gt;&lt;/mrow&gt;&lt;/mfrac&gt;&lt;mo&gt;=&lt;/mo&gt;&lt;mo&gt;&amp;#xA0;&lt;/mo&gt;&lt;mfrac&gt;&lt;mstyle displaystyle=\&quot;true\&quot;&gt;&lt;mfrac&gt;&lt;mi&gt;p&lt;/mi&gt;&lt;mrow&gt;&lt;mn&gt;1&lt;/mn&gt;&lt;mo&gt;-&lt;/mo&gt;&lt;mi&gt;p&lt;/mi&gt;&lt;/mrow&gt;&lt;/mfrac&gt;&lt;/mstyle&gt;&lt;mrow&gt;&lt;mstyle displaystyle=\&quot;true\&quot;&gt;&lt;mfrac&gt;&lt;mrow&gt;&lt;mn&gt;1&lt;/mn&gt;&lt;mo&gt;-&lt;/mo&gt;&lt;mi&gt;p&lt;/mi&gt;&lt;/mrow&gt;&lt;mrow&gt;&lt;mn&gt;1&lt;/mn&gt;&lt;mo&gt;-&lt;/mo&gt;&lt;mi&gt;p&lt;/mi&gt;&lt;/mrow&gt;&lt;/mfrac&gt;&lt;/mstyle&gt;&lt;mo&gt;+&lt;/mo&gt;&lt;mstyle displaystyle=\&quot;true\&quot;&gt;&lt;mfrac&gt;&lt;mi&gt;p&lt;/mi&gt;&lt;mrow&gt;&lt;mn&gt;1&lt;/mn&gt;&lt;mo&gt;-&lt;/mo&gt;&lt;mi&gt;p&lt;/mi&gt;&lt;/mrow&gt;&lt;/mfrac&gt;&lt;/mstyle&gt;&lt;/mrow&gt;&lt;/mfrac&gt;&lt;mo&gt;&amp;#x2009;&lt;/mo&gt;&lt;mo&gt;=&lt;/mo&gt;&lt;mo&gt;&amp;#x2009;&lt;/mo&gt;&lt;mfrac&gt;&lt;mstyle displaystyle=\&quot;true\&quot;&gt;&lt;mfrac&gt;&lt;mi&gt;p&lt;/mi&gt;&lt;mrow&gt;&lt;mn&gt;1&lt;/mn&gt;&lt;mo&gt;-&lt;/mo&gt;&lt;mi&gt;p&lt;/mi&gt;&lt;/mrow&gt;&lt;/mfrac&gt;&lt;/mstyle&gt;&lt;mstyle displaystyle=\&quot;true\&quot;&gt;&lt;mfrac&gt;&lt;mn&gt;1&lt;/mn&gt;&lt;mrow&gt;&lt;mn&gt;1&lt;/mn&gt;&lt;mo&gt;-&lt;/mo&gt;&lt;mi&gt;p&lt;/mi&gt;&lt;/mrow&gt;&lt;/mfrac&gt;&lt;/mstyle&gt;&lt;/mfrac&gt;&lt;mo&gt;&amp;#x2009;&lt;/mo&gt;&lt;mo&gt;=&lt;/mo&gt;&lt;mo&gt;&amp;#x2009;&lt;/mo&gt;&lt;mfrac&gt;&lt;mrow&gt;&lt;mi&gt;p&lt;/mi&gt;&lt;mfenced&gt;&lt;mrow&gt;&lt;mn&gt;1&lt;/mn&gt;&lt;mo&gt;-&lt;/mo&gt;&lt;mi&gt;p&lt;/mi&gt;&lt;/mrow&gt;&lt;/mfenced&gt;&lt;/mrow&gt;&lt;mrow&gt;&lt;mn&gt;1&lt;/mn&gt;&lt;mfenced&gt;&lt;mrow&gt;&lt;mn&gt;1&lt;/mn&gt;&lt;mo&gt;-&lt;/mo&gt;&lt;mi&gt;p&lt;/mi&gt;&lt;/mrow&gt;&lt;/mfenced&gt;&lt;/mrow&gt;&lt;/mfrac&gt;&lt;mo&gt;&amp;#x2009;&lt;/mo&gt;&lt;mo&gt;=&lt;/mo&gt;&lt;mo&gt;&amp;#xA0;&lt;/mo&gt;&lt;mi&gt;p&lt;/mi&gt;&lt;/mstyle&gt;&lt;/math&gt;&quot;,&quot;truncated&quot;:false}" title="p open parentheses x close parentheses thin space equals thin space fraction numerator e to the power of x over denominator 1 plus e to the power of x end fraction comma space p open parentheses log open parentheses fraction numerator p over denominator 1 minus p end fraction close parentheses close parentheses thin space equals thin space fraction numerator e to the power of log open parentheses fraction numerator p over denominator 1 minus p end fraction close parentheses end exponent over denominator 1 plus e to the power of log open parentheses fraction numerator p over denominator 1 minus p end fraction close parentheses end exponent end fraction space equals thin space&#10;fraction numerator fraction numerator p over denominator 1 minus p end fraction over denominator 1 plus fraction numerator p over denominator 1 minus p end fraction end fraction equals space fraction numerator fraction numerator p over denominator 1 minus p end fraction over denominator fraction numerator 1 minus p over denominator 1 minus p end fraction plus fraction numerator p over denominator 1 minus p end fraction end fraction thin space equals thin space fraction numerator fraction numerator p over denominator 1 minus p end fraction over denominator fraction numerator 1 over denominator 1 minus p end fraction end fraction thin space equals thin space fraction numerator p open parentheses 1 minus p close parentheses over denominator 1 open parentheses 1 minus p close parentheses end fraction thin space equals space p"/>
           <p:cNvPicPr preferRelativeResize="0"/>
           <p:nvPr/>
         </p:nvPicPr>
@@ -18476,7 +18700,7 @@
   <p:cSld>
     <p:spTree>
       <p:nvGrpSpPr>
-        <p:cNvPr id="1" name="Shape 264"/>
+        <p:cNvPr id="1" name="Shape 268"/>
         <p:cNvGrpSpPr/>
         <p:nvPr/>
       </p:nvGrpSpPr>
@@ -18490,7 +18714,7 @@
       </p:grpSpPr>
       <p:sp>
         <p:nvSpPr>
-          <p:cNvPr id="265" name="Google Shape;265;p38"/>
+          <p:cNvPr id="269" name="Google Shape;269;p38"/>
           <p:cNvSpPr txBox="1">
             <a:spLocks noGrp="1"/>
           </p:cNvSpPr>
@@ -18532,7 +18756,7 @@
       </p:sp>
       <p:sp>
         <p:nvSpPr>
-          <p:cNvPr id="266" name="Google Shape;266;p38"/>
+          <p:cNvPr id="270" name="Google Shape;270;p38"/>
           <p:cNvSpPr txBox="1">
             <a:spLocks noGrp="1"/>
           </p:cNvSpPr>
@@ -18634,7 +18858,7 @@
       </p:sp>
       <p:pic>
         <p:nvPicPr>
-          <p:cNvPr id="267" name="Google Shape;267;p38" descr="{&quot;mathml&quot;:&quot;&lt;math style=\&quot;font-family:stix;font-size:16px;\&quot; xmlns=\&quot;http://www.w3.org/1998/Math/MathML\&quot;&gt;&lt;mstyle mathsize=\&quot;16px\&quot;&gt;&lt;mi&gt;log&lt;/mi&gt;&lt;mfenced&gt;&lt;mrow&gt;&lt;mi&gt;O&lt;/mi&gt;&lt;mi&gt;R&lt;/mi&gt;&lt;/mrow&gt;&lt;/mfenced&gt;&lt;mo&gt;&amp;#x2009;&lt;/mo&gt;&lt;mo&gt;=&lt;/mo&gt;&lt;mo&gt;&amp;#x2009;&lt;/mo&gt;&lt;mi&gt;log&lt;/mi&gt;&lt;mfenced&gt;&lt;mfrac&gt;&lt;mi&gt;p&lt;/mi&gt;&lt;mrow&gt;&lt;mn&gt;1&lt;/mn&gt;&lt;mo&gt;-&lt;/mo&gt;&lt;mi&gt;p&lt;/mi&gt;&lt;/mrow&gt;&lt;/mfrac&gt;&lt;/mfenced&gt;&lt;mo&gt;&amp;#xA0;&lt;/mo&gt;&lt;mo&gt;=&lt;/mo&gt;&lt;mo&gt;&amp;#x2009;&lt;/mo&gt;&lt;msub&gt;&lt;mi&gt;&amp;#x3B2;&lt;/mi&gt;&lt;mn&gt;0&lt;/mn&gt;&lt;/msub&gt;&lt;mo&gt;+&lt;/mo&gt;&lt;msub&gt;&lt;mi&gt;&amp;#x3B2;&lt;/mi&gt;&lt;mn&gt;1&lt;/mn&gt;&lt;/msub&gt;&lt;msub&gt;&lt;mi&gt;X&lt;/mi&gt;&lt;mn&gt;1&lt;/mn&gt;&lt;/msub&gt;&lt;mo&gt;+&lt;/mo&gt;&lt;mo&gt;.&lt;/mo&gt;&lt;mo&gt;.&lt;/mo&gt;&lt;mo&gt;.&lt;/mo&gt;&lt;mo&gt;+&lt;/mo&gt;&lt;msub&gt;&lt;mi&gt;&amp;#x3B2;&lt;/mi&gt;&lt;mi&gt;k&lt;/mi&gt;&lt;/msub&gt;&lt;msub&gt;&lt;mi&gt;X&lt;/mi&gt;&lt;mi&gt;k&lt;/mi&gt;&lt;/msub&gt;&lt;/mstyle&gt;&lt;/math&gt;&quot;,&quot;truncated&quot;:false}" title="log open parentheses O R close parentheses thin space equals thin space log open parentheses fraction numerator p over denominator 1 minus p end fraction close parentheses space equals thin space beta subscript 0 plus beta subscript 1 X subscript 1 plus... plus beta subscript k X subscript k"/>
+          <p:cNvPr id="271" name="Google Shape;271;p38" descr="{&quot;mathml&quot;:&quot;&lt;math style=\&quot;font-family:stix;font-size:16px;\&quot; xmlns=\&quot;http://www.w3.org/1998/Math/MathML\&quot;&gt;&lt;mstyle mathsize=\&quot;16px\&quot;&gt;&lt;mi&gt;log&lt;/mi&gt;&lt;mfenced&gt;&lt;mrow&gt;&lt;mi&gt;O&lt;/mi&gt;&lt;mi&gt;R&lt;/mi&gt;&lt;/mrow&gt;&lt;/mfenced&gt;&lt;mo&gt;&amp;#x2009;&lt;/mo&gt;&lt;mo&gt;=&lt;/mo&gt;&lt;mo&gt;&amp;#x2009;&lt;/mo&gt;&lt;mi&gt;log&lt;/mi&gt;&lt;mfenced&gt;&lt;mfrac&gt;&lt;mi&gt;p&lt;/mi&gt;&lt;mrow&gt;&lt;mn&gt;1&lt;/mn&gt;&lt;mo&gt;-&lt;/mo&gt;&lt;mi&gt;p&lt;/mi&gt;&lt;/mrow&gt;&lt;/mfrac&gt;&lt;/mfenced&gt;&lt;mo&gt;&amp;#xA0;&lt;/mo&gt;&lt;mo&gt;=&lt;/mo&gt;&lt;mo&gt;&amp;#x2009;&lt;/mo&gt;&lt;msub&gt;&lt;mi&gt;&amp;#x3B2;&lt;/mi&gt;&lt;mn&gt;0&lt;/mn&gt;&lt;/msub&gt;&lt;mo&gt;+&lt;/mo&gt;&lt;msub&gt;&lt;mi&gt;&amp;#x3B2;&lt;/mi&gt;&lt;mn&gt;1&lt;/mn&gt;&lt;/msub&gt;&lt;msub&gt;&lt;mi&gt;X&lt;/mi&gt;&lt;mn&gt;1&lt;/mn&gt;&lt;/msub&gt;&lt;mo&gt;+&lt;/mo&gt;&lt;mo&gt;.&lt;/mo&gt;&lt;mo&gt;.&lt;/mo&gt;&lt;mo&gt;.&lt;/mo&gt;&lt;mo&gt;+&lt;/mo&gt;&lt;msub&gt;&lt;mi&gt;&amp;#x3B2;&lt;/mi&gt;&lt;mi&gt;k&lt;/mi&gt;&lt;/msub&gt;&lt;msub&gt;&lt;mi&gt;X&lt;/mi&gt;&lt;mi&gt;k&lt;/mi&gt;&lt;/msub&gt;&lt;/mstyle&gt;&lt;/math&gt;&quot;,&quot;truncated&quot;:false}" title="log open parentheses O R close parentheses thin space equals thin space log open parentheses fraction numerator p over denominator 1 minus p end fraction close parentheses space equals thin space beta subscript 0 plus beta subscript 1 X subscript 1 plus... plus beta subscript k X subscript k"/>
           <p:cNvPicPr preferRelativeResize="0"/>
           <p:nvPr/>
         </p:nvPicPr>
@@ -18699,7 +18923,7 @@
                                           </p:stCondLst>
                                         </p:cTn>
                                         <p:tgtEl>
-                                          <p:spTgt spid="266">
+                                          <p:spTgt spid="270">
                                             <p:txEl>
                                               <p:pRg st="0" end="0"/>
                                             </p:txEl>
@@ -18748,7 +18972,7 @@
                                           </p:stCondLst>
                                         </p:cTn>
                                         <p:tgtEl>
-                                          <p:spTgt spid="266">
+                                          <p:spTgt spid="270">
                                             <p:txEl>
                                               <p:pRg st="1" end="1"/>
                                             </p:txEl>
@@ -18797,7 +19021,7 @@
                                           </p:stCondLst>
                                         </p:cTn>
                                         <p:tgtEl>
-                                          <p:spTgt spid="266">
+                                          <p:spTgt spid="270">
                                             <p:txEl>
                                               <p:pRg st="2" end="2"/>
                                             </p:txEl>
@@ -18846,7 +19070,7 @@
                                           </p:stCondLst>
                                         </p:cTn>
                                         <p:tgtEl>
-                                          <p:spTgt spid="266">
+                                          <p:spTgt spid="270">
                                             <p:txEl>
                                               <p:pRg st="3" end="3"/>
                                             </p:txEl>
@@ -18895,7 +19119,7 @@
                                           </p:stCondLst>
                                         </p:cTn>
                                         <p:tgtEl>
-                                          <p:spTgt spid="266">
+                                          <p:spTgt spid="270">
                                             <p:txEl>
                                               <p:pRg st="4" end="4"/>
                                             </p:txEl>
@@ -18948,7 +19172,7 @@
   <p:cSld>
     <p:spTree>
       <p:nvGrpSpPr>
-        <p:cNvPr id="1" name="Shape 271"/>
+        <p:cNvPr id="1" name="Shape 275"/>
         <p:cNvGrpSpPr/>
         <p:nvPr/>
       </p:nvGrpSpPr>
@@ -18962,7 +19186,7 @@
       </p:grpSpPr>
       <p:sp>
         <p:nvSpPr>
-          <p:cNvPr id="272" name="Google Shape;272;p39"/>
+          <p:cNvPr id="276" name="Google Shape;276;p39"/>
           <p:cNvSpPr txBox="1">
             <a:spLocks noGrp="1"/>
           </p:cNvSpPr>
@@ -19004,7 +19228,7 @@
       </p:sp>
       <p:pic>
         <p:nvPicPr>
-          <p:cNvPr id="273" name="Google Shape;273;p39" descr="{&quot;mathml&quot;:&quot;&lt;math style=\&quot;font-family:stix;font-size:16px;\&quot; xmlns=\&quot;http://www.w3.org/1998/Math/MathML\&quot;&gt;&lt;mstyle mathsize=\&quot;16px\&quot;&gt;&lt;mfrac&gt;&lt;mi&gt;p&lt;/mi&gt;&lt;mrow&gt;&lt;mn&gt;1&lt;/mn&gt;&lt;mo&gt;-&lt;/mo&gt;&lt;mi&gt;p&lt;/mi&gt;&lt;/mrow&gt;&lt;/mfrac&gt;&lt;mo&gt;=&lt;/mo&gt;&lt;mo&gt;&amp;#xA0;&lt;/mo&gt;&lt;msup&gt;&lt;mi&gt;e&lt;/mi&gt;&lt;mrow&gt;&lt;msub&gt;&lt;mi&gt;&amp;#x3B2;&lt;/mi&gt;&lt;mn&gt;0&lt;/mn&gt;&lt;/msub&gt;&lt;mo&gt;+&lt;/mo&gt;&lt;msub&gt;&lt;mi&gt;&amp;#x3B2;&lt;/mi&gt;&lt;mn&gt;1&lt;/mn&gt;&lt;/msub&gt;&lt;msub&gt;&lt;mi&gt;X&lt;/mi&gt;&lt;mn&gt;1&lt;/mn&gt;&lt;/msub&gt;&lt;mo&gt;+&lt;/mo&gt;&lt;mo&gt;.&lt;/mo&gt;&lt;mo&gt;.&lt;/mo&gt;&lt;mo&gt;.&lt;/mo&gt;&lt;mo&gt;+&lt;/mo&gt;&lt;msub&gt;&lt;mi&gt;&amp;#x3B2;&lt;/mi&gt;&lt;mi&gt;k&lt;/mi&gt;&lt;/msub&gt;&lt;msub&gt;&lt;mi&gt;X&lt;/mi&gt;&lt;mi&gt;k&lt;/mi&gt;&lt;/msub&gt;&lt;/mrow&gt;&lt;/msup&gt;&lt;mspace linebreak=\&quot;newline\&quot;/&gt;&lt;mfrac&gt;&lt;mrow&gt;&lt;mo&gt;&amp;#xA0;&lt;/mo&gt;&lt;msup&gt;&lt;mi&gt;e&lt;/mi&gt;&lt;mrow&gt;&lt;msub&gt;&lt;mi&gt;&amp;#x3B2;&lt;/mi&gt;&lt;mn&gt;0&lt;/mn&gt;&lt;/msub&gt;&lt;mo&gt;+&lt;/mo&gt;&lt;msub&gt;&lt;mi&gt;&amp;#x3B2;&lt;/mi&gt;&lt;mn&gt;1&lt;/mn&gt;&lt;/msub&gt;&lt;mfenced&gt;&lt;mrow&gt;&lt;msub&gt;&lt;mi&gt;X&lt;/mi&gt;&lt;mn&gt;1&lt;/mn&gt;&lt;/msub&gt;&lt;mo&gt;+&lt;/mo&gt;&lt;mn&gt;1&lt;/mn&gt;&lt;/mrow&gt;&lt;/mfenced&gt;&lt;mo&gt;+&lt;/mo&gt;&lt;mo&gt;.&lt;/mo&gt;&lt;mo&gt;.&lt;/mo&gt;&lt;mo&gt;.&lt;/mo&gt;&lt;mo&gt;+&lt;/mo&gt;&lt;msub&gt;&lt;mi&gt;&amp;#x3B2;&lt;/mi&gt;&lt;mi&gt;k&lt;/mi&gt;&lt;/msub&gt;&lt;msub&gt;&lt;mi&gt;X&lt;/mi&gt;&lt;mi&gt;k&lt;/mi&gt;&lt;/msub&gt;&lt;/mrow&gt;&lt;/msup&gt;&lt;/mrow&gt;&lt;mrow&gt;&lt;mo&gt;&amp;#xA0;&lt;/mo&gt;&lt;msup&gt;&lt;mi&gt;e&lt;/mi&gt;&lt;mrow&gt;&lt;msub&gt;&lt;mi&gt;&amp;#x3B2;&lt;/mi&gt;&lt;mn&gt;0&lt;/mn&gt;&lt;/msub&gt;&lt;mo&gt;+&lt;/mo&gt;&lt;msub&gt;&lt;mi&gt;&amp;#x3B2;&lt;/mi&gt;&lt;mn&gt;1&lt;/mn&gt;&lt;/msub&gt;&lt;msub&gt;&lt;mi&gt;X&lt;/mi&gt;&lt;mn&gt;1&lt;/mn&gt;&lt;/msub&gt;&lt;mo&gt;+&lt;/mo&gt;&lt;mo&gt;.&lt;/mo&gt;&lt;mo&gt;.&lt;/mo&gt;&lt;mo&gt;.&lt;/mo&gt;&lt;mo&gt;+&lt;/mo&gt;&lt;msub&gt;&lt;mi&gt;&amp;#x3B2;&lt;/mi&gt;&lt;mi&gt;k&lt;/mi&gt;&lt;/msub&gt;&lt;msub&gt;&lt;mi&gt;X&lt;/mi&gt;&lt;mi&gt;k&lt;/mi&gt;&lt;/msub&gt;&lt;/mrow&gt;&lt;/msup&gt;&lt;/mrow&gt;&lt;/mfrac&gt;&lt;mo&gt;=&lt;/mo&gt;&lt;mfrac&gt;&lt;msup&gt;&lt;mi&gt;e&lt;/mi&gt;&lt;msub&gt;&lt;mi&gt;&amp;#x3B2;&lt;/mi&gt;&lt;mn&gt;0&lt;/mn&gt;&lt;/msub&gt;&lt;/msup&gt;&lt;msup&gt;&lt;mi&gt;e&lt;/mi&gt;&lt;msub&gt;&lt;mi&gt;&amp;#x3B2;&lt;/mi&gt;&lt;mn&gt;0&lt;/mn&gt;&lt;/msub&gt;&lt;/msup&gt;&lt;/mfrac&gt;&lt;mo&gt;&amp;#xB7;&lt;/mo&gt;&lt;mfrac&gt;&lt;msup&gt;&lt;mi&gt;e&lt;/mi&gt;&lt;mrow&gt;&lt;msub&gt;&lt;mi&gt;&amp;#x3B2;&lt;/mi&gt;&lt;mn&gt;1&lt;/mn&gt;&lt;/msub&gt;&lt;msub&gt;&lt;mi&gt;X&lt;/mi&gt;&lt;mn&gt;1&lt;/mn&gt;&lt;/msub&gt;&lt;/mrow&gt;&lt;/msup&gt;&lt;msup&gt;&lt;mi&gt;e&lt;/mi&gt;&lt;mrow&gt;&lt;msub&gt;&lt;mi&gt;&amp;#x3B2;&lt;/mi&gt;&lt;mn&gt;1&lt;/mn&gt;&lt;/msub&gt;&lt;mi&gt;X&lt;/mi&gt;&lt;mn&gt;1&lt;/mn&gt;&lt;/mrow&gt;&lt;/msup&gt;&lt;/mfrac&gt;&lt;mo&gt;&amp;#xB7;&lt;/mo&gt;&lt;mfrac&gt;&lt;msup&gt;&lt;mi&gt;e&lt;/mi&gt;&lt;msub&gt;&lt;mi&gt;&amp;#x3B2;&lt;/mi&gt;&lt;mn&gt;1&lt;/mn&gt;&lt;/msub&gt;&lt;/msup&gt;&lt;mn&gt;1&lt;/mn&gt;&lt;/mfrac&gt;&lt;mo&gt;&amp;#xB7;&lt;/mo&gt;&lt;mo&gt;.&lt;/mo&gt;&lt;mo&gt;.&lt;/mo&gt;&lt;mo&gt;.&lt;/mo&gt;&lt;mo&gt;&amp;#xB7;&lt;/mo&gt;&lt;mfrac&gt;&lt;msup&gt;&lt;mi&gt;e&lt;/mi&gt;&lt;mrow&gt;&lt;msub&gt;&lt;mi&gt;&amp;#x3B2;&lt;/mi&gt;&lt;mi&gt;k&lt;/mi&gt;&lt;/msub&gt;&lt;msub&gt;&lt;mi&gt;X&lt;/mi&gt;&lt;mi&gt;k&lt;/mi&gt;&lt;/msub&gt;&lt;/mrow&gt;&lt;/msup&gt;&lt;msup&gt;&lt;mi&gt;e&lt;/mi&gt;&lt;mrow&gt;&lt;msub&gt;&lt;mi&gt;&amp;#x3B2;&lt;/mi&gt;&lt;mi&gt;k&lt;/mi&gt;&lt;/msub&gt;&lt;msub&gt;&lt;mi&gt;X&lt;/mi&gt;&lt;mi&gt;k&lt;/mi&gt;&lt;/msub&gt;&lt;/mrow&gt;&lt;/msup&gt;&lt;/mfrac&gt;&lt;mo&gt;&amp;#x2009;&lt;/mo&gt;&lt;mo&gt;=&lt;/mo&gt;&lt;msup&gt;&lt;mi&gt;e&lt;/mi&gt;&lt;msub&gt;&lt;mi&gt;&amp;#x3B2;&lt;/mi&gt;&lt;mn&gt;1&lt;/mn&gt;&lt;/msub&gt;&lt;/msup&gt;&lt;/mstyle&gt;&lt;/math&gt;&quot;,&quot;truncated&quot;:false}" title="fraction numerator p over denominator 1 minus p end fraction equals space e to the power of beta subscript 0 plus beta subscript 1 X subscript 1 plus... plus beta subscript k X subscript k end exponent&#10;fraction numerator space e to the power of beta subscript 0 plus beta subscript 1 open parentheses X subscript 1 plus 1 close parentheses plus... plus beta subscript k X subscript k end exponent over denominator space e to the power of beta subscript 0 plus beta subscript 1 X subscript 1 plus... plus beta subscript k X subscript k end exponent end fraction equals e to the power of beta subscript 0 end exponent over e to the power of beta subscript 0 end exponent times e to the power of beta subscript 1 X subscript 1 end exponent over e to the power of beta subscript 1 X 1 end exponent times e to the power of beta subscript 1 end exponent over 1 times... times e to the power of beta subscript k X subscript k end exponent over e to the power of beta subscript k X subscript k end exponent thin space equals e to the power of beta subscript 1 end exponent"/>
+          <p:cNvPr id="277" name="Google Shape;277;p39" descr="{&quot;mathml&quot;:&quot;&lt;math style=\&quot;font-family:stix;font-size:16px;\&quot; xmlns=\&quot;http://www.w3.org/1998/Math/MathML\&quot;&gt;&lt;mstyle mathsize=\&quot;16px\&quot;&gt;&lt;mfrac&gt;&lt;mi&gt;p&lt;/mi&gt;&lt;mrow&gt;&lt;mn&gt;1&lt;/mn&gt;&lt;mo&gt;-&lt;/mo&gt;&lt;mi&gt;p&lt;/mi&gt;&lt;/mrow&gt;&lt;/mfrac&gt;&lt;mo&gt;=&lt;/mo&gt;&lt;mo&gt;&amp;#xA0;&lt;/mo&gt;&lt;msup&gt;&lt;mi&gt;e&lt;/mi&gt;&lt;mrow&gt;&lt;msub&gt;&lt;mi&gt;&amp;#x3B2;&lt;/mi&gt;&lt;mn&gt;0&lt;/mn&gt;&lt;/msub&gt;&lt;mo&gt;+&lt;/mo&gt;&lt;msub&gt;&lt;mi&gt;&amp;#x3B2;&lt;/mi&gt;&lt;mn&gt;1&lt;/mn&gt;&lt;/msub&gt;&lt;msub&gt;&lt;mi&gt;X&lt;/mi&gt;&lt;mn&gt;1&lt;/mn&gt;&lt;/msub&gt;&lt;mo&gt;+&lt;/mo&gt;&lt;mo&gt;.&lt;/mo&gt;&lt;mo&gt;.&lt;/mo&gt;&lt;mo&gt;.&lt;/mo&gt;&lt;mo&gt;+&lt;/mo&gt;&lt;msub&gt;&lt;mi&gt;&amp;#x3B2;&lt;/mi&gt;&lt;mi&gt;k&lt;/mi&gt;&lt;/msub&gt;&lt;msub&gt;&lt;mi&gt;X&lt;/mi&gt;&lt;mi&gt;k&lt;/mi&gt;&lt;/msub&gt;&lt;/mrow&gt;&lt;/msup&gt;&lt;mspace linebreak=\&quot;newline\&quot;/&gt;&lt;mfrac&gt;&lt;mrow&gt;&lt;mo&gt;&amp;#xA0;&lt;/mo&gt;&lt;msup&gt;&lt;mi&gt;e&lt;/mi&gt;&lt;mrow&gt;&lt;msub&gt;&lt;mi&gt;&amp;#x3B2;&lt;/mi&gt;&lt;mn&gt;0&lt;/mn&gt;&lt;/msub&gt;&lt;mo&gt;+&lt;/mo&gt;&lt;msub&gt;&lt;mi&gt;&amp;#x3B2;&lt;/mi&gt;&lt;mn&gt;1&lt;/mn&gt;&lt;/msub&gt;&lt;mfenced&gt;&lt;mrow&gt;&lt;msub&gt;&lt;mi&gt;X&lt;/mi&gt;&lt;mn&gt;1&lt;/mn&gt;&lt;/msub&gt;&lt;mo&gt;+&lt;/mo&gt;&lt;mn&gt;1&lt;/mn&gt;&lt;/mrow&gt;&lt;/mfenced&gt;&lt;mo&gt;+&lt;/mo&gt;&lt;mo&gt;.&lt;/mo&gt;&lt;mo&gt;.&lt;/mo&gt;&lt;mo&gt;.&lt;/mo&gt;&lt;mo&gt;+&lt;/mo&gt;&lt;msub&gt;&lt;mi&gt;&amp;#x3B2;&lt;/mi&gt;&lt;mi&gt;k&lt;/mi&gt;&lt;/msub&gt;&lt;msub&gt;&lt;mi&gt;X&lt;/mi&gt;&lt;mi&gt;k&lt;/mi&gt;&lt;/msub&gt;&lt;/mrow&gt;&lt;/msup&gt;&lt;/mrow&gt;&lt;mrow&gt;&lt;mo&gt;&amp;#xA0;&lt;/mo&gt;&lt;msup&gt;&lt;mi&gt;e&lt;/mi&gt;&lt;mrow&gt;&lt;msub&gt;&lt;mi&gt;&amp;#x3B2;&lt;/mi&gt;&lt;mn&gt;0&lt;/mn&gt;&lt;/msub&gt;&lt;mo&gt;+&lt;/mo&gt;&lt;msub&gt;&lt;mi&gt;&amp;#x3B2;&lt;/mi&gt;&lt;mn&gt;1&lt;/mn&gt;&lt;/msub&gt;&lt;msub&gt;&lt;mi&gt;X&lt;/mi&gt;&lt;mn&gt;1&lt;/mn&gt;&lt;/msub&gt;&lt;mo&gt;+&lt;/mo&gt;&lt;mo&gt;.&lt;/mo&gt;&lt;mo&gt;.&lt;/mo&gt;&lt;mo&gt;.&lt;/mo&gt;&lt;mo&gt;+&lt;/mo&gt;&lt;msub&gt;&lt;mi&gt;&amp;#x3B2;&lt;/mi&gt;&lt;mi&gt;k&lt;/mi&gt;&lt;/msub&gt;&lt;msub&gt;&lt;mi&gt;X&lt;/mi&gt;&lt;mi&gt;k&lt;/mi&gt;&lt;/msub&gt;&lt;/mrow&gt;&lt;/msup&gt;&lt;/mrow&gt;&lt;/mfrac&gt;&lt;mo&gt;=&lt;/mo&gt;&lt;mfrac&gt;&lt;msup&gt;&lt;mi&gt;e&lt;/mi&gt;&lt;msub&gt;&lt;mi&gt;&amp;#x3B2;&lt;/mi&gt;&lt;mn&gt;0&lt;/mn&gt;&lt;/msub&gt;&lt;/msup&gt;&lt;msup&gt;&lt;mi&gt;e&lt;/mi&gt;&lt;msub&gt;&lt;mi&gt;&amp;#x3B2;&lt;/mi&gt;&lt;mn&gt;0&lt;/mn&gt;&lt;/msub&gt;&lt;/msup&gt;&lt;/mfrac&gt;&lt;mo&gt;&amp;#xB7;&lt;/mo&gt;&lt;mfrac&gt;&lt;msup&gt;&lt;mi&gt;e&lt;/mi&gt;&lt;mrow&gt;&lt;msub&gt;&lt;mi&gt;&amp;#x3B2;&lt;/mi&gt;&lt;mn&gt;1&lt;/mn&gt;&lt;/msub&gt;&lt;msub&gt;&lt;mi&gt;X&lt;/mi&gt;&lt;mn&gt;1&lt;/mn&gt;&lt;/msub&gt;&lt;/mrow&gt;&lt;/msup&gt;&lt;msup&gt;&lt;mi&gt;e&lt;/mi&gt;&lt;mrow&gt;&lt;msub&gt;&lt;mi&gt;&amp;#x3B2;&lt;/mi&gt;&lt;mn&gt;1&lt;/mn&gt;&lt;/msub&gt;&lt;mi&gt;X&lt;/mi&gt;&lt;mn&gt;1&lt;/mn&gt;&lt;/mrow&gt;&lt;/msup&gt;&lt;/mfrac&gt;&lt;mo&gt;&amp;#xB7;&lt;/mo&gt;&lt;mfrac&gt;&lt;msup&gt;&lt;mi&gt;e&lt;/mi&gt;&lt;msub&gt;&lt;mi&gt;&amp;#x3B2;&lt;/mi&gt;&lt;mn&gt;1&lt;/mn&gt;&lt;/msub&gt;&lt;/msup&gt;&lt;mn&gt;1&lt;/mn&gt;&lt;/mfrac&gt;&lt;mo&gt;&amp;#xB7;&lt;/mo&gt;&lt;mo&gt;.&lt;/mo&gt;&lt;mo&gt;.&lt;/mo&gt;&lt;mo&gt;.&lt;/mo&gt;&lt;mo&gt;&amp;#xB7;&lt;/mo&gt;&lt;mfrac&gt;&lt;msup&gt;&lt;mi&gt;e&lt;/mi&gt;&lt;mrow&gt;&lt;msub&gt;&lt;mi&gt;&amp;#x3B2;&lt;/mi&gt;&lt;mi&gt;k&lt;/mi&gt;&lt;/msub&gt;&lt;msub&gt;&lt;mi&gt;X&lt;/mi&gt;&lt;mi&gt;k&lt;/mi&gt;&lt;/msub&gt;&lt;/mrow&gt;&lt;/msup&gt;&lt;msup&gt;&lt;mi&gt;e&lt;/mi&gt;&lt;mrow&gt;&lt;msub&gt;&lt;mi&gt;&amp;#x3B2;&lt;/mi&gt;&lt;mi&gt;k&lt;/mi&gt;&lt;/msub&gt;&lt;msub&gt;&lt;mi&gt;X&lt;/mi&gt;&lt;mi&gt;k&lt;/mi&gt;&lt;/msub&gt;&lt;/mrow&gt;&lt;/msup&gt;&lt;/mfrac&gt;&lt;mo&gt;&amp;#x2009;&lt;/mo&gt;&lt;mo&gt;=&lt;/mo&gt;&lt;msup&gt;&lt;mi&gt;e&lt;/mi&gt;&lt;msub&gt;&lt;mi&gt;&amp;#x3B2;&lt;/mi&gt;&lt;mn&gt;1&lt;/mn&gt;&lt;/msub&gt;&lt;/msup&gt;&lt;/mstyle&gt;&lt;/math&gt;&quot;,&quot;truncated&quot;:false}" title="fraction numerator p over denominator 1 minus p end fraction equals space e to the power of beta subscript 0 plus beta subscript 1 X subscript 1 plus... plus beta subscript k X subscript k end exponent&#10;fraction numerator space e to the power of beta subscript 0 plus beta subscript 1 open parentheses X subscript 1 plus 1 close parentheses plus... plus beta subscript k X subscript k end exponent over denominator space e to the power of beta subscript 0 plus beta subscript 1 X subscript 1 plus... plus beta subscript k X subscript k end exponent end fraction equals e to the power of beta subscript 0 end exponent over e to the power of beta subscript 0 end exponent times e to the power of beta subscript 1 X subscript 1 end exponent over e to the power of beta subscript 1 X 1 end exponent times e to the power of beta subscript 1 end exponent over 1 times... times e to the power of beta subscript k X subscript k end exponent over e to the power of beta subscript k X subscript k end exponent thin space equals e to the power of beta subscript 1 end exponent"/>
           <p:cNvPicPr preferRelativeResize="0"/>
           <p:nvPr/>
         </p:nvPicPr>
@@ -19043,7 +19267,7 @@
   <p:cSld>
     <p:spTree>
       <p:nvGrpSpPr>
-        <p:cNvPr id="1" name="Shape 277"/>
+        <p:cNvPr id="1" name="Shape 281"/>
         <p:cNvGrpSpPr/>
         <p:nvPr/>
       </p:nvGrpSpPr>
@@ -19057,7 +19281,7 @@
       </p:grpSpPr>
       <p:sp>
         <p:nvSpPr>
-          <p:cNvPr id="278" name="Google Shape;278;p40"/>
+          <p:cNvPr id="282" name="Google Shape;282;p40"/>
           <p:cNvSpPr txBox="1">
             <a:spLocks noGrp="1"/>
           </p:cNvSpPr>
@@ -19099,7 +19323,7 @@
       </p:sp>
       <p:sp>
         <p:nvSpPr>
-          <p:cNvPr id="279" name="Google Shape;279;p40"/>
+          <p:cNvPr id="283" name="Google Shape;283;p40"/>
           <p:cNvSpPr txBox="1">
             <a:spLocks noGrp="1"/>
           </p:cNvSpPr>
@@ -19229,7 +19453,7 @@
       </p:sp>
       <p:pic>
         <p:nvPicPr>
-          <p:cNvPr id="280" name="Google Shape;280;p40" descr="{&quot;mathml&quot;:&quot;&lt;math style=\&quot;font-family:stix;font-size:16px;\&quot; xmlns=\&quot;http://www.w3.org/1998/Math/MathML\&quot;&gt;&lt;mstyle mathsize=\&quot;16px\&quot;&gt;&lt;mi&gt;f&lt;/mi&gt;&lt;mfenced&gt;&lt;mi&gt;x&lt;/mi&gt;&lt;/mfenced&gt;&lt;mo&gt;&amp;#xA0;&lt;/mo&gt;&lt;mo&gt;=&lt;/mo&gt;&lt;mo&gt;&amp;#x2009;&lt;/mo&gt;&lt;mfrac&gt;&lt;mi&gt;L&lt;/mi&gt;&lt;mrow&gt;&lt;mn&gt;1&lt;/mn&gt;&lt;mo&gt;+&lt;/mo&gt;&lt;msup&gt;&lt;mi&gt;e&lt;/mi&gt;&lt;mrow&gt;&lt;mo&gt;-&lt;/mo&gt;&lt;mi&gt;k&lt;/mi&gt;&lt;mfenced&gt;&lt;mrow&gt;&lt;mi&gt;x&lt;/mi&gt;&lt;mo&gt;-&lt;/mo&gt;&lt;msub&gt;&lt;mi&gt;x&lt;/mi&gt;&lt;mn&gt;0&lt;/mn&gt;&lt;/msub&gt;&lt;/mrow&gt;&lt;/mfenced&gt;&lt;/mrow&gt;&lt;/msup&gt;&lt;/mrow&gt;&lt;/mfrac&gt;&lt;/mstyle&gt;&lt;/math&gt;&quot;,&quot;truncated&quot;:false}" title="f open parentheses x close parentheses space equals thin space fraction numerator L over denominator 1 plus e to the power of negative k open parentheses x minus x subscript 0 close parentheses end exponent end fraction"/>
+          <p:cNvPr id="284" name="Google Shape;284;p40" descr="{&quot;mathml&quot;:&quot;&lt;math style=\&quot;font-family:stix;font-size:16px;\&quot; xmlns=\&quot;http://www.w3.org/1998/Math/MathML\&quot;&gt;&lt;mstyle mathsize=\&quot;16px\&quot;&gt;&lt;mi&gt;f&lt;/mi&gt;&lt;mfenced&gt;&lt;mi&gt;x&lt;/mi&gt;&lt;/mfenced&gt;&lt;mo&gt;&amp;#xA0;&lt;/mo&gt;&lt;mo&gt;=&lt;/mo&gt;&lt;mo&gt;&amp;#x2009;&lt;/mo&gt;&lt;mfrac&gt;&lt;mi&gt;L&lt;/mi&gt;&lt;mrow&gt;&lt;mn&gt;1&lt;/mn&gt;&lt;mo&gt;+&lt;/mo&gt;&lt;msup&gt;&lt;mi&gt;e&lt;/mi&gt;&lt;mrow&gt;&lt;mo&gt;-&lt;/mo&gt;&lt;mi&gt;k&lt;/mi&gt;&lt;mfenced&gt;&lt;mrow&gt;&lt;mi&gt;x&lt;/mi&gt;&lt;mo&gt;-&lt;/mo&gt;&lt;msub&gt;&lt;mi&gt;x&lt;/mi&gt;&lt;mn&gt;0&lt;/mn&gt;&lt;/msub&gt;&lt;/mrow&gt;&lt;/mfenced&gt;&lt;/mrow&gt;&lt;/msup&gt;&lt;/mrow&gt;&lt;/mfrac&gt;&lt;/mstyle&gt;&lt;/math&gt;&quot;,&quot;truncated&quot;:false}" title="f open parentheses x close parentheses space equals thin space fraction numerator L over denominator 1 plus e to the power of negative k open parentheses x minus x subscript 0 close parentheses end exponent end fraction"/>
           <p:cNvPicPr preferRelativeResize="0"/>
           <p:nvPr/>
         </p:nvPicPr>
@@ -19257,7 +19481,7 @@
       </p:pic>
       <p:pic>
         <p:nvPicPr>
-          <p:cNvPr id="281" name="Google Shape;281;p40"/>
+          <p:cNvPr id="285" name="Google Shape;285;p40"/>
           <p:cNvPicPr preferRelativeResize="0"/>
           <p:nvPr/>
         </p:nvPicPr>
@@ -19322,7 +19546,7 @@
                                           </p:stCondLst>
                                         </p:cTn>
                                         <p:tgtEl>
-                                          <p:spTgt spid="279">
+                                          <p:spTgt spid="283">
                                             <p:txEl>
                                               <p:pRg st="0" end="0"/>
                                             </p:txEl>
@@ -19371,7 +19595,7 @@
                                           </p:stCondLst>
                                         </p:cTn>
                                         <p:tgtEl>
-                                          <p:spTgt spid="279">
+                                          <p:spTgt spid="283">
                                             <p:txEl>
                                               <p:pRg st="1" end="1"/>
                                             </p:txEl>
@@ -19420,7 +19644,7 @@
                                           </p:stCondLst>
                                         </p:cTn>
                                         <p:tgtEl>
-                                          <p:spTgt spid="279">
+                                          <p:spTgt spid="283">
                                             <p:txEl>
                                               <p:pRg st="2" end="2"/>
                                             </p:txEl>
@@ -19469,7 +19693,7 @@
                                           </p:stCondLst>
                                         </p:cTn>
                                         <p:tgtEl>
-                                          <p:spTgt spid="279">
+                                          <p:spTgt spid="283">
                                             <p:txEl>
                                               <p:pRg st="3" end="3"/>
                                             </p:txEl>
@@ -19518,7 +19742,7 @@
                                           </p:stCondLst>
                                         </p:cTn>
                                         <p:tgtEl>
-                                          <p:spTgt spid="279">
+                                          <p:spTgt spid="283">
                                             <p:txEl>
                                               <p:pRg st="4" end="4"/>
                                             </p:txEl>
@@ -19567,7 +19791,7 @@
                                           </p:stCondLst>
                                         </p:cTn>
                                         <p:tgtEl>
-                                          <p:spTgt spid="279">
+                                          <p:spTgt spid="283">
                                             <p:txEl>
                                               <p:pRg st="5" end="5"/>
                                             </p:txEl>
@@ -19616,7 +19840,7 @@
                                           </p:stCondLst>
                                         </p:cTn>
                                         <p:tgtEl>
-                                          <p:spTgt spid="279">
+                                          <p:spTgt spid="283">
                                             <p:txEl>
                                               <p:pRg st="6" end="6"/>
                                             </p:txEl>
@@ -19665,7 +19889,7 @@
                                           </p:stCondLst>
                                         </p:cTn>
                                         <p:tgtEl>
-                                          <p:spTgt spid="281"/>
+                                          <p:spTgt spid="285"/>
                                         </p:tgtEl>
                                         <p:attrNameLst>
                                           <p:attrName>style.visibility</p:attrName>
@@ -19714,7 +19938,7 @@
   <p:cSld>
     <p:spTree>
       <p:nvGrpSpPr>
-        <p:cNvPr id="1" name="Shape 285"/>
+        <p:cNvPr id="1" name="Shape 289"/>
         <p:cNvGrpSpPr/>
         <p:nvPr/>
       </p:nvGrpSpPr>
@@ -19728,7 +19952,7 @@
       </p:grpSpPr>
       <p:sp>
         <p:nvSpPr>
-          <p:cNvPr id="286" name="Google Shape;286;p41"/>
+          <p:cNvPr id="290" name="Google Shape;290;p41"/>
           <p:cNvSpPr txBox="1">
             <a:spLocks noGrp="1"/>
           </p:cNvSpPr>
@@ -19770,7 +19994,7 @@
       </p:sp>
       <p:sp>
         <p:nvSpPr>
-          <p:cNvPr id="287" name="Google Shape;287;p41"/>
+          <p:cNvPr id="291" name="Google Shape;291;p41"/>
           <p:cNvSpPr txBox="1">
             <a:spLocks noGrp="1"/>
           </p:cNvSpPr>
@@ -19860,7 +20084,7 @@
       </p:sp>
       <p:pic>
         <p:nvPicPr>
-          <p:cNvPr id="288" name="Google Shape;288;p41" descr="{&quot;mathml&quot;:&quot;&lt;math style=\&quot;font-family:stix;font-size:16px;\&quot; xmlns=\&quot;http://www.w3.org/1998/Math/MathML\&quot;&gt;&lt;mstyle mathsize=\&quot;16px\&quot;&gt;&lt;mi&gt;p&lt;/mi&gt;&lt;mfenced&gt;&lt;mi&gt;x&lt;/mi&gt;&lt;/mfenced&gt;&lt;mo&gt;&amp;#xA0;&lt;/mo&gt;&lt;mo&gt;=&lt;/mo&gt;&lt;mo&gt;&amp;#x2009;&lt;/mo&gt;&lt;mfrac&gt;&lt;msup&gt;&lt;mi&gt;e&lt;/mi&gt;&lt;mi&gt;x&lt;/mi&gt;&lt;/msup&gt;&lt;mrow&gt;&lt;mn&gt;1&lt;/mn&gt;&lt;mo&gt;+&lt;/mo&gt;&lt;msup&gt;&lt;mi&gt;e&lt;/mi&gt;&lt;mi&gt;x&lt;/mi&gt;&lt;/msup&gt;&lt;/mrow&gt;&lt;/mfrac&gt;&lt;mo&gt;&amp;#x2009;&lt;/mo&gt;&lt;mo&gt;=&lt;/mo&gt;&lt;mo&gt;&amp;#x2009;&lt;/mo&gt;&lt;mfrac&gt;&lt;mstyle displaystyle=\&quot;true\&quot;&gt;&lt;mfrac&gt;&lt;msup&gt;&lt;mi&gt;e&lt;/mi&gt;&lt;mi&gt;x&lt;/mi&gt;&lt;/msup&gt;&lt;msup&gt;&lt;mi&gt;e&lt;/mi&gt;&lt;mi&gt;x&lt;/mi&gt;&lt;/msup&gt;&lt;/mfrac&gt;&lt;/mstyle&gt;&lt;mstyle displaystyle=\&quot;true\&quot;&gt;&lt;mfrac&gt;&lt;mrow&gt;&lt;mn&gt;1&lt;/mn&gt;&lt;mo&gt;+&lt;/mo&gt;&lt;msup&gt;&lt;mi&gt;e&lt;/mi&gt;&lt;mi&gt;x&lt;/mi&gt;&lt;/msup&gt;&lt;/mrow&gt;&lt;mrow&gt;&lt;msup&gt;&lt;mi&gt;e&lt;/mi&gt;&lt;mi&gt;x&lt;/mi&gt;&lt;/msup&gt;&lt;mo&gt;&amp;#xA0;&lt;/mo&gt;&lt;/mrow&gt;&lt;/mfrac&gt;&lt;/mstyle&gt;&lt;/mfrac&gt;&lt;mo&gt;=&lt;/mo&gt;&lt;mfrac&gt;&lt;mn&gt;1&lt;/mn&gt;&lt;mrow&gt;&lt;mstyle displaystyle=\&quot;true\&quot;&gt;&lt;mfrac&gt;&lt;mn&gt;1&lt;/mn&gt;&lt;msup&gt;&lt;mi&gt;e&lt;/mi&gt;&lt;mi&gt;x&lt;/mi&gt;&lt;/msup&gt;&lt;/mfrac&gt;&lt;/mstyle&gt;&lt;mo&gt;+&lt;/mo&gt;&lt;mn&gt;1&lt;/mn&gt;&lt;/mrow&gt;&lt;/mfrac&gt;&lt;mo&gt;=&lt;/mo&gt;&lt;mfrac&gt;&lt;mn&gt;1&lt;/mn&gt;&lt;mrow&gt;&lt;msup&gt;&lt;mi&gt;e&lt;/mi&gt;&lt;mrow&gt;&lt;mo&gt;-&lt;/mo&gt;&lt;mi&gt;x&lt;/mi&gt;&lt;/mrow&gt;&lt;/msup&gt;&lt;mo&gt;+&lt;/mo&gt;&lt;mn&gt;1&lt;/mn&gt;&lt;/mrow&gt;&lt;/mfrac&gt;&lt;mo&gt;=&lt;/mo&gt;&lt;mfrac&gt;&lt;mn&gt;1&lt;/mn&gt;&lt;mrow&gt;&lt;mn&gt;1&lt;/mn&gt;&lt;mo&gt;+&lt;/mo&gt;&lt;msup&gt;&lt;mi&gt;e&lt;/mi&gt;&lt;mrow&gt;&lt;mo&gt;-&lt;/mo&gt;&lt;mi&gt;x&lt;/mi&gt;&lt;/mrow&gt;&lt;/msup&gt;&lt;/mrow&gt;&lt;/mfrac&gt;&lt;/mstyle&gt;&lt;/math&gt;&quot;,&quot;truncated&quot;:false}" title="p open parentheses x close parentheses space equals thin space fraction numerator e to the power of x over denominator 1 plus e to the power of x end fraction thin space equals thin space fraction numerator e to the power of x over e to the power of x over denominator fraction numerator 1 plus e to the power of x over denominator e to the power of x space end fraction end fraction equals fraction numerator 1 over denominator 1 over e to the power of x plus 1 end fraction equals fraction numerator 1 over denominator e to the power of negative x end exponent plus 1 end fraction equals fraction numerator 1 over denominator 1 plus e to the power of negative x end exponent end fraction"/>
+          <p:cNvPr id="292" name="Google Shape;292;p41" descr="{&quot;mathml&quot;:&quot;&lt;math style=\&quot;font-family:stix;font-size:16px;\&quot; xmlns=\&quot;http://www.w3.org/1998/Math/MathML\&quot;&gt;&lt;mstyle mathsize=\&quot;16px\&quot;&gt;&lt;mi&gt;p&lt;/mi&gt;&lt;mfenced&gt;&lt;mi&gt;x&lt;/mi&gt;&lt;/mfenced&gt;&lt;mo&gt;&amp;#xA0;&lt;/mo&gt;&lt;mo&gt;=&lt;/mo&gt;&lt;mo&gt;&amp;#x2009;&lt;/mo&gt;&lt;mfrac&gt;&lt;msup&gt;&lt;mi&gt;e&lt;/mi&gt;&lt;mi&gt;x&lt;/mi&gt;&lt;/msup&gt;&lt;mrow&gt;&lt;mn&gt;1&lt;/mn&gt;&lt;mo&gt;+&lt;/mo&gt;&lt;msup&gt;&lt;mi&gt;e&lt;/mi&gt;&lt;mi&gt;x&lt;/mi&gt;&lt;/msup&gt;&lt;/mrow&gt;&lt;/mfrac&gt;&lt;mo&gt;&amp;#x2009;&lt;/mo&gt;&lt;mo&gt;=&lt;/mo&gt;&lt;mo&gt;&amp;#x2009;&lt;/mo&gt;&lt;mfrac&gt;&lt;mstyle displaystyle=\&quot;true\&quot;&gt;&lt;mfrac&gt;&lt;msup&gt;&lt;mi&gt;e&lt;/mi&gt;&lt;mi&gt;x&lt;/mi&gt;&lt;/msup&gt;&lt;msup&gt;&lt;mi&gt;e&lt;/mi&gt;&lt;mi&gt;x&lt;/mi&gt;&lt;/msup&gt;&lt;/mfrac&gt;&lt;/mstyle&gt;&lt;mstyle displaystyle=\&quot;true\&quot;&gt;&lt;mfrac&gt;&lt;mrow&gt;&lt;mn&gt;1&lt;/mn&gt;&lt;mo&gt;+&lt;/mo&gt;&lt;msup&gt;&lt;mi&gt;e&lt;/mi&gt;&lt;mi&gt;x&lt;/mi&gt;&lt;/msup&gt;&lt;/mrow&gt;&lt;mrow&gt;&lt;msup&gt;&lt;mi&gt;e&lt;/mi&gt;&lt;mi&gt;x&lt;/mi&gt;&lt;/msup&gt;&lt;mo&gt;&amp;#xA0;&lt;/mo&gt;&lt;/mrow&gt;&lt;/mfrac&gt;&lt;/mstyle&gt;&lt;/mfrac&gt;&lt;mo&gt;=&lt;/mo&gt;&lt;mfrac&gt;&lt;mn&gt;1&lt;/mn&gt;&lt;mrow&gt;&lt;mstyle displaystyle=\&quot;true\&quot;&gt;&lt;mfrac&gt;&lt;mn&gt;1&lt;/mn&gt;&lt;msup&gt;&lt;mi&gt;e&lt;/mi&gt;&lt;mi&gt;x&lt;/mi&gt;&lt;/msup&gt;&lt;/mfrac&gt;&lt;/mstyle&gt;&lt;mo&gt;+&lt;/mo&gt;&lt;mn&gt;1&lt;/mn&gt;&lt;/mrow&gt;&lt;/mfrac&gt;&lt;mo&gt;=&lt;/mo&gt;&lt;mfrac&gt;&lt;mn&gt;1&lt;/mn&gt;&lt;mrow&gt;&lt;msup&gt;&lt;mi&gt;e&lt;/mi&gt;&lt;mrow&gt;&lt;mo&gt;-&lt;/mo&gt;&lt;mi&gt;x&lt;/mi&gt;&lt;/mrow&gt;&lt;/msup&gt;&lt;mo&gt;+&lt;/mo&gt;&lt;mn&gt;1&lt;/mn&gt;&lt;/mrow&gt;&lt;/mfrac&gt;&lt;mo&gt;=&lt;/mo&gt;&lt;mfrac&gt;&lt;mn&gt;1&lt;/mn&gt;&lt;mrow&gt;&lt;mn&gt;1&lt;/mn&gt;&lt;mo&gt;+&lt;/mo&gt;&lt;msup&gt;&lt;mi&gt;e&lt;/mi&gt;&lt;mrow&gt;&lt;mo&gt;-&lt;/mo&gt;&lt;mi&gt;x&lt;/mi&gt;&lt;/mrow&gt;&lt;/msup&gt;&lt;/mrow&gt;&lt;/mfrac&gt;&lt;/mstyle&gt;&lt;/math&gt;&quot;,&quot;truncated&quot;:false}" title="p open parentheses x close parentheses space equals thin space fraction numerator e to the power of x over denominator 1 plus e to the power of x end fraction thin space equals thin space fraction numerator e to the power of x over e to the power of x over denominator fraction numerator 1 plus e to the power of x over denominator e to the power of x space end fraction end fraction equals fraction numerator 1 over denominator 1 over e to the power of x plus 1 end fraction equals fraction numerator 1 over denominator e to the power of negative x end exponent plus 1 end fraction equals fraction numerator 1 over denominator 1 plus e to the power of negative x end exponent end fraction"/>
           <p:cNvPicPr preferRelativeResize="0"/>
           <p:nvPr/>
         </p:nvPicPr>
@@ -19899,7 +20123,7 @@
   <p:cSld>
     <p:spTree>
       <p:nvGrpSpPr>
-        <p:cNvPr id="1" name="Shape 108"/>
+        <p:cNvPr id="1" name="Shape 109"/>
         <p:cNvGrpSpPr/>
         <p:nvPr/>
       </p:nvGrpSpPr>
@@ -19913,7 +20137,7 @@
       </p:grpSpPr>
       <p:sp>
         <p:nvSpPr>
-          <p:cNvPr id="109" name="Google Shape;109;p15"/>
+          <p:cNvPr id="110" name="Google Shape;110;p15"/>
           <p:cNvSpPr txBox="1">
             <a:spLocks noGrp="1"/>
           </p:cNvSpPr>
@@ -19971,7 +20195,7 @@
       </p:sp>
       <p:sp>
         <p:nvSpPr>
-          <p:cNvPr id="110" name="Google Shape;110;p15"/>
+          <p:cNvPr id="111" name="Google Shape;111;p15"/>
           <p:cNvSpPr txBox="1">
             <a:spLocks noGrp="1"/>
           </p:cNvSpPr>
@@ -20020,7 +20244,7 @@
   <p:cSld>
     <p:spTree>
       <p:nvGrpSpPr>
-        <p:cNvPr id="1" name="Shape 292"/>
+        <p:cNvPr id="1" name="Shape 296"/>
         <p:cNvGrpSpPr/>
         <p:nvPr/>
       </p:nvGrpSpPr>
@@ -20034,7 +20258,7 @@
       </p:grpSpPr>
       <p:sp>
         <p:nvSpPr>
-          <p:cNvPr id="293" name="Google Shape;293;p42"/>
+          <p:cNvPr id="297" name="Google Shape;297;p42"/>
           <p:cNvSpPr txBox="1">
             <a:spLocks noGrp="1"/>
           </p:cNvSpPr>
@@ -20076,7 +20300,7 @@
       </p:sp>
       <p:sp>
         <p:nvSpPr>
-          <p:cNvPr id="294" name="Google Shape;294;p42"/>
+          <p:cNvPr id="298" name="Google Shape;298;p42"/>
           <p:cNvSpPr txBox="1">
             <a:spLocks noGrp="1"/>
           </p:cNvSpPr>
@@ -20203,7 +20427,7 @@
                                           </p:stCondLst>
                                         </p:cTn>
                                         <p:tgtEl>
-                                          <p:spTgt spid="294">
+                                          <p:spTgt spid="298">
                                             <p:txEl>
                                               <p:pRg st="0" end="0"/>
                                             </p:txEl>
@@ -20252,7 +20476,7 @@
                                           </p:stCondLst>
                                         </p:cTn>
                                         <p:tgtEl>
-                                          <p:spTgt spid="294">
+                                          <p:spTgt spid="298">
                                             <p:txEl>
                                               <p:pRg st="1" end="1"/>
                                             </p:txEl>
@@ -20301,7 +20525,7 @@
                                           </p:stCondLst>
                                         </p:cTn>
                                         <p:tgtEl>
-                                          <p:spTgt spid="294">
+                                          <p:spTgt spid="298">
                                             <p:txEl>
                                               <p:pRg st="2" end="2"/>
                                             </p:txEl>
@@ -20350,7 +20574,7 @@
                                           </p:stCondLst>
                                         </p:cTn>
                                         <p:tgtEl>
-                                          <p:spTgt spid="294">
+                                          <p:spTgt spid="298">
                                             <p:txEl>
                                               <p:pRg st="3" end="3"/>
                                             </p:txEl>
@@ -20403,7 +20627,7 @@
   <p:cSld>
     <p:spTree>
       <p:nvGrpSpPr>
-        <p:cNvPr id="1" name="Shape 298"/>
+        <p:cNvPr id="1" name="Shape 302"/>
         <p:cNvGrpSpPr/>
         <p:nvPr/>
       </p:nvGrpSpPr>
@@ -20417,7 +20641,7 @@
       </p:grpSpPr>
       <p:pic>
         <p:nvPicPr>
-          <p:cNvPr id="299" name="Google Shape;299;p43"/>
+          <p:cNvPr id="303" name="Google Shape;303;p43"/>
           <p:cNvPicPr preferRelativeResize="0"/>
           <p:nvPr/>
         </p:nvPicPr>
@@ -20445,7 +20669,7 @@
       </p:pic>
       <p:pic>
         <p:nvPicPr>
-          <p:cNvPr id="300" name="Google Shape;300;p43"/>
+          <p:cNvPr id="304" name="Google Shape;304;p43"/>
           <p:cNvPicPr preferRelativeResize="0"/>
           <p:nvPr/>
         </p:nvPicPr>
@@ -20473,7 +20697,7 @@
       </p:pic>
       <p:pic>
         <p:nvPicPr>
-          <p:cNvPr id="301" name="Google Shape;301;p43"/>
+          <p:cNvPr id="305" name="Google Shape;305;p43"/>
           <p:cNvPicPr preferRelativeResize="0"/>
           <p:nvPr/>
         </p:nvPicPr>
@@ -20501,7 +20725,7 @@
       </p:pic>
       <p:pic>
         <p:nvPicPr>
-          <p:cNvPr id="302" name="Google Shape;302;p43"/>
+          <p:cNvPr id="306" name="Google Shape;306;p43"/>
           <p:cNvPicPr preferRelativeResize="0"/>
           <p:nvPr/>
         </p:nvPicPr>
@@ -20529,7 +20753,7 @@
       </p:pic>
       <p:pic>
         <p:nvPicPr>
-          <p:cNvPr id="303" name="Google Shape;303;p43"/>
+          <p:cNvPr id="307" name="Google Shape;307;p43"/>
           <p:cNvPicPr preferRelativeResize="0"/>
           <p:nvPr/>
         </p:nvPicPr>
@@ -20594,7 +20818,7 @@
                                           </p:stCondLst>
                                         </p:cTn>
                                         <p:tgtEl>
-                                          <p:spTgt spid="300"/>
+                                          <p:spTgt spid="304"/>
                                         </p:tgtEl>
                                         <p:attrNameLst>
                                           <p:attrName>style.visibility</p:attrName>
@@ -20639,7 +20863,7 @@
                                           </p:stCondLst>
                                         </p:cTn>
                                         <p:tgtEl>
-                                          <p:spTgt spid="299"/>
+                                          <p:spTgt spid="303"/>
                                         </p:tgtEl>
                                         <p:attrNameLst>
                                           <p:attrName>style.visibility</p:attrName>
@@ -20684,7 +20908,7 @@
                                           </p:stCondLst>
                                         </p:cTn>
                                         <p:tgtEl>
-                                          <p:spTgt spid="301"/>
+                                          <p:spTgt spid="305"/>
                                         </p:tgtEl>
                                         <p:attrNameLst>
                                           <p:attrName>style.visibility</p:attrName>
@@ -20729,7 +20953,7 @@
                                           </p:stCondLst>
                                         </p:cTn>
                                         <p:tgtEl>
-                                          <p:spTgt spid="302"/>
+                                          <p:spTgt spid="306"/>
                                         </p:tgtEl>
                                         <p:attrNameLst>
                                           <p:attrName>style.visibility</p:attrName>
@@ -20774,7 +20998,7 @@
                                           </p:stCondLst>
                                         </p:cTn>
                                         <p:tgtEl>
-                                          <p:spTgt spid="303"/>
+                                          <p:spTgt spid="307"/>
                                         </p:tgtEl>
                                         <p:attrNameLst>
                                           <p:attrName>style.visibility</p:attrName>
@@ -20823,7 +21047,7 @@
   <p:cSld>
     <p:spTree>
       <p:nvGrpSpPr>
-        <p:cNvPr id="1" name="Shape 307"/>
+        <p:cNvPr id="1" name="Shape 311"/>
         <p:cNvGrpSpPr/>
         <p:nvPr/>
       </p:nvGrpSpPr>
@@ -20837,7 +21061,7 @@
       </p:grpSpPr>
       <p:sp>
         <p:nvSpPr>
-          <p:cNvPr id="308" name="Google Shape;308;p44"/>
+          <p:cNvPr id="312" name="Google Shape;312;p44"/>
           <p:cNvSpPr txBox="1">
             <a:spLocks noGrp="1"/>
           </p:cNvSpPr>
@@ -20879,7 +21103,7 @@
       </p:sp>
       <p:sp>
         <p:nvSpPr>
-          <p:cNvPr id="309" name="Google Shape;309;p44"/>
+          <p:cNvPr id="313" name="Google Shape;313;p44"/>
           <p:cNvSpPr txBox="1">
             <a:spLocks noGrp="1"/>
           </p:cNvSpPr>
@@ -20974,7 +21198,7 @@
                                           </p:stCondLst>
                                         </p:cTn>
                                         <p:tgtEl>
-                                          <p:spTgt spid="309">
+                                          <p:spTgt spid="313">
                                             <p:txEl>
                                               <p:pRg st="0" end="0"/>
                                             </p:txEl>
@@ -21023,7 +21247,7 @@
                                           </p:stCondLst>
                                         </p:cTn>
                                         <p:tgtEl>
-                                          <p:spTgt spid="309">
+                                          <p:spTgt spid="313">
                                             <p:txEl>
                                               <p:pRg st="1" end="1"/>
                                             </p:txEl>
@@ -21076,7 +21300,7 @@
   <p:cSld>
     <p:spTree>
       <p:nvGrpSpPr>
-        <p:cNvPr id="1" name="Shape 313"/>
+        <p:cNvPr id="1" name="Shape 317"/>
         <p:cNvGrpSpPr/>
         <p:nvPr/>
       </p:nvGrpSpPr>
@@ -21090,7 +21314,7 @@
       </p:grpSpPr>
       <p:sp>
         <p:nvSpPr>
-          <p:cNvPr id="314" name="Google Shape;314;p45"/>
+          <p:cNvPr id="318" name="Google Shape;318;p45"/>
           <p:cNvSpPr txBox="1">
             <a:spLocks noGrp="1"/>
           </p:cNvSpPr>
@@ -21132,7 +21356,7 @@
       </p:sp>
       <p:sp>
         <p:nvSpPr>
-          <p:cNvPr id="315" name="Google Shape;315;p45"/>
+          <p:cNvPr id="319" name="Google Shape;319;p45"/>
           <p:cNvSpPr txBox="1">
             <a:spLocks noGrp="1"/>
           </p:cNvSpPr>
@@ -21190,7 +21414,7 @@
       </p:sp>
       <p:pic>
         <p:nvPicPr>
-          <p:cNvPr id="316" name="Google Shape;316;p45"/>
+          <p:cNvPr id="320" name="Google Shape;320;p45"/>
           <p:cNvPicPr preferRelativeResize="0"/>
           <p:nvPr/>
         </p:nvPicPr>
@@ -21218,7 +21442,7 @@
       </p:pic>
       <p:pic>
         <p:nvPicPr>
-          <p:cNvPr id="317" name="Google Shape;317;p45"/>
+          <p:cNvPr id="321" name="Google Shape;321;p45"/>
           <p:cNvPicPr preferRelativeResize="0"/>
           <p:nvPr/>
         </p:nvPicPr>
@@ -21246,7 +21470,7 @@
       </p:pic>
       <p:pic>
         <p:nvPicPr>
-          <p:cNvPr id="318" name="Google Shape;318;p45"/>
+          <p:cNvPr id="322" name="Google Shape;322;p45"/>
           <p:cNvPicPr preferRelativeResize="0"/>
           <p:nvPr/>
         </p:nvPicPr>
@@ -21311,7 +21535,7 @@
                                           </p:stCondLst>
                                         </p:cTn>
                                         <p:tgtEl>
-                                          <p:spTgt spid="316"/>
+                                          <p:spTgt spid="319"/>
                                         </p:tgtEl>
                                         <p:attrNameLst>
                                           <p:attrName>style.visibility</p:attrName>
@@ -21356,7 +21580,7 @@
                                           </p:stCondLst>
                                         </p:cTn>
                                         <p:tgtEl>
-                                          <p:spTgt spid="317"/>
+                                          <p:spTgt spid="320"/>
                                         </p:tgtEl>
                                         <p:attrNameLst>
                                           <p:attrName>style.visibility</p:attrName>
@@ -21401,7 +21625,52 @@
                                           </p:stCondLst>
                                         </p:cTn>
                                         <p:tgtEl>
-                                          <p:spTgt spid="318"/>
+                                          <p:spTgt spid="321"/>
+                                        </p:tgtEl>
+                                        <p:attrNameLst>
+                                          <p:attrName>style.visibility</p:attrName>
+                                        </p:attrNameLst>
+                                      </p:cBhvr>
+                                      <p:to>
+                                        <p:strVal val="visible"/>
+                                      </p:to>
+                                    </p:set>
+                                  </p:childTnLst>
+                                </p:cTn>
+                              </p:par>
+                            </p:childTnLst>
+                          </p:cTn>
+                        </p:par>
+                      </p:childTnLst>
+                    </p:cTn>
+                  </p:par>
+                  <p:par>
+                    <p:cTn id="15" fill="hold">
+                      <p:stCondLst>
+                        <p:cond delay="indefinite"/>
+                      </p:stCondLst>
+                      <p:childTnLst>
+                        <p:par>
+                          <p:cTn id="16" fill="hold">
+                            <p:stCondLst>
+                              <p:cond delay="0"/>
+                            </p:stCondLst>
+                            <p:childTnLst>
+                              <p:par>
+                                <p:cTn id="17" presetID="1" presetClass="entr" presetSubtype="0" fill="hold" nodeType="clickEffect">
+                                  <p:stCondLst>
+                                    <p:cond delay="0"/>
+                                  </p:stCondLst>
+                                  <p:childTnLst>
+                                    <p:set>
+                                      <p:cBhvr>
+                                        <p:cTn id="18" dur="1" fill="hold">
+                                          <p:stCondLst>
+                                            <p:cond delay="0"/>
+                                          </p:stCondLst>
+                                        </p:cTn>
+                                        <p:tgtEl>
+                                          <p:spTgt spid="322"/>
                                         </p:tgtEl>
                                         <p:attrNameLst>
                                           <p:attrName>style.visibility</p:attrName>
@@ -21450,7 +21719,7 @@
   <p:cSld>
     <p:spTree>
       <p:nvGrpSpPr>
-        <p:cNvPr id="1" name="Shape 322"/>
+        <p:cNvPr id="1" name="Shape 326"/>
         <p:cNvGrpSpPr/>
         <p:nvPr/>
       </p:nvGrpSpPr>
@@ -21464,7 +21733,7 @@
       </p:grpSpPr>
       <p:sp>
         <p:nvSpPr>
-          <p:cNvPr id="323" name="Google Shape;323;p46"/>
+          <p:cNvPr id="327" name="Google Shape;327;p46"/>
           <p:cNvSpPr txBox="1">
             <a:spLocks noGrp="1"/>
           </p:cNvSpPr>
@@ -21506,7 +21775,7 @@
       </p:sp>
       <p:sp>
         <p:nvSpPr>
-          <p:cNvPr id="324" name="Google Shape;324;p46"/>
+          <p:cNvPr id="328" name="Google Shape;328;p46"/>
           <p:cNvSpPr txBox="1">
             <a:spLocks noGrp="1"/>
           </p:cNvSpPr>
@@ -21548,7 +21817,7 @@
       </p:sp>
       <p:pic>
         <p:nvPicPr>
-          <p:cNvPr id="325" name="Google Shape;325;p46"/>
+          <p:cNvPr id="329" name="Google Shape;329;p46"/>
           <p:cNvPicPr preferRelativeResize="0"/>
           <p:nvPr/>
         </p:nvPicPr>
@@ -21587,7 +21856,7 @@
   <p:cSld>
     <p:spTree>
       <p:nvGrpSpPr>
-        <p:cNvPr id="1" name="Shape 329"/>
+        <p:cNvPr id="1" name="Shape 333"/>
         <p:cNvGrpSpPr/>
         <p:nvPr/>
       </p:nvGrpSpPr>
@@ -21601,7 +21870,7 @@
       </p:grpSpPr>
       <p:sp>
         <p:nvSpPr>
-          <p:cNvPr id="330" name="Google Shape;330;p47"/>
+          <p:cNvPr id="334" name="Google Shape;334;p47"/>
           <p:cNvSpPr txBox="1">
             <a:spLocks noGrp="1"/>
           </p:cNvSpPr>
@@ -21643,7 +21912,7 @@
       </p:sp>
       <p:sp>
         <p:nvSpPr>
-          <p:cNvPr id="331" name="Google Shape;331;p47"/>
+          <p:cNvPr id="335" name="Google Shape;335;p47"/>
           <p:cNvSpPr txBox="1">
             <a:spLocks noGrp="1"/>
           </p:cNvSpPr>
@@ -21697,7 +21966,7 @@
       </p:sp>
       <p:pic>
         <p:nvPicPr>
-          <p:cNvPr id="332" name="Google Shape;332;p47"/>
+          <p:cNvPr id="336" name="Google Shape;336;p47"/>
           <p:cNvPicPr preferRelativeResize="0"/>
           <p:nvPr/>
         </p:nvPicPr>
@@ -21725,7 +21994,7 @@
       </p:pic>
       <p:pic>
         <p:nvPicPr>
-          <p:cNvPr id="333" name="Google Shape;333;p47"/>
+          <p:cNvPr id="337" name="Google Shape;337;p47"/>
           <p:cNvPicPr preferRelativeResize="0"/>
           <p:nvPr/>
         </p:nvPicPr>
@@ -21753,7 +22022,7 @@
       </p:pic>
       <p:pic>
         <p:nvPicPr>
-          <p:cNvPr id="334" name="Google Shape;334;p47"/>
+          <p:cNvPr id="338" name="Google Shape;338;p47"/>
           <p:cNvPicPr preferRelativeResize="0"/>
           <p:nvPr/>
         </p:nvPicPr>
@@ -21818,7 +22087,7 @@
                                           </p:stCondLst>
                                         </p:cTn>
                                         <p:tgtEl>
-                                          <p:spTgt spid="332"/>
+                                          <p:spTgt spid="336"/>
                                         </p:tgtEl>
                                         <p:attrNameLst>
                                           <p:attrName>style.visibility</p:attrName>
@@ -21863,7 +22132,7 @@
                                           </p:stCondLst>
                                         </p:cTn>
                                         <p:tgtEl>
-                                          <p:spTgt spid="333"/>
+                                          <p:spTgt spid="337"/>
                                         </p:tgtEl>
                                         <p:attrNameLst>
                                           <p:attrName>style.visibility</p:attrName>
@@ -21908,7 +22177,7 @@
                                           </p:stCondLst>
                                         </p:cTn>
                                         <p:tgtEl>
-                                          <p:spTgt spid="334"/>
+                                          <p:spTgt spid="338"/>
                                         </p:tgtEl>
                                         <p:attrNameLst>
                                           <p:attrName>style.visibility</p:attrName>
@@ -21957,7 +22226,7 @@
   <p:cSld>
     <p:spTree>
       <p:nvGrpSpPr>
-        <p:cNvPr id="1" name="Shape 338"/>
+        <p:cNvPr id="1" name="Shape 342"/>
         <p:cNvGrpSpPr/>
         <p:nvPr/>
       </p:nvGrpSpPr>
@@ -21971,7 +22240,7 @@
       </p:grpSpPr>
       <p:sp>
         <p:nvSpPr>
-          <p:cNvPr id="339" name="Google Shape;339;p48"/>
+          <p:cNvPr id="343" name="Google Shape;343;p48"/>
           <p:cNvSpPr txBox="1">
             <a:spLocks noGrp="1"/>
           </p:cNvSpPr>
@@ -22013,7 +22282,7 @@
       </p:sp>
       <p:sp>
         <p:nvSpPr>
-          <p:cNvPr id="340" name="Google Shape;340;p48"/>
+          <p:cNvPr id="344" name="Google Shape;344;p48"/>
           <p:cNvSpPr txBox="1">
             <a:spLocks noGrp="1"/>
           </p:cNvSpPr>
@@ -22195,7 +22464,7 @@
                                           </p:stCondLst>
                                         </p:cTn>
                                         <p:tgtEl>
-                                          <p:spTgt spid="340">
+                                          <p:spTgt spid="344">
                                             <p:txEl>
                                               <p:pRg st="0" end="0"/>
                                             </p:txEl>
@@ -22244,7 +22513,7 @@
                                           </p:stCondLst>
                                         </p:cTn>
                                         <p:tgtEl>
-                                          <p:spTgt spid="340">
+                                          <p:spTgt spid="344">
                                             <p:txEl>
                                               <p:pRg st="1" end="1"/>
                                             </p:txEl>
@@ -22293,7 +22562,7 @@
                                           </p:stCondLst>
                                         </p:cTn>
                                         <p:tgtEl>
-                                          <p:spTgt spid="340">
+                                          <p:spTgt spid="344">
                                             <p:txEl>
                                               <p:pRg st="2" end="2"/>
                                             </p:txEl>
@@ -22342,7 +22611,7 @@
                                           </p:stCondLst>
                                         </p:cTn>
                                         <p:tgtEl>
-                                          <p:spTgt spid="340">
+                                          <p:spTgt spid="344">
                                             <p:txEl>
                                               <p:pRg st="3" end="3"/>
                                             </p:txEl>
@@ -22391,7 +22660,7 @@
                                           </p:stCondLst>
                                         </p:cTn>
                                         <p:tgtEl>
-                                          <p:spTgt spid="340">
+                                          <p:spTgt spid="344">
                                             <p:txEl>
                                               <p:pRg st="4" end="4"/>
                                             </p:txEl>
@@ -22440,7 +22709,7 @@
                                           </p:stCondLst>
                                         </p:cTn>
                                         <p:tgtEl>
-                                          <p:spTgt spid="340">
+                                          <p:spTgt spid="344">
                                             <p:txEl>
                                               <p:pRg st="5" end="5"/>
                                             </p:txEl>
@@ -22489,7 +22758,7 @@
                                           </p:stCondLst>
                                         </p:cTn>
                                         <p:tgtEl>
-                                          <p:spTgt spid="340">
+                                          <p:spTgt spid="344">
                                             <p:txEl>
                                               <p:pRg st="6" end="6"/>
                                             </p:txEl>
@@ -22542,7 +22811,7 @@
   <p:cSld>
     <p:spTree>
       <p:nvGrpSpPr>
-        <p:cNvPr id="1" name="Shape 344"/>
+        <p:cNvPr id="1" name="Shape 348"/>
         <p:cNvGrpSpPr/>
         <p:nvPr/>
       </p:nvGrpSpPr>
@@ -22556,7 +22825,7 @@
       </p:grpSpPr>
       <p:sp>
         <p:nvSpPr>
-          <p:cNvPr id="345" name="Google Shape;345;p49"/>
+          <p:cNvPr id="349" name="Google Shape;349;p49"/>
           <p:cNvSpPr txBox="1">
             <a:spLocks noGrp="1"/>
           </p:cNvSpPr>
@@ -22598,7 +22867,7 @@
       </p:sp>
       <p:sp>
         <p:nvSpPr>
-          <p:cNvPr id="346" name="Google Shape;346;p49"/>
+          <p:cNvPr id="350" name="Google Shape;350;p49"/>
           <p:cNvSpPr txBox="1">
             <a:spLocks noGrp="1"/>
           </p:cNvSpPr>
@@ -22757,7 +23026,7 @@
                                           </p:stCondLst>
                                         </p:cTn>
                                         <p:tgtEl>
-                                          <p:spTgt spid="346">
+                                          <p:spTgt spid="350">
                                             <p:txEl>
                                               <p:pRg st="0" end="0"/>
                                             </p:txEl>
@@ -22806,7 +23075,7 @@
                                           </p:stCondLst>
                                         </p:cTn>
                                         <p:tgtEl>
-                                          <p:spTgt spid="346">
+                                          <p:spTgt spid="350">
                                             <p:txEl>
                                               <p:pRg st="1" end="1"/>
                                             </p:txEl>
@@ -22855,7 +23124,7 @@
                                           </p:stCondLst>
                                         </p:cTn>
                                         <p:tgtEl>
-                                          <p:spTgt spid="346">
+                                          <p:spTgt spid="350">
                                             <p:txEl>
                                               <p:pRg st="2" end="2"/>
                                             </p:txEl>
@@ -22904,7 +23173,7 @@
                                           </p:stCondLst>
                                         </p:cTn>
                                         <p:tgtEl>
-                                          <p:spTgt spid="346">
+                                          <p:spTgt spid="350">
                                             <p:txEl>
                                               <p:pRg st="3" end="3"/>
                                             </p:txEl>
@@ -22953,7 +23222,7 @@
                                           </p:stCondLst>
                                         </p:cTn>
                                         <p:tgtEl>
-                                          <p:spTgt spid="346">
+                                          <p:spTgt spid="350">
                                             <p:txEl>
                                               <p:pRg st="4" end="4"/>
                                             </p:txEl>
@@ -23002,7 +23271,7 @@
                                           </p:stCondLst>
                                         </p:cTn>
                                         <p:tgtEl>
-                                          <p:spTgt spid="346">
+                                          <p:spTgt spid="350">
                                             <p:txEl>
                                               <p:pRg st="5" end="5"/>
                                             </p:txEl>
@@ -23055,7 +23324,7 @@
   <p:cSld>
     <p:spTree>
       <p:nvGrpSpPr>
-        <p:cNvPr id="1" name="Shape 350"/>
+        <p:cNvPr id="1" name="Shape 354"/>
         <p:cNvGrpSpPr/>
         <p:nvPr/>
       </p:nvGrpSpPr>
@@ -23069,7 +23338,7 @@
       </p:grpSpPr>
       <p:sp>
         <p:nvSpPr>
-          <p:cNvPr id="351" name="Google Shape;351;p50"/>
+          <p:cNvPr id="355" name="Google Shape;355;p50"/>
           <p:cNvSpPr txBox="1">
             <a:spLocks noGrp="1"/>
           </p:cNvSpPr>
@@ -23111,7 +23380,7 @@
       </p:sp>
       <p:sp>
         <p:nvSpPr>
-          <p:cNvPr id="352" name="Google Shape;352;p50"/>
+          <p:cNvPr id="356" name="Google Shape;356;p50"/>
           <p:cNvSpPr txBox="1">
             <a:spLocks noGrp="1"/>
           </p:cNvSpPr>
@@ -23160,7 +23429,7 @@
   <p:cSld>
     <p:spTree>
       <p:nvGrpSpPr>
-        <p:cNvPr id="1" name="Shape 114"/>
+        <p:cNvPr id="1" name="Shape 115"/>
         <p:cNvGrpSpPr/>
         <p:nvPr/>
       </p:nvGrpSpPr>
@@ -23174,7 +23443,7 @@
       </p:grpSpPr>
       <p:sp>
         <p:nvSpPr>
-          <p:cNvPr id="115" name="Google Shape;115;p16"/>
+          <p:cNvPr id="116" name="Google Shape;116;p16"/>
           <p:cNvSpPr txBox="1">
             <a:spLocks noGrp="1"/>
           </p:cNvSpPr>
@@ -23216,7 +23485,7 @@
       </p:sp>
       <p:sp>
         <p:nvSpPr>
-          <p:cNvPr id="116" name="Google Shape;116;p16"/>
+          <p:cNvPr id="117" name="Google Shape;117;p16"/>
           <p:cNvSpPr txBox="1">
             <a:spLocks noGrp="1"/>
           </p:cNvSpPr>
@@ -23326,7 +23595,7 @@
       </p:sp>
       <p:pic>
         <p:nvPicPr>
-          <p:cNvPr id="117" name="Google Shape;117;p16" descr="{&quot;mathml&quot;:&quot;&lt;math style=\&quot;font-family:stix;font-size:16px;\&quot; xmlns=\&quot;http://www.w3.org/1998/Math/MathML\&quot;&gt;&lt;mstyle mathsize=\&quot;16px\&quot;&gt;&lt;mi&gt;L&lt;/mi&gt;&lt;mi&gt;i&lt;/mi&gt;&lt;mi&gt;n&lt;/mi&gt;&lt;mi&gt;e&lt;/mi&gt;&lt;mi&gt;&amp;#xE6;&lt;/mi&gt;&lt;mi&gt;r&lt;/mi&gt;&lt;mo&gt;&amp;#xA0;&lt;/mo&gt;&lt;mfenced&gt;&lt;mrow&gt;&lt;mi&gt;p&lt;/mi&gt;&lt;mi&gt;o&lt;/mi&gt;&lt;mi&gt;l&lt;/mi&gt;&lt;mi&gt;y&lt;/mi&gt;&lt;mi&gt;n&lt;/mi&gt;&lt;mi&gt;o&lt;/mi&gt;&lt;mi&gt;m&lt;/mi&gt;&lt;mi&gt;i&lt;/mi&gt;&lt;mi&gt;e&lt;/mi&gt;&lt;mo&gt;&amp;#xA0;&lt;/mo&gt;&lt;mi&gt;g&lt;/mi&gt;&lt;mi&gt;r&lt;/mi&gt;&lt;mi&gt;a&lt;/mi&gt;&lt;mi&gt;d&lt;/mi&gt;&lt;mo&gt;&amp;#xA0;&lt;/mo&gt;&lt;mn&gt;1&lt;/mn&gt;&lt;/mrow&gt;&lt;/mfenced&gt;&lt;mo&gt;:&lt;/mo&gt;&lt;mo&gt;&amp;#xA0;&lt;/mo&gt;&lt;mo&gt;&amp;#xA0;&lt;/mo&gt;&lt;mo&gt;&amp;#xA0;&lt;/mo&gt;&lt;mo&gt;&amp;#xA0;&lt;/mo&gt;&lt;mo&gt;&amp;#xA0;&lt;/mo&gt;&lt;mo&gt;&amp;#xA0;&lt;/mo&gt;&lt;mo&gt;&amp;#xA0;&lt;/mo&gt;&lt;mo&gt;&amp;#xA0;&lt;/mo&gt;&lt;mi&gt;Y&lt;/mi&gt;&lt;mo&gt;&amp;#x2009;&lt;/mo&gt;&lt;mo&gt;=&lt;/mo&gt;&lt;mo&gt;&amp;#x2009;&lt;/mo&gt;&lt;msub&gt;&lt;mi&gt;&amp;#x3B2;&lt;/mi&gt;&lt;mn&gt;0&lt;/mn&gt;&lt;/msub&gt;&lt;mo&gt;&amp;#xA0;&lt;/mo&gt;&lt;mo&gt;+&lt;/mo&gt;&lt;mo&gt;&amp;#xA0;&lt;/mo&gt;&lt;msub&gt;&lt;mi&gt;&amp;#x3B2;&lt;/mi&gt;&lt;mn&gt;1&lt;/mn&gt;&lt;/msub&gt;&lt;mi&gt;X&lt;/mi&gt;&lt;mo&gt;&amp;#xA0;&lt;/mo&gt;&lt;mo&gt;+&lt;/mo&gt;&lt;mo&gt;&amp;#xA0;&lt;/mo&gt;&lt;mi&gt;&amp;#x3B5;&lt;/mi&gt;&lt;mspace linebreak=\&quot;newline\&quot;/&gt;&lt;mi&gt;K&lt;/mi&gt;&lt;mi&gt;v&lt;/mi&gt;&lt;mi&gt;a&lt;/mi&gt;&lt;mi&gt;d&lt;/mi&gt;&lt;mi&gt;r&lt;/mi&gt;&lt;mi&gt;a&lt;/mi&gt;&lt;mi&gt;t&lt;/mi&gt;&lt;mi&gt;i&lt;/mi&gt;&lt;mi&gt;s&lt;/mi&gt;&lt;mi&gt;k&lt;/mi&gt;&lt;mo&gt;&amp;#xA0;&lt;/mo&gt;&lt;mfenced&gt;&lt;mrow&gt;&lt;mi&gt;p&lt;/mi&gt;&lt;mi&gt;o&lt;/mi&gt;&lt;mi&gt;l&lt;/mi&gt;&lt;mi&gt;y&lt;/mi&gt;&lt;mi&gt;n&lt;/mi&gt;&lt;mi&gt;o&lt;/mi&gt;&lt;mi&gt;m&lt;/mi&gt;&lt;mi&gt;i&lt;/mi&gt;&lt;mi&gt;e&lt;/mi&gt;&lt;mo&gt;&amp;#xA0;&lt;/mo&gt;&lt;mi&gt;g&lt;/mi&gt;&lt;mi&gt;r&lt;/mi&gt;&lt;mi&gt;a&lt;/mi&gt;&lt;mi&gt;d&lt;/mi&gt;&lt;mo&gt;&amp;#xA0;&lt;/mo&gt;&lt;mn&gt;2&lt;/mn&gt;&lt;/mrow&gt;&lt;/mfenced&gt;&lt;mo&gt;:&lt;/mo&gt;&lt;mo&gt;&amp;#xA0;&lt;/mo&gt;&lt;mo&gt;&amp;#xA0;&lt;/mo&gt;&lt;mo&gt;&amp;#xA0;&lt;/mo&gt;&lt;mi&gt;Y&lt;/mi&gt;&lt;mo&gt;&amp;#x2009;&lt;/mo&gt;&lt;mo&gt;=&lt;/mo&gt;&lt;mo&gt;&amp;#x2009;&lt;/mo&gt;&lt;msub&gt;&lt;mi&gt;&amp;#x3B2;&lt;/mi&gt;&lt;mn&gt;0&lt;/mn&gt;&lt;/msub&gt;&lt;mo&gt;&amp;#xA0;&lt;/mo&gt;&lt;mo&gt;+&lt;/mo&gt;&lt;mo&gt;&amp;#xA0;&lt;/mo&gt;&lt;msub&gt;&lt;mi&gt;&amp;#x3B2;&lt;/mi&gt;&lt;mn&gt;1&lt;/mn&gt;&lt;/msub&gt;&lt;mi&gt;X&lt;/mi&gt;&lt;mo&gt;&amp;#xA0;&lt;/mo&gt;&lt;mo&gt;+&lt;/mo&gt;&lt;msub&gt;&lt;mi&gt;&amp;#x3B2;&lt;/mi&gt;&lt;mn&gt;2&lt;/mn&gt;&lt;/msub&gt;&lt;mo&gt;&amp;#xA0;&lt;/mo&gt;&lt;msup&gt;&lt;mi&gt;X&lt;/mi&gt;&lt;mn&gt;2&lt;/mn&gt;&lt;/msup&gt;&lt;mo&gt;+&lt;/mo&gt;&lt;mo&gt;&amp;#xA0;&lt;/mo&gt;&lt;mi&gt;&amp;#x3B5;&lt;/mi&gt;&lt;mspace linebreak=\&quot;newline\&quot;/&gt;&lt;mi&gt;K&lt;/mi&gt;&lt;mi&gt;u&lt;/mi&gt;&lt;mi&gt;b&lt;/mi&gt;&lt;mi&gt;i&lt;/mi&gt;&lt;mi&gt;s&lt;/mi&gt;&lt;mi&gt;k&lt;/mi&gt;&lt;mo&gt;&amp;#xA0;&lt;/mo&gt;&lt;mfenced&gt;&lt;mrow&gt;&lt;mi&gt;p&lt;/mi&gt;&lt;mi&gt;o&lt;/mi&gt;&lt;mi&gt;l&lt;/mi&gt;&lt;mi&gt;y&lt;/mi&gt;&lt;mi&gt;n&lt;/mi&gt;&lt;mi&gt;o&lt;/mi&gt;&lt;mi&gt;m&lt;/mi&gt;&lt;mi&gt;i&lt;/mi&gt;&lt;mi&gt;e&lt;/mi&gt;&lt;mo&gt;&amp;#xA0;&lt;/mo&gt;&lt;mi&gt;g&lt;/mi&gt;&lt;mi&gt;r&lt;/mi&gt;&lt;mi&gt;a&lt;/mi&gt;&lt;mi&gt;d&lt;/mi&gt;&lt;mo&gt;&amp;#xA0;&lt;/mo&gt;&lt;mn&gt;3&lt;/mn&gt;&lt;/mrow&gt;&lt;/mfenced&gt;&lt;mo&gt;:&lt;/mo&gt;&lt;mo&gt;&amp;#xA0;&lt;/mo&gt;&lt;mo&gt;&amp;#xA0;&lt;/mo&gt;&lt;mo&gt;&amp;#xA0;&lt;/mo&gt;&lt;mo&gt;&amp;#xA0;&lt;/mo&gt;&lt;mo&gt;&amp;#xA0;&lt;/mo&gt;&lt;mo&gt;&amp;#xA0;&lt;/mo&gt;&lt;mo&gt;&amp;#xA0;&lt;/mo&gt;&lt;mo&gt;&amp;#xA0;&lt;/mo&gt;&lt;mo&gt;&amp;#xA0;&lt;/mo&gt;&lt;mi&gt;Y&lt;/mi&gt;&lt;mo&gt;&amp;#x2009;&lt;/mo&gt;&lt;mo&gt;=&lt;/mo&gt;&lt;mo&gt;&amp;#x2009;&lt;/mo&gt;&lt;msub&gt;&lt;mi&gt;&amp;#x3B2;&lt;/mi&gt;&lt;mn&gt;0&lt;/mn&gt;&lt;/msub&gt;&lt;mo&gt;&amp;#xA0;&lt;/mo&gt;&lt;mo&gt;+&lt;/mo&gt;&lt;mo&gt;&amp;#xA0;&lt;/mo&gt;&lt;msub&gt;&lt;mi&gt;&amp;#x3B2;&lt;/mi&gt;&lt;mn&gt;1&lt;/mn&gt;&lt;/msub&gt;&lt;mi&gt;X&lt;/mi&gt;&lt;mo&gt;&amp;#xA0;&lt;/mo&gt;&lt;mo&gt;+&lt;/mo&gt;&lt;msub&gt;&lt;mi&gt;&amp;#x3B2;&lt;/mi&gt;&lt;mn&gt;2&lt;/mn&gt;&lt;/msub&gt;&lt;mo&gt;&amp;#xA0;&lt;/mo&gt;&lt;msup&gt;&lt;mi&gt;X&lt;/mi&gt;&lt;mn&gt;2&lt;/mn&gt;&lt;/msup&gt;&lt;mo&gt;+&lt;/mo&gt;&lt;msub&gt;&lt;mi&gt;&amp;#x3B2;&lt;/mi&gt;&lt;mn&gt;3&lt;/mn&gt;&lt;/msub&gt;&lt;mo&gt;&amp;#xA0;&lt;/mo&gt;&lt;msup&gt;&lt;mi&gt;X&lt;/mi&gt;&lt;mn&gt;3&lt;/mn&gt;&lt;/msup&gt;&lt;mo&gt;&amp;#xA0;&lt;/mo&gt;&lt;mo&gt;+&lt;/mo&gt;&lt;mo&gt;&amp;#xA0;&lt;/mo&gt;&lt;mi&gt;&amp;#x3B5;&lt;/mi&gt;&lt;mspace linebreak=\&quot;newline\&quot;/&gt;&lt;mi&gt;G&lt;/mi&gt;&lt;mi&gt;e&lt;/mi&gt;&lt;mi&gt;n&lt;/mi&gt;&lt;mi&gt;e&lt;/mi&gt;&lt;mi&gt;r&lt;/mi&gt;&lt;mi&gt;e&lt;/mi&gt;&lt;mi&gt;l&lt;/mi&gt;&lt;mo&gt;&amp;#xA0;&lt;/mo&gt;&lt;mfenced&gt;&lt;mrow&gt;&lt;mi&gt;p&lt;/mi&gt;&lt;mi&gt;o&lt;/mi&gt;&lt;mi&gt;l&lt;/mi&gt;&lt;mi&gt;y&lt;/mi&gt;&lt;mi&gt;n&lt;/mi&gt;&lt;mi&gt;o&lt;/mi&gt;&lt;mi&gt;m&lt;/mi&gt;&lt;mi&gt;i&lt;/mi&gt;&lt;mi&gt;e&lt;/mi&gt;&lt;mo&gt;&amp;#xA0;&lt;/mo&gt;&lt;mi&gt;i&lt;/mi&gt;&lt;mo&gt;&amp;#xA0;&lt;/mo&gt;&lt;mi&gt;n&lt;/mi&gt;&lt;mo&gt;'&lt;/mo&gt;&lt;mi&gt;t&lt;/mi&gt;&lt;mi&gt;e&lt;/mi&gt;&lt;/mrow&gt;&lt;/mfenced&gt;&lt;mo&gt;:&lt;/mo&gt;&lt;mo&gt;&amp;#xA0;&lt;/mo&gt;&lt;mo&gt;&amp;#xA0;&lt;/mo&gt;&lt;mo&gt;&amp;#xA0;&lt;/mo&gt;&lt;mo&gt;&amp;#xA0;&lt;/mo&gt;&lt;mo&gt;&amp;#xA0;&lt;/mo&gt;&lt;mo&gt;&amp;#xA0;&lt;/mo&gt;&lt;mo&gt;&amp;#xA0;&lt;/mo&gt;&lt;mo&gt;&amp;#xA0;&lt;/mo&gt;&lt;mo&gt;&amp;#xA0;&lt;/mo&gt;&lt;mi&gt;Y&lt;/mi&gt;&lt;mo&gt;&amp;#x2009;&lt;/mo&gt;&lt;mo&gt;=&lt;/mo&gt;&lt;mo&gt;&amp;#x2009;&lt;/mo&gt;&lt;msub&gt;&lt;mi&gt;&amp;#x3B2;&lt;/mi&gt;&lt;mn&gt;0&lt;/mn&gt;&lt;/msub&gt;&lt;mo&gt;&amp;#xA0;&lt;/mo&gt;&lt;mo&gt;+&lt;/mo&gt;&lt;mo&gt;&amp;#xA0;&lt;/mo&gt;&lt;msub&gt;&lt;mi&gt;&amp;#x3B2;&lt;/mi&gt;&lt;mn&gt;1&lt;/mn&gt;&lt;/msub&gt;&lt;mi&gt;X&lt;/mi&gt;&lt;mo&gt;&amp;#xA0;&lt;/mo&gt;&lt;mo&gt;+&lt;/mo&gt;&lt;msub&gt;&lt;mi&gt;&amp;#x3B2;&lt;/mi&gt;&lt;mn&gt;2&lt;/mn&gt;&lt;/msub&gt;&lt;mo&gt;&amp;#xA0;&lt;/mo&gt;&lt;msup&gt;&lt;mi&gt;X&lt;/mi&gt;&lt;mn&gt;2&lt;/mn&gt;&lt;/msup&gt;&lt;mo&gt;+&lt;/mo&gt;&lt;mo&gt;.&lt;/mo&gt;&lt;mo&gt;.&lt;/mo&gt;&lt;mo&gt;.&lt;/mo&gt;&lt;mo&gt;&amp;#xA0;&lt;/mo&gt;&lt;mo&gt;+&lt;/mo&gt;&lt;mo&gt;&amp;#xA0;&lt;/mo&gt;&lt;msub&gt;&lt;mi&gt;&amp;#x3B2;&lt;/mi&gt;&lt;mi&gt;n&lt;/mi&gt;&lt;/msub&gt;&lt;mo&gt;&amp;#xA0;&lt;/mo&gt;&lt;msup&gt;&lt;mi&gt;X&lt;/mi&gt;&lt;mi&gt;n&lt;/mi&gt;&lt;/msup&gt;&lt;mo&gt;&amp;#xA0;&lt;/mo&gt;&lt;mo&gt;+&lt;/mo&gt;&lt;mo&gt;&amp;#xA0;&lt;/mo&gt;&lt;mi&gt;&amp;#x3B5;&lt;/mi&gt;&lt;/mstyle&gt;&lt;/math&gt;&quot;,&quot;truncated&quot;:false}" title="L i n e æ r space open parentheses p o l y n o m i e space g r a d space 1 close parentheses colon space space space space space space space space Y thin space equals thin space beta subscript 0 space plus space beta subscript 1 X space plus space epsilon&#10;K v a d r a t i s k space open parentheses p o l y n o m i e space g r a d space 2 close parentheses colon space space space Y thin space equals thin space beta subscript 0 space plus space beta subscript 1 X space plus beta subscript 2 space X squared plus space epsilon&#10;K u b i s k space open parentheses p o l y n o m i e space g r a d space 3 close parentheses colon space space space space space space space space space Y thin space equals thin space beta subscript 0 space plus space beta subscript 1 X space plus beta subscript 2 space X squared plus beta subscript 3 space X cubed space plus space epsilon&#10;G e n e r e l space open parentheses p o l y n o m i e space i space n apostrophe t e close parentheses colon space space space space space space space space space Y thin space equals thin space beta subscript 0 space plus space beta subscript 1 X space plus beta subscript 2 space X squared plus... space plus space beta subscript n space X to the power of n space plus space epsilon"/>
+          <p:cNvPr id="118" name="Google Shape;118;p16" descr="{&quot;mathml&quot;:&quot;&lt;math style=\&quot;font-family:stix;font-size:16px;\&quot; xmlns=\&quot;http://www.w3.org/1998/Math/MathML\&quot;&gt;&lt;mstyle mathsize=\&quot;16px\&quot;&gt;&lt;mi&gt;L&lt;/mi&gt;&lt;mi&gt;i&lt;/mi&gt;&lt;mi&gt;n&lt;/mi&gt;&lt;mi&gt;e&lt;/mi&gt;&lt;mi&gt;&amp;#xE6;&lt;/mi&gt;&lt;mi&gt;r&lt;/mi&gt;&lt;mo&gt;&amp;#xA0;&lt;/mo&gt;&lt;mfenced&gt;&lt;mrow&gt;&lt;mi&gt;p&lt;/mi&gt;&lt;mi&gt;o&lt;/mi&gt;&lt;mi&gt;l&lt;/mi&gt;&lt;mi&gt;y&lt;/mi&gt;&lt;mi&gt;n&lt;/mi&gt;&lt;mi&gt;o&lt;/mi&gt;&lt;mi&gt;m&lt;/mi&gt;&lt;mi&gt;i&lt;/mi&gt;&lt;mi&gt;e&lt;/mi&gt;&lt;mo&gt;&amp;#xA0;&lt;/mo&gt;&lt;mi&gt;g&lt;/mi&gt;&lt;mi&gt;r&lt;/mi&gt;&lt;mi&gt;a&lt;/mi&gt;&lt;mi&gt;d&lt;/mi&gt;&lt;mo&gt;&amp;#xA0;&lt;/mo&gt;&lt;mn&gt;1&lt;/mn&gt;&lt;/mrow&gt;&lt;/mfenced&gt;&lt;mo&gt;:&lt;/mo&gt;&lt;mo&gt;&amp;#xA0;&lt;/mo&gt;&lt;mo&gt;&amp;#xA0;&lt;/mo&gt;&lt;mo&gt;&amp;#xA0;&lt;/mo&gt;&lt;mo&gt;&amp;#xA0;&lt;/mo&gt;&lt;mo&gt;&amp;#xA0;&lt;/mo&gt;&lt;mo&gt;&amp;#xA0;&lt;/mo&gt;&lt;mo&gt;&amp;#xA0;&lt;/mo&gt;&lt;mo&gt;&amp;#xA0;&lt;/mo&gt;&lt;mi&gt;Y&lt;/mi&gt;&lt;mo&gt;&amp;#x2009;&lt;/mo&gt;&lt;mo&gt;=&lt;/mo&gt;&lt;mo&gt;&amp;#x2009;&lt;/mo&gt;&lt;msub&gt;&lt;mi&gt;&amp;#x3B2;&lt;/mi&gt;&lt;mn&gt;0&lt;/mn&gt;&lt;/msub&gt;&lt;mo&gt;&amp;#xA0;&lt;/mo&gt;&lt;mo&gt;+&lt;/mo&gt;&lt;mo&gt;&amp;#xA0;&lt;/mo&gt;&lt;msub&gt;&lt;mi&gt;&amp;#x3B2;&lt;/mi&gt;&lt;mn&gt;1&lt;/mn&gt;&lt;/msub&gt;&lt;mi&gt;X&lt;/mi&gt;&lt;mo&gt;&amp;#xA0;&lt;/mo&gt;&lt;mo&gt;+&lt;/mo&gt;&lt;mo&gt;&amp;#xA0;&lt;/mo&gt;&lt;mi&gt;&amp;#x3B5;&lt;/mi&gt;&lt;mspace linebreak=\&quot;newline\&quot;/&gt;&lt;mi&gt;K&lt;/mi&gt;&lt;mi&gt;v&lt;/mi&gt;&lt;mi&gt;a&lt;/mi&gt;&lt;mi&gt;d&lt;/mi&gt;&lt;mi&gt;r&lt;/mi&gt;&lt;mi&gt;a&lt;/mi&gt;&lt;mi&gt;t&lt;/mi&gt;&lt;mi&gt;i&lt;/mi&gt;&lt;mi&gt;s&lt;/mi&gt;&lt;mi&gt;k&lt;/mi&gt;&lt;mo&gt;&amp;#xA0;&lt;/mo&gt;&lt;mfenced&gt;&lt;mrow&gt;&lt;mi&gt;p&lt;/mi&gt;&lt;mi&gt;o&lt;/mi&gt;&lt;mi&gt;l&lt;/mi&gt;&lt;mi&gt;y&lt;/mi&gt;&lt;mi&gt;n&lt;/mi&gt;&lt;mi&gt;o&lt;/mi&gt;&lt;mi&gt;m&lt;/mi&gt;&lt;mi&gt;i&lt;/mi&gt;&lt;mi&gt;e&lt;/mi&gt;&lt;mo&gt;&amp;#xA0;&lt;/mo&gt;&lt;mi&gt;g&lt;/mi&gt;&lt;mi&gt;r&lt;/mi&gt;&lt;mi&gt;a&lt;/mi&gt;&lt;mi&gt;d&lt;/mi&gt;&lt;mo&gt;&amp;#xA0;&lt;/mo&gt;&lt;mn&gt;2&lt;/mn&gt;&lt;/mrow&gt;&lt;/mfenced&gt;&lt;mo&gt;:&lt;/mo&gt;&lt;mo&gt;&amp;#xA0;&lt;/mo&gt;&lt;mo&gt;&amp;#xA0;&lt;/mo&gt;&lt;mo&gt;&amp;#xA0;&lt;/mo&gt;&lt;mi&gt;Y&lt;/mi&gt;&lt;mo&gt;&amp;#x2009;&lt;/mo&gt;&lt;mo&gt;=&lt;/mo&gt;&lt;mo&gt;&amp;#x2009;&lt;/mo&gt;&lt;msub&gt;&lt;mi&gt;&amp;#x3B2;&lt;/mi&gt;&lt;mn&gt;0&lt;/mn&gt;&lt;/msub&gt;&lt;mo&gt;&amp;#xA0;&lt;/mo&gt;&lt;mo&gt;+&lt;/mo&gt;&lt;mo&gt;&amp;#xA0;&lt;/mo&gt;&lt;msub&gt;&lt;mi&gt;&amp;#x3B2;&lt;/mi&gt;&lt;mn&gt;1&lt;/mn&gt;&lt;/msub&gt;&lt;mi&gt;X&lt;/mi&gt;&lt;mo&gt;&amp;#xA0;&lt;/mo&gt;&lt;mo&gt;+&lt;/mo&gt;&lt;msub&gt;&lt;mi&gt;&amp;#x3B2;&lt;/mi&gt;&lt;mn&gt;2&lt;/mn&gt;&lt;/msub&gt;&lt;mo&gt;&amp;#xA0;&lt;/mo&gt;&lt;msup&gt;&lt;mi&gt;X&lt;/mi&gt;&lt;mn&gt;2&lt;/mn&gt;&lt;/msup&gt;&lt;mo&gt;+&lt;/mo&gt;&lt;mo&gt;&amp;#xA0;&lt;/mo&gt;&lt;mi&gt;&amp;#x3B5;&lt;/mi&gt;&lt;mspace linebreak=\&quot;newline\&quot;/&gt;&lt;mi&gt;K&lt;/mi&gt;&lt;mi&gt;u&lt;/mi&gt;&lt;mi&gt;b&lt;/mi&gt;&lt;mi&gt;i&lt;/mi&gt;&lt;mi&gt;s&lt;/mi&gt;&lt;mi&gt;k&lt;/mi&gt;&lt;mo&gt;&amp;#xA0;&lt;/mo&gt;&lt;mfenced&gt;&lt;mrow&gt;&lt;mi&gt;p&lt;/mi&gt;&lt;mi&gt;o&lt;/mi&gt;&lt;mi&gt;l&lt;/mi&gt;&lt;mi&gt;y&lt;/mi&gt;&lt;mi&gt;n&lt;/mi&gt;&lt;mi&gt;o&lt;/mi&gt;&lt;mi&gt;m&lt;/mi&gt;&lt;mi&gt;i&lt;/mi&gt;&lt;mi&gt;e&lt;/mi&gt;&lt;mo&gt;&amp;#xA0;&lt;/mo&gt;&lt;mi&gt;g&lt;/mi&gt;&lt;mi&gt;r&lt;/mi&gt;&lt;mi&gt;a&lt;/mi&gt;&lt;mi&gt;d&lt;/mi&gt;&lt;mo&gt;&amp;#xA0;&lt;/mo&gt;&lt;mn&gt;3&lt;/mn&gt;&lt;/mrow&gt;&lt;/mfenced&gt;&lt;mo&gt;:&lt;/mo&gt;&lt;mo&gt;&amp;#xA0;&lt;/mo&gt;&lt;mo&gt;&amp;#xA0;&lt;/mo&gt;&lt;mo&gt;&amp;#xA0;&lt;/mo&gt;&lt;mo&gt;&amp;#xA0;&lt;/mo&gt;&lt;mo&gt;&amp;#xA0;&lt;/mo&gt;&lt;mo&gt;&amp;#xA0;&lt;/mo&gt;&lt;mo&gt;&amp;#xA0;&lt;/mo&gt;&lt;mo&gt;&amp;#xA0;&lt;/mo&gt;&lt;mo&gt;&amp;#xA0;&lt;/mo&gt;&lt;mi&gt;Y&lt;/mi&gt;&lt;mo&gt;&amp;#x2009;&lt;/mo&gt;&lt;mo&gt;=&lt;/mo&gt;&lt;mo&gt;&amp;#x2009;&lt;/mo&gt;&lt;msub&gt;&lt;mi&gt;&amp;#x3B2;&lt;/mi&gt;&lt;mn&gt;0&lt;/mn&gt;&lt;/msub&gt;&lt;mo&gt;&amp;#xA0;&lt;/mo&gt;&lt;mo&gt;+&lt;/mo&gt;&lt;mo&gt;&amp;#xA0;&lt;/mo&gt;&lt;msub&gt;&lt;mi&gt;&amp;#x3B2;&lt;/mi&gt;&lt;mn&gt;1&lt;/mn&gt;&lt;/msub&gt;&lt;mi&gt;X&lt;/mi&gt;&lt;mo&gt;&amp;#xA0;&lt;/mo&gt;&lt;mo&gt;+&lt;/mo&gt;&lt;msub&gt;&lt;mi&gt;&amp;#x3B2;&lt;/mi&gt;&lt;mn&gt;2&lt;/mn&gt;&lt;/msub&gt;&lt;mo&gt;&amp;#xA0;&lt;/mo&gt;&lt;msup&gt;&lt;mi&gt;X&lt;/mi&gt;&lt;mn&gt;2&lt;/mn&gt;&lt;/msup&gt;&lt;mo&gt;+&lt;/mo&gt;&lt;msub&gt;&lt;mi&gt;&amp;#x3B2;&lt;/mi&gt;&lt;mn&gt;3&lt;/mn&gt;&lt;/msub&gt;&lt;mo&gt;&amp;#xA0;&lt;/mo&gt;&lt;msup&gt;&lt;mi&gt;X&lt;/mi&gt;&lt;mn&gt;3&lt;/mn&gt;&lt;/msup&gt;&lt;mo&gt;&amp;#xA0;&lt;/mo&gt;&lt;mo&gt;+&lt;/mo&gt;&lt;mo&gt;&amp;#xA0;&lt;/mo&gt;&lt;mi&gt;&amp;#x3B5;&lt;/mi&gt;&lt;mspace linebreak=\&quot;newline\&quot;/&gt;&lt;mi&gt;G&lt;/mi&gt;&lt;mi&gt;e&lt;/mi&gt;&lt;mi&gt;n&lt;/mi&gt;&lt;mi&gt;e&lt;/mi&gt;&lt;mi&gt;r&lt;/mi&gt;&lt;mi&gt;e&lt;/mi&gt;&lt;mi&gt;l&lt;/mi&gt;&lt;mo&gt;&amp;#xA0;&lt;/mo&gt;&lt;mfenced&gt;&lt;mrow&gt;&lt;mi&gt;p&lt;/mi&gt;&lt;mi&gt;o&lt;/mi&gt;&lt;mi&gt;l&lt;/mi&gt;&lt;mi&gt;y&lt;/mi&gt;&lt;mi&gt;n&lt;/mi&gt;&lt;mi&gt;o&lt;/mi&gt;&lt;mi&gt;m&lt;/mi&gt;&lt;mi&gt;i&lt;/mi&gt;&lt;mi&gt;e&lt;/mi&gt;&lt;mo&gt;&amp;#xA0;&lt;/mo&gt;&lt;mi&gt;i&lt;/mi&gt;&lt;mo&gt;&amp;#xA0;&lt;/mo&gt;&lt;mi&gt;n&lt;/mi&gt;&lt;mo&gt;'&lt;/mo&gt;&lt;mi&gt;t&lt;/mi&gt;&lt;mi&gt;e&lt;/mi&gt;&lt;/mrow&gt;&lt;/mfenced&gt;&lt;mo&gt;:&lt;/mo&gt;&lt;mo&gt;&amp;#xA0;&lt;/mo&gt;&lt;mo&gt;&amp;#xA0;&lt;/mo&gt;&lt;mo&gt;&amp;#xA0;&lt;/mo&gt;&lt;mo&gt;&amp;#xA0;&lt;/mo&gt;&lt;mo&gt;&amp;#xA0;&lt;/mo&gt;&lt;mo&gt;&amp;#xA0;&lt;/mo&gt;&lt;mo&gt;&amp;#xA0;&lt;/mo&gt;&lt;mo&gt;&amp;#xA0;&lt;/mo&gt;&lt;mo&gt;&amp;#xA0;&lt;/mo&gt;&lt;mi&gt;Y&lt;/mi&gt;&lt;mo&gt;&amp;#x2009;&lt;/mo&gt;&lt;mo&gt;=&lt;/mo&gt;&lt;mo&gt;&amp;#x2009;&lt;/mo&gt;&lt;msub&gt;&lt;mi&gt;&amp;#x3B2;&lt;/mi&gt;&lt;mn&gt;0&lt;/mn&gt;&lt;/msub&gt;&lt;mo&gt;&amp;#xA0;&lt;/mo&gt;&lt;mo&gt;+&lt;/mo&gt;&lt;mo&gt;&amp;#xA0;&lt;/mo&gt;&lt;msub&gt;&lt;mi&gt;&amp;#x3B2;&lt;/mi&gt;&lt;mn&gt;1&lt;/mn&gt;&lt;/msub&gt;&lt;mi&gt;X&lt;/mi&gt;&lt;mo&gt;&amp;#xA0;&lt;/mo&gt;&lt;mo&gt;+&lt;/mo&gt;&lt;msub&gt;&lt;mi&gt;&amp;#x3B2;&lt;/mi&gt;&lt;mn&gt;2&lt;/mn&gt;&lt;/msub&gt;&lt;mo&gt;&amp;#xA0;&lt;/mo&gt;&lt;msup&gt;&lt;mi&gt;X&lt;/mi&gt;&lt;mn&gt;2&lt;/mn&gt;&lt;/msup&gt;&lt;mo&gt;+&lt;/mo&gt;&lt;mo&gt;.&lt;/mo&gt;&lt;mo&gt;.&lt;/mo&gt;&lt;mo&gt;.&lt;/mo&gt;&lt;mo&gt;&amp;#xA0;&lt;/mo&gt;&lt;mo&gt;+&lt;/mo&gt;&lt;mo&gt;&amp;#xA0;&lt;/mo&gt;&lt;msub&gt;&lt;mi&gt;&amp;#x3B2;&lt;/mi&gt;&lt;mi&gt;n&lt;/mi&gt;&lt;/msub&gt;&lt;mo&gt;&amp;#xA0;&lt;/mo&gt;&lt;msup&gt;&lt;mi&gt;X&lt;/mi&gt;&lt;mi&gt;n&lt;/mi&gt;&lt;/msup&gt;&lt;mo&gt;&amp;#xA0;&lt;/mo&gt;&lt;mo&gt;+&lt;/mo&gt;&lt;mo&gt;&amp;#xA0;&lt;/mo&gt;&lt;mi&gt;&amp;#x3B5;&lt;/mi&gt;&lt;/mstyle&gt;&lt;/math&gt;&quot;,&quot;truncated&quot;:false}" title="L i n e æ r space open parentheses p o l y n o m i e space g r a d space 1 close parentheses colon space space space space space space space space Y thin space equals thin space beta subscript 0 space plus space beta subscript 1 X space plus space epsilon&#10;K v a d r a t i s k space open parentheses p o l y n o m i e space g r a d space 2 close parentheses colon space space space Y thin space equals thin space beta subscript 0 space plus space beta subscript 1 X space plus beta subscript 2 space X squared plus space epsilon&#10;K u b i s k space open parentheses p o l y n o m i e space g r a d space 3 close parentheses colon space space space space space space space space space Y thin space equals thin space beta subscript 0 space plus space beta subscript 1 X space plus beta subscript 2 space X squared plus beta subscript 3 space X cubed space plus space epsilon&#10;G e n e r e l space open parentheses p o l y n o m i e space i space n apostrophe t e close parentheses colon space space space space space space space space space Y thin space equals thin space beta subscript 0 space plus space beta subscript 1 X space plus beta subscript 2 space X squared plus... space plus space beta subscript n space X to the power of n space plus space epsilon"/>
           <p:cNvPicPr preferRelativeResize="0"/>
           <p:nvPr/>
         </p:nvPicPr>
@@ -23354,7 +23623,7 @@
       </p:pic>
       <p:pic>
         <p:nvPicPr>
-          <p:cNvPr id="118" name="Google Shape;118;p16" descr="{&quot;mathml&quot;:&quot;&lt;math style=\&quot;font-family:stix;font-size:16px;\&quot; xmlns=\&quot;http://www.w3.org/1998/Math/MathML\&quot;&gt;&lt;mstyle mathsize=\&quot;16px\&quot;&gt;&lt;mi&gt;Y&lt;/mi&gt;&lt;mo&gt;&amp;#xA0;&lt;/mo&gt;&lt;mo&gt;=&lt;/mo&gt;&lt;mo&gt;&amp;#xA0;&lt;/mo&gt;&lt;msub&gt;&lt;mi&gt;&amp;#x3B2;&lt;/mi&gt;&lt;mn&gt;0&lt;/mn&gt;&lt;/msub&gt;&lt;mo&gt;&amp;#xA0;&lt;/mo&gt;&lt;mo&gt;+&lt;/mo&gt;&lt;mo&gt;&amp;#xA0;&lt;/mo&gt;&lt;munderover&gt;&lt;mo&gt;&amp;#x2211;&lt;/mo&gt;&lt;mrow&gt;&lt;mi&gt;k&lt;/mi&gt;&lt;mo&gt;&amp;#xA0;&lt;/mo&gt;&lt;mo&gt;=&lt;/mo&gt;&lt;mo&gt;&amp;#xA0;&lt;/mo&gt;&lt;mn&gt;1&lt;/mn&gt;&lt;/mrow&gt;&lt;mi&gt;K&lt;/mi&gt;&lt;/munderover&gt;&lt;mo&gt;&amp;#xA0;&lt;/mo&gt;&lt;msub&gt;&lt;mi&gt;&amp;#x3B2;&lt;/mi&gt;&lt;mi&gt;k&lt;/mi&gt;&lt;/msub&gt;&lt;mo&gt;&amp;#xA0;&lt;/mo&gt;&lt;msub&gt;&lt;mi&gt;X&lt;/mi&gt;&lt;mi&gt;k&lt;/mi&gt;&lt;/msub&gt;&lt;mo&gt;&amp;#xA0;&lt;/mo&gt;&lt;mo&gt;+&lt;/mo&gt;&lt;mo&gt;&amp;#xA0;&lt;/mo&gt;&lt;mi&gt;&amp;#x3B5;&lt;/mi&gt;&lt;mspace linebreak=\&quot;newline\&quot;/&gt;&lt;/mstyle&gt;&lt;/math&gt;&quot;,&quot;truncated&quot;:false}" title="Y space equals space beta subscript 0 space plus space sum from k space equals space 1 to K of space beta subscript k space X subscript k space plus space epsilon&#10;"/>
+          <p:cNvPr id="119" name="Google Shape;119;p16" descr="{&quot;mathml&quot;:&quot;&lt;math style=\&quot;font-family:stix;font-size:16px;\&quot; xmlns=\&quot;http://www.w3.org/1998/Math/MathML\&quot;&gt;&lt;mstyle mathsize=\&quot;16px\&quot;&gt;&lt;mi&gt;Y&lt;/mi&gt;&lt;mo&gt;&amp;#xA0;&lt;/mo&gt;&lt;mo&gt;=&lt;/mo&gt;&lt;mo&gt;&amp;#xA0;&lt;/mo&gt;&lt;msub&gt;&lt;mi&gt;&amp;#x3B2;&lt;/mi&gt;&lt;mn&gt;0&lt;/mn&gt;&lt;/msub&gt;&lt;mo&gt;&amp;#xA0;&lt;/mo&gt;&lt;mo&gt;+&lt;/mo&gt;&lt;mo&gt;&amp;#xA0;&lt;/mo&gt;&lt;munderover&gt;&lt;mo&gt;&amp;#x2211;&lt;/mo&gt;&lt;mrow&gt;&lt;mi&gt;k&lt;/mi&gt;&lt;mo&gt;&amp;#xA0;&lt;/mo&gt;&lt;mo&gt;=&lt;/mo&gt;&lt;mo&gt;&amp;#xA0;&lt;/mo&gt;&lt;mn&gt;1&lt;/mn&gt;&lt;/mrow&gt;&lt;mi&gt;K&lt;/mi&gt;&lt;/munderover&gt;&lt;mo&gt;&amp;#xA0;&lt;/mo&gt;&lt;msub&gt;&lt;mi&gt;&amp;#x3B2;&lt;/mi&gt;&lt;mi&gt;k&lt;/mi&gt;&lt;/msub&gt;&lt;mo&gt;&amp;#xA0;&lt;/mo&gt;&lt;msub&gt;&lt;mi&gt;X&lt;/mi&gt;&lt;mi&gt;k&lt;/mi&gt;&lt;/msub&gt;&lt;mo&gt;&amp;#xA0;&lt;/mo&gt;&lt;mo&gt;+&lt;/mo&gt;&lt;mo&gt;&amp;#xA0;&lt;/mo&gt;&lt;mi&gt;&amp;#x3B5;&lt;/mi&gt;&lt;mspace linebreak=\&quot;newline\&quot;/&gt;&lt;/mstyle&gt;&lt;/math&gt;&quot;,&quot;truncated&quot;:false}" title="Y space equals space beta subscript 0 space plus space sum from k space equals space 1 to K of space beta subscript k space X subscript k space plus space epsilon&#10;"/>
           <p:cNvPicPr preferRelativeResize="0"/>
           <p:nvPr/>
         </p:nvPicPr>
@@ -23382,7 +23651,7 @@
       </p:pic>
       <p:pic>
         <p:nvPicPr>
-          <p:cNvPr id="119" name="Google Shape;119;p16" descr="{&quot;mathml&quot;:&quot;&lt;math style=\&quot;font-family:stix;font-size:16px;\&quot; xmlns=\&quot;http://www.w3.org/1998/Math/MathML\&quot;&gt;&lt;mstyle mathsize=\&quot;16px\&quot;&gt;&lt;mi&gt;Y&lt;/mi&gt;&lt;mo&gt;&amp;#xA0;&lt;/mo&gt;&lt;mo&gt;=&lt;/mo&gt;&lt;mo&gt;&amp;#xA0;&lt;/mo&gt;&lt;msub&gt;&lt;mi&gt;&amp;#x3B2;&lt;/mi&gt;&lt;mn&gt;0&lt;/mn&gt;&lt;/msub&gt;&lt;mo&gt;&amp;#xA0;&lt;/mo&gt;&lt;mo&gt;+&lt;/mo&gt;&lt;mo&gt;&amp;#xA0;&lt;/mo&gt;&lt;msub&gt;&lt;mi&gt;&amp;#x3B2;&lt;/mi&gt;&lt;mn&gt;1&lt;/mn&gt;&lt;/msub&gt;&lt;mo&gt;&amp;#xB7;&lt;/mo&gt;&lt;msub&gt;&lt;mi&gt;X&lt;/mi&gt;&lt;mn&gt;1&lt;/mn&gt;&lt;/msub&gt;&lt;mo&gt;&amp;#xA0;&lt;/mo&gt;&lt;mo&gt;+&lt;/mo&gt;&lt;msub&gt;&lt;mi&gt;&amp;#x3B2;&lt;/mi&gt;&lt;mn&gt;2&lt;/mn&gt;&lt;/msub&gt;&lt;mo&gt;&amp;#xB7;&lt;/mo&gt;&lt;mn&gt;1&lt;/mn&gt;&lt;mfenced&gt;&lt;mrow&gt;&lt;msub&gt;&lt;mi&gt;X&lt;/mi&gt;&lt;mn&gt;2&lt;/mn&gt;&lt;/msub&gt;&lt;mo&gt;&amp;#xA0;&lt;/mo&gt;&lt;mo&gt;=&lt;/mo&gt;&lt;mo&gt;&amp;#x2009;&lt;/mo&gt;&lt;msub&gt;&lt;mi&gt;x&lt;/mi&gt;&lt;mn&gt;2&lt;/mn&gt;&lt;/msub&gt;&lt;/mrow&gt;&lt;/mfenced&gt;&lt;mo&gt;&amp;#xA0;&lt;/mo&gt;&lt;mo&gt;+&lt;/mo&gt;&lt;mo&gt;&amp;#xA0;&lt;/mo&gt;&lt;msub&gt;&lt;mi&gt;&amp;#x3B2;&lt;/mi&gt;&lt;mn&gt;3&lt;/mn&gt;&lt;/msub&gt;&lt;mo&gt;&amp;#xB7;&lt;/mo&gt;&lt;msub&gt;&lt;mi&gt;X&lt;/mi&gt;&lt;mn&gt;1&lt;/mn&gt;&lt;/msub&gt;&lt;mo&gt;&amp;#xB7;&lt;/mo&gt;&lt;mn&gt;1&lt;/mn&gt;&lt;mfenced&gt;&lt;mrow&gt;&lt;msub&gt;&lt;mi&gt;X&lt;/mi&gt;&lt;mn&gt;2&lt;/mn&gt;&lt;/msub&gt;&lt;mo&gt;&amp;#xA0;&lt;/mo&gt;&lt;mo&gt;=&lt;/mo&gt;&lt;mo&gt;&amp;#x2009;&lt;/mo&gt;&lt;msub&gt;&lt;mi&gt;x&lt;/mi&gt;&lt;mn&gt;2&lt;/mn&gt;&lt;/msub&gt;&lt;/mrow&gt;&lt;/mfenced&gt;&lt;mo&gt;+&lt;/mo&gt;&lt;mo&gt;&amp;#xA0;&lt;/mo&gt;&lt;mi&gt;&amp;#x3B5;&lt;/mi&gt;&lt;/mstyle&gt;&lt;/math&gt;&quot;,&quot;truncated&quot;:false}" title="Y space equals space beta subscript 0 space plus space beta subscript 1 times X subscript 1 space plus beta subscript 2 times 1 open parentheses X subscript 2 space equals thin space x subscript 2 close parentheses space plus space beta subscript 3 times X subscript 1 times 1 open parentheses X subscript 2 space equals thin space x subscript 2 close parentheses plus space epsilon"/>
+          <p:cNvPr id="120" name="Google Shape;120;p16" descr="{&quot;mathml&quot;:&quot;&lt;math style=\&quot;font-family:stix;font-size:16px;\&quot; xmlns=\&quot;http://www.w3.org/1998/Math/MathML\&quot;&gt;&lt;mstyle mathsize=\&quot;16px\&quot;&gt;&lt;mi&gt;Y&lt;/mi&gt;&lt;mo&gt;&amp;#xA0;&lt;/mo&gt;&lt;mo&gt;=&lt;/mo&gt;&lt;mo&gt;&amp;#xA0;&lt;/mo&gt;&lt;msub&gt;&lt;mi&gt;&amp;#x3B2;&lt;/mi&gt;&lt;mn&gt;0&lt;/mn&gt;&lt;/msub&gt;&lt;mo&gt;&amp;#xA0;&lt;/mo&gt;&lt;mo&gt;+&lt;/mo&gt;&lt;mo&gt;&amp;#xA0;&lt;/mo&gt;&lt;msub&gt;&lt;mi&gt;&amp;#x3B2;&lt;/mi&gt;&lt;mn&gt;1&lt;/mn&gt;&lt;/msub&gt;&lt;mo&gt;&amp;#xB7;&lt;/mo&gt;&lt;msub&gt;&lt;mi&gt;X&lt;/mi&gt;&lt;mn&gt;1&lt;/mn&gt;&lt;/msub&gt;&lt;mo&gt;&amp;#xA0;&lt;/mo&gt;&lt;mo&gt;+&lt;/mo&gt;&lt;msub&gt;&lt;mi&gt;&amp;#x3B2;&lt;/mi&gt;&lt;mn&gt;2&lt;/mn&gt;&lt;/msub&gt;&lt;mo&gt;&amp;#xB7;&lt;/mo&gt;&lt;mn&gt;1&lt;/mn&gt;&lt;mfenced&gt;&lt;mrow&gt;&lt;msub&gt;&lt;mi&gt;X&lt;/mi&gt;&lt;mn&gt;2&lt;/mn&gt;&lt;/msub&gt;&lt;mo&gt;&amp;#xA0;&lt;/mo&gt;&lt;mo&gt;=&lt;/mo&gt;&lt;mo&gt;&amp;#x2009;&lt;/mo&gt;&lt;msub&gt;&lt;mi&gt;x&lt;/mi&gt;&lt;mn&gt;2&lt;/mn&gt;&lt;/msub&gt;&lt;/mrow&gt;&lt;/mfenced&gt;&lt;mo&gt;&amp;#xA0;&lt;/mo&gt;&lt;mo&gt;+&lt;/mo&gt;&lt;mo&gt;&amp;#xA0;&lt;/mo&gt;&lt;msub&gt;&lt;mi&gt;&amp;#x3B2;&lt;/mi&gt;&lt;mn&gt;3&lt;/mn&gt;&lt;/msub&gt;&lt;mo&gt;&amp;#xB7;&lt;/mo&gt;&lt;msub&gt;&lt;mi&gt;X&lt;/mi&gt;&lt;mn&gt;1&lt;/mn&gt;&lt;/msub&gt;&lt;mo&gt;&amp;#xB7;&lt;/mo&gt;&lt;mn&gt;1&lt;/mn&gt;&lt;mfenced&gt;&lt;mrow&gt;&lt;msub&gt;&lt;mi&gt;X&lt;/mi&gt;&lt;mn&gt;2&lt;/mn&gt;&lt;/msub&gt;&lt;mo&gt;&amp;#xA0;&lt;/mo&gt;&lt;mo&gt;=&lt;/mo&gt;&lt;mo&gt;&amp;#x2009;&lt;/mo&gt;&lt;msub&gt;&lt;mi&gt;x&lt;/mi&gt;&lt;mn&gt;2&lt;/mn&gt;&lt;/msub&gt;&lt;/mrow&gt;&lt;/mfenced&gt;&lt;mo&gt;+&lt;/mo&gt;&lt;mo&gt;&amp;#xA0;&lt;/mo&gt;&lt;mi&gt;&amp;#x3B5;&lt;/mi&gt;&lt;/mstyle&gt;&lt;/math&gt;&quot;,&quot;truncated&quot;:false}" title="Y space equals space beta subscript 0 space plus space beta subscript 1 times X subscript 1 space plus beta subscript 2 times 1 open parentheses X subscript 2 space equals thin space x subscript 2 close parentheses space plus space beta subscript 3 times X subscript 1 times 1 open parentheses X subscript 2 space equals thin space x subscript 2 close parentheses plus space epsilon"/>
           <p:cNvPicPr preferRelativeResize="0"/>
           <p:nvPr/>
         </p:nvPicPr>
@@ -23447,7 +23716,7 @@
                                           </p:stCondLst>
                                         </p:cTn>
                                         <p:tgtEl>
-                                          <p:spTgt spid="116">
+                                          <p:spTgt spid="117">
                                             <p:txEl>
                                               <p:pRg st="0" end="0"/>
                                             </p:txEl>
@@ -23496,7 +23765,7 @@
                                           </p:stCondLst>
                                         </p:cTn>
                                         <p:tgtEl>
-                                          <p:spTgt spid="116">
+                                          <p:spTgt spid="117">
                                             <p:txEl>
                                               <p:pRg st="1" end="1"/>
                                             </p:txEl>
@@ -23545,7 +23814,7 @@
                                           </p:stCondLst>
                                         </p:cTn>
                                         <p:tgtEl>
-                                          <p:spTgt spid="116">
+                                          <p:spTgt spid="117">
                                             <p:txEl>
                                               <p:pRg st="2" end="2"/>
                                             </p:txEl>
@@ -23594,7 +23863,7 @@
                                           </p:stCondLst>
                                         </p:cTn>
                                         <p:tgtEl>
-                                          <p:spTgt spid="116">
+                                          <p:spTgt spid="117">
                                             <p:txEl>
                                               <p:pRg st="3" end="3"/>
                                             </p:txEl>
@@ -23643,7 +23912,7 @@
                                           </p:stCondLst>
                                         </p:cTn>
                                         <p:tgtEl>
-                                          <p:spTgt spid="116">
+                                          <p:spTgt spid="117">
                                             <p:txEl>
                                               <p:pRg st="4" end="4"/>
                                             </p:txEl>
@@ -23692,7 +23961,7 @@
                                           </p:stCondLst>
                                         </p:cTn>
                                         <p:tgtEl>
-                                          <p:spTgt spid="116">
+                                          <p:spTgt spid="117">
                                             <p:txEl>
                                               <p:pRg st="5" end="5"/>
                                             </p:txEl>
@@ -23741,7 +24010,7 @@
                                           </p:stCondLst>
                                         </p:cTn>
                                         <p:tgtEl>
-                                          <p:spTgt spid="117"/>
+                                          <p:spTgt spid="118"/>
                                         </p:tgtEl>
                                         <p:attrNameLst>
                                           <p:attrName>style.visibility</p:attrName>
@@ -23790,7 +24059,7 @@
   <p:cSld>
     <p:spTree>
       <p:nvGrpSpPr>
-        <p:cNvPr id="1" name="Shape 123"/>
+        <p:cNvPr id="1" name="Shape 124"/>
         <p:cNvGrpSpPr/>
         <p:nvPr/>
       </p:nvGrpSpPr>
@@ -23804,7 +24073,7 @@
       </p:grpSpPr>
       <p:sp>
         <p:nvSpPr>
-          <p:cNvPr id="124" name="Google Shape;124;p17"/>
+          <p:cNvPr id="125" name="Google Shape;125;p17"/>
           <p:cNvSpPr txBox="1">
             <a:spLocks noGrp="1"/>
           </p:cNvSpPr>
@@ -23846,7 +24115,7 @@
       </p:sp>
       <p:sp>
         <p:nvSpPr>
-          <p:cNvPr id="125" name="Google Shape;125;p17"/>
+          <p:cNvPr id="126" name="Google Shape;126;p17"/>
           <p:cNvSpPr txBox="1">
             <a:spLocks noGrp="1"/>
           </p:cNvSpPr>
@@ -23973,7 +24242,7 @@
                                           </p:stCondLst>
                                         </p:cTn>
                                         <p:tgtEl>
-                                          <p:spTgt spid="125">
+                                          <p:spTgt spid="126">
                                             <p:txEl>
                                               <p:pRg st="0" end="0"/>
                                             </p:txEl>
@@ -24022,7 +24291,7 @@
                                           </p:stCondLst>
                                         </p:cTn>
                                         <p:tgtEl>
-                                          <p:spTgt spid="125">
+                                          <p:spTgt spid="126">
                                             <p:txEl>
                                               <p:pRg st="1" end="1"/>
                                             </p:txEl>
@@ -24071,7 +24340,7 @@
                                           </p:stCondLst>
                                         </p:cTn>
                                         <p:tgtEl>
-                                          <p:spTgt spid="125">
+                                          <p:spTgt spid="126">
                                             <p:txEl>
                                               <p:pRg st="2" end="2"/>
                                             </p:txEl>
@@ -24120,7 +24389,7 @@
                                           </p:stCondLst>
                                         </p:cTn>
                                         <p:tgtEl>
-                                          <p:spTgt spid="125">
+                                          <p:spTgt spid="126">
                                             <p:txEl>
                                               <p:pRg st="3" end="3"/>
                                             </p:txEl>
@@ -24173,7 +24442,7 @@
   <p:cSld>
     <p:spTree>
       <p:nvGrpSpPr>
-        <p:cNvPr id="1" name="Shape 129"/>
+        <p:cNvPr id="1" name="Shape 130"/>
         <p:cNvGrpSpPr/>
         <p:nvPr/>
       </p:nvGrpSpPr>
@@ -24187,7 +24456,7 @@
       </p:grpSpPr>
       <p:sp>
         <p:nvSpPr>
-          <p:cNvPr id="130" name="Google Shape;130;p18"/>
+          <p:cNvPr id="131" name="Google Shape;131;p18"/>
           <p:cNvSpPr txBox="1">
             <a:spLocks noGrp="1"/>
           </p:cNvSpPr>
@@ -24229,7 +24498,7 @@
       </p:sp>
       <p:sp>
         <p:nvSpPr>
-          <p:cNvPr id="131" name="Google Shape;131;p18"/>
+          <p:cNvPr id="132" name="Google Shape;132;p18"/>
           <p:cNvSpPr txBox="1">
             <a:spLocks noGrp="1"/>
           </p:cNvSpPr>
@@ -24340,7 +24609,7 @@
                                           </p:stCondLst>
                                         </p:cTn>
                                         <p:tgtEl>
-                                          <p:spTgt spid="131">
+                                          <p:spTgt spid="132">
                                             <p:txEl>
                                               <p:pRg st="0" end="0"/>
                                             </p:txEl>
@@ -24389,7 +24658,7 @@
                                           </p:stCondLst>
                                         </p:cTn>
                                         <p:tgtEl>
-                                          <p:spTgt spid="131">
+                                          <p:spTgt spid="132">
                                             <p:txEl>
                                               <p:pRg st="1" end="1"/>
                                             </p:txEl>
@@ -24438,7 +24707,7 @@
                                           </p:stCondLst>
                                         </p:cTn>
                                         <p:tgtEl>
-                                          <p:spTgt spid="131">
+                                          <p:spTgt spid="132">
                                             <p:txEl>
                                               <p:pRg st="2" end="2"/>
                                             </p:txEl>
@@ -24491,7 +24760,7 @@
   <p:cSld>
     <p:spTree>
       <p:nvGrpSpPr>
-        <p:cNvPr id="1" name="Shape 135"/>
+        <p:cNvPr id="1" name="Shape 136"/>
         <p:cNvGrpSpPr/>
         <p:nvPr/>
       </p:nvGrpSpPr>
@@ -24505,7 +24774,7 @@
       </p:grpSpPr>
       <p:sp>
         <p:nvSpPr>
-          <p:cNvPr id="136" name="Google Shape;136;p19"/>
+          <p:cNvPr id="137" name="Google Shape;137;p19"/>
           <p:cNvSpPr txBox="1">
             <a:spLocks noGrp="1"/>
           </p:cNvSpPr>
@@ -24547,7 +24816,7 @@
       </p:sp>
       <p:sp>
         <p:nvSpPr>
-          <p:cNvPr id="137" name="Google Shape;137;p19"/>
+          <p:cNvPr id="138" name="Google Shape;138;p19"/>
           <p:cNvSpPr txBox="1">
             <a:spLocks noGrp="1"/>
           </p:cNvSpPr>
@@ -24645,7 +24914,7 @@
       </p:sp>
       <p:pic>
         <p:nvPicPr>
-          <p:cNvPr id="138" name="Google Shape;138;p19"/>
+          <p:cNvPr id="139" name="Google Shape;139;p19"/>
           <p:cNvPicPr preferRelativeResize="0"/>
           <p:nvPr/>
         </p:nvPicPr>
@@ -24673,7 +24942,7 @@
       </p:pic>
       <p:pic>
         <p:nvPicPr>
-          <p:cNvPr id="139" name="Google Shape;139;p19"/>
+          <p:cNvPr id="140" name="Google Shape;140;p19"/>
           <p:cNvPicPr preferRelativeResize="0"/>
           <p:nvPr/>
         </p:nvPicPr>
@@ -24738,7 +25007,7 @@
                                           </p:stCondLst>
                                         </p:cTn>
                                         <p:tgtEl>
-                                          <p:spTgt spid="137">
+                                          <p:spTgt spid="138">
                                             <p:txEl>
                                               <p:pRg st="0" end="0"/>
                                             </p:txEl>
@@ -24787,7 +25056,7 @@
                                           </p:stCondLst>
                                         </p:cTn>
                                         <p:tgtEl>
-                                          <p:spTgt spid="137">
+                                          <p:spTgt spid="138">
                                             <p:txEl>
                                               <p:pRg st="1" end="1"/>
                                             </p:txEl>
@@ -24836,7 +25105,7 @@
                                           </p:stCondLst>
                                         </p:cTn>
                                         <p:tgtEl>
-                                          <p:spTgt spid="137">
+                                          <p:spTgt spid="138">
                                             <p:txEl>
                                               <p:pRg st="2" end="2"/>
                                             </p:txEl>
@@ -24885,7 +25154,7 @@
                                           </p:stCondLst>
                                         </p:cTn>
                                         <p:tgtEl>
-                                          <p:spTgt spid="137">
+                                          <p:spTgt spid="138">
                                             <p:txEl>
                                               <p:pRg st="3" end="3"/>
                                             </p:txEl>
@@ -24934,7 +25203,7 @@
                                           </p:stCondLst>
                                         </p:cTn>
                                         <p:tgtEl>
-                                          <p:spTgt spid="137">
+                                          <p:spTgt spid="138">
                                             <p:txEl>
                                               <p:pRg st="4" end="4"/>
                                             </p:txEl>
@@ -24987,7 +25256,7 @@
   <p:cSld>
     <p:spTree>
       <p:nvGrpSpPr>
-        <p:cNvPr id="1" name="Shape 143"/>
+        <p:cNvPr id="1" name="Shape 144"/>
         <p:cNvGrpSpPr/>
         <p:nvPr/>
       </p:nvGrpSpPr>
@@ -25001,7 +25270,7 @@
       </p:grpSpPr>
       <p:sp>
         <p:nvSpPr>
-          <p:cNvPr id="144" name="Google Shape;144;p20"/>
+          <p:cNvPr id="145" name="Google Shape;145;p20"/>
           <p:cNvSpPr txBox="1">
             <a:spLocks noGrp="1"/>
           </p:cNvSpPr>
@@ -25043,7 +25312,7 @@
       </p:sp>
       <p:sp>
         <p:nvSpPr>
-          <p:cNvPr id="145" name="Google Shape;145;p20"/>
+          <p:cNvPr id="146" name="Google Shape;146;p20"/>
           <p:cNvSpPr txBox="1">
             <a:spLocks noGrp="1"/>
           </p:cNvSpPr>
@@ -25165,7 +25434,7 @@
       </p:sp>
       <p:pic>
         <p:nvPicPr>
-          <p:cNvPr id="146" name="Google Shape;146;p20" descr="{&quot;mathml&quot;:&quot;&lt;math style=\&quot;font-family:stix;font-size:16px;\&quot; xmlns=\&quot;http://www.w3.org/1998/Math/MathML\&quot;&gt;&lt;mstyle mathsize=\&quot;16px\&quot;&gt;&lt;msub&gt;&lt;mi&gt;&amp;#x3C0;&lt;/mi&gt;&lt;mi&gt;i&lt;/mi&gt;&lt;/msub&gt;&lt;mo&gt;&amp;#xA0;&lt;/mo&gt;&lt;mo&gt;=&lt;/mo&gt;&lt;mo&gt;&amp;#x2009;&lt;/mo&gt;&lt;mi&gt;P&lt;/mi&gt;&lt;mfenced&gt;&lt;mrow&gt;&lt;msub&gt;&lt;mi&gt;X&lt;/mi&gt;&lt;mi&gt;i&lt;/mi&gt;&lt;/msub&gt;&lt;mo&gt;&amp;#xA0;&lt;/mo&gt;&lt;mo&gt;=&lt;/mo&gt;&lt;mo&gt;&amp;#xA0;&lt;/mo&gt;&lt;mn&gt;1&lt;/mn&gt;&lt;/mrow&gt;&lt;/mfenced&gt;&lt;mo&gt;&amp;#x2009;&lt;/mo&gt;&lt;/mstyle&gt;&lt;/math&gt;&quot;,&quot;truncated&quot;:false}" title="pi subscript i space equals thin space P open parentheses X subscript i space equals space 1 close parentheses thin space"/>
+          <p:cNvPr id="147" name="Google Shape;147;p20" descr="{&quot;mathml&quot;:&quot;&lt;math style=\&quot;font-family:stix;font-size:16px;\&quot; xmlns=\&quot;http://www.w3.org/1998/Math/MathML\&quot;&gt;&lt;mstyle mathsize=\&quot;16px\&quot;&gt;&lt;msub&gt;&lt;mi&gt;&amp;#x3C0;&lt;/mi&gt;&lt;mi&gt;i&lt;/mi&gt;&lt;/msub&gt;&lt;mo&gt;&amp;#xA0;&lt;/mo&gt;&lt;mo&gt;=&lt;/mo&gt;&lt;mo&gt;&amp;#x2009;&lt;/mo&gt;&lt;mi&gt;P&lt;/mi&gt;&lt;mfenced&gt;&lt;mrow&gt;&lt;msub&gt;&lt;mi&gt;X&lt;/mi&gt;&lt;mi&gt;i&lt;/mi&gt;&lt;/msub&gt;&lt;mo&gt;&amp;#xA0;&lt;/mo&gt;&lt;mo&gt;=&lt;/mo&gt;&lt;mo&gt;&amp;#xA0;&lt;/mo&gt;&lt;mn&gt;1&lt;/mn&gt;&lt;/mrow&gt;&lt;/mfenced&gt;&lt;mo&gt;&amp;#x2009;&lt;/mo&gt;&lt;/mstyle&gt;&lt;/math&gt;&quot;,&quot;truncated&quot;:false}" title="pi subscript i space equals thin space P open parentheses X subscript i space equals space 1 close parentheses thin space"/>
           <p:cNvPicPr preferRelativeResize="0"/>
           <p:nvPr/>
         </p:nvPicPr>
@@ -25193,7 +25462,7 @@
       </p:pic>
       <p:pic>
         <p:nvPicPr>
-          <p:cNvPr id="147" name="Google Shape;147;p20" descr="{&quot;mathml&quot;:&quot;&lt;math style=\&quot;font-family:stix;font-size:16px;\&quot; xmlns=\&quot;http://www.w3.org/1998/Math/MathML\&quot;&gt;&lt;mstyle mathsize=\&quot;16px\&quot;&gt;&lt;msub&gt;&lt;mi&gt;&amp;#x3C0;&lt;/mi&gt;&lt;mrow&gt;&lt;mi&gt;f&lt;/mi&gt;&lt;mi&gt;e&lt;/mi&gt;&lt;mi&gt;m&lt;/mi&gt;&lt;mi&gt;a&lt;/mi&gt;&lt;mi&gt;l&lt;/mi&gt;&lt;mi&gt;e&lt;/mi&gt;&lt;/mrow&gt;&lt;/msub&gt;&lt;mo&gt;&amp;#xA0;&lt;/mo&gt;&lt;mo&gt;=&lt;/mo&gt;&lt;mo&gt;&amp;#x2009;&lt;/mo&gt;&lt;mfrac&gt;&lt;mn&gt;279&lt;/mn&gt;&lt;mn&gt;318&lt;/mn&gt;&lt;/mfrac&gt;&lt;mo&gt;&amp;#x2009;&lt;/mo&gt;&lt;mo&gt;=&lt;/mo&gt;&lt;mo&gt;&amp;#x2009;&lt;/mo&gt;&lt;mn&gt;0&lt;/mn&gt;&lt;mo&gt;,&lt;/mo&gt;&lt;mn&gt;8774&lt;/mn&gt;&lt;mo&gt;&amp;#xA0;&lt;/mo&gt;&lt;mo&gt;&amp;#xA0;&lt;/mo&gt;&lt;mo&gt;&amp;#xA0;&lt;/mo&gt;&lt;mo&gt;&amp;#xA0;&lt;/mo&gt;&lt;mo&gt;&amp;#xA0;&lt;/mo&gt;&lt;mo&gt;&amp;#xA0;&lt;/mo&gt;&lt;mo&gt;&amp;#xA0;&lt;/mo&gt;&lt;mo&gt;&amp;#xA0;&lt;/mo&gt;&lt;mo&gt;&amp;#xA0;&lt;/mo&gt;&lt;mo&gt;&amp;#xA0;&lt;/mo&gt;&lt;mo&gt;&amp;#xA0;&lt;/mo&gt;&lt;mo&gt;&amp;#xA0;&lt;/mo&gt;&lt;mo&gt;&amp;#xA0;&lt;/mo&gt;&lt;mo&gt;&amp;#xA0;&lt;/mo&gt;&lt;mo&gt;&amp;#xA0;&lt;/mo&gt;&lt;mo&gt;&amp;#xA0;&lt;/mo&gt;&lt;mo&gt;&amp;#xA0;&lt;/mo&gt;&lt;mo&gt;&amp;#xA0;&lt;/mo&gt;&lt;mo&gt;&amp;#xA0;&lt;/mo&gt;&lt;mo&gt;&amp;#xA0;&lt;/mo&gt;&lt;mo&gt;&amp;#xA0;&lt;/mo&gt;&lt;mo&gt;&amp;#xA0;&lt;/mo&gt;&lt;mo&gt;&amp;#xA0;&lt;/mo&gt;&lt;mo&gt;&amp;#xA0;&lt;/mo&gt;&lt;mo&gt;&amp;#xA0;&lt;/mo&gt;&lt;msub&gt;&lt;mi&gt;&amp;#x3C0;&lt;/mi&gt;&lt;mrow&gt;&lt;mi&gt;m&lt;/mi&gt;&lt;mi&gt;a&lt;/mi&gt;&lt;mi&gt;l&lt;/mi&gt;&lt;mi&gt;e&lt;/mi&gt;&lt;/mrow&gt;&lt;/msub&gt;&lt;mo&gt;&amp;#xA0;&lt;/mo&gt;&lt;mo&gt;=&lt;/mo&gt;&lt;mo&gt;&amp;#x2009;&lt;/mo&gt;&lt;mfrac&gt;&lt;mn&gt;310&lt;/mn&gt;&lt;mn&gt;336&lt;/mn&gt;&lt;/mfrac&gt;&lt;mo&gt;&amp;#x2009;&lt;/mo&gt;&lt;mo&gt;=&lt;/mo&gt;&lt;mo&gt;&amp;#x2009;&lt;/mo&gt;&lt;mn&gt;0&lt;/mn&gt;&lt;mo&gt;,&lt;/mo&gt;&lt;mn&gt;9226&lt;/mn&gt;&lt;/mstyle&gt;&lt;/math&gt;&quot;,&quot;truncated&quot;:false}" title="pi subscript f e m a l e end subscript space equals thin space 279 over 318 thin space equals thin space 0 comma 8774 space space space space space space space space space space space space space space space space space space space space space space space space space pi subscript m a l e end subscript space equals thin space 310 over 336 thin space equals thin space 0 comma 9226"/>
+          <p:cNvPr id="148" name="Google Shape;148;p20" descr="{&quot;mathml&quot;:&quot;&lt;math style=\&quot;font-family:stix;font-size:16px;\&quot; xmlns=\&quot;http://www.w3.org/1998/Math/MathML\&quot;&gt;&lt;mstyle mathsize=\&quot;16px\&quot;&gt;&lt;msub&gt;&lt;mi&gt;&amp;#x3C0;&lt;/mi&gt;&lt;mrow&gt;&lt;mi&gt;f&lt;/mi&gt;&lt;mi&gt;e&lt;/mi&gt;&lt;mi&gt;m&lt;/mi&gt;&lt;mi&gt;a&lt;/mi&gt;&lt;mi&gt;l&lt;/mi&gt;&lt;mi&gt;e&lt;/mi&gt;&lt;/mrow&gt;&lt;/msub&gt;&lt;mo&gt;&amp;#xA0;&lt;/mo&gt;&lt;mo&gt;=&lt;/mo&gt;&lt;mo&gt;&amp;#x2009;&lt;/mo&gt;&lt;mfrac&gt;&lt;mn&gt;279&lt;/mn&gt;&lt;mn&gt;318&lt;/mn&gt;&lt;/mfrac&gt;&lt;mo&gt;&amp;#x2009;&lt;/mo&gt;&lt;mo&gt;=&lt;/mo&gt;&lt;mo&gt;&amp;#x2009;&lt;/mo&gt;&lt;mn&gt;0&lt;/mn&gt;&lt;mo&gt;,&lt;/mo&gt;&lt;mn&gt;8774&lt;/mn&gt;&lt;mo&gt;&amp;#xA0;&lt;/mo&gt;&lt;mo&gt;&amp;#xA0;&lt;/mo&gt;&lt;mo&gt;&amp;#xA0;&lt;/mo&gt;&lt;mo&gt;&amp;#xA0;&lt;/mo&gt;&lt;mo&gt;&amp;#xA0;&lt;/mo&gt;&lt;mo&gt;&amp;#xA0;&lt;/mo&gt;&lt;mo&gt;&amp;#xA0;&lt;/mo&gt;&lt;mo&gt;&amp;#xA0;&lt;/mo&gt;&lt;mo&gt;&amp;#xA0;&lt;/mo&gt;&lt;mo&gt;&amp;#xA0;&lt;/mo&gt;&lt;mo&gt;&amp;#xA0;&lt;/mo&gt;&lt;mo&gt;&amp;#xA0;&lt;/mo&gt;&lt;mo&gt;&amp;#xA0;&lt;/mo&gt;&lt;mo&gt;&amp;#xA0;&lt;/mo&gt;&lt;mo&gt;&amp;#xA0;&lt;/mo&gt;&lt;mo&gt;&amp;#xA0;&lt;/mo&gt;&lt;mo&gt;&amp;#xA0;&lt;/mo&gt;&lt;mo&gt;&amp;#xA0;&lt;/mo&gt;&lt;mo&gt;&amp;#xA0;&lt;/mo&gt;&lt;mo&gt;&amp;#xA0;&lt;/mo&gt;&lt;mo&gt;&amp;#xA0;&lt;/mo&gt;&lt;mo&gt;&amp;#xA0;&lt;/mo&gt;&lt;mo&gt;&amp;#xA0;&lt;/mo&gt;&lt;mo&gt;&amp;#xA0;&lt;/mo&gt;&lt;mo&gt;&amp;#xA0;&lt;/mo&gt;&lt;msub&gt;&lt;mi&gt;&amp;#x3C0;&lt;/mi&gt;&lt;mrow&gt;&lt;mi&gt;m&lt;/mi&gt;&lt;mi&gt;a&lt;/mi&gt;&lt;mi&gt;l&lt;/mi&gt;&lt;mi&gt;e&lt;/mi&gt;&lt;/mrow&gt;&lt;/msub&gt;&lt;mo&gt;&amp;#xA0;&lt;/mo&gt;&lt;mo&gt;=&lt;/mo&gt;&lt;mo&gt;&amp;#x2009;&lt;/mo&gt;&lt;mfrac&gt;&lt;mn&gt;310&lt;/mn&gt;&lt;mn&gt;336&lt;/mn&gt;&lt;/mfrac&gt;&lt;mo&gt;&amp;#x2009;&lt;/mo&gt;&lt;mo&gt;=&lt;/mo&gt;&lt;mo&gt;&amp;#x2009;&lt;/mo&gt;&lt;mn&gt;0&lt;/mn&gt;&lt;mo&gt;,&lt;/mo&gt;&lt;mn&gt;9226&lt;/mn&gt;&lt;/mstyle&gt;&lt;/math&gt;&quot;,&quot;truncated&quot;:false}" title="pi subscript f e m a l e end subscript space equals thin space 279 over 318 thin space equals thin space 0 comma 8774 space space space space space space space space space space space space space space space space space space space space space space space space space pi subscript m a l e end subscript space equals thin space 310 over 336 thin space equals thin space 0 comma 9226"/>
           <p:cNvPicPr preferRelativeResize="0"/>
           <p:nvPr/>
         </p:nvPicPr>
@@ -25221,7 +25490,7 @@
       </p:pic>
       <p:pic>
         <p:nvPicPr>
-          <p:cNvPr id="148" name="Google Shape;148;p20" descr="{&quot;mathml&quot;:&quot;&lt;math style=\&quot;font-family:stix;font-size:16px;\&quot; xmlns=\&quot;http://www.w3.org/1998/Math/MathML\&quot;&gt;&lt;mstyle mathsize=\&quot;16px\&quot;&gt;&lt;mi&gt;s&lt;/mi&gt;&lt;mi&gt;d&lt;/mi&gt;&lt;mfenced&gt;&lt;mi mathvariant=\&quot;normal\&quot;&gt;&amp;#x3C0;&lt;/mi&gt;&lt;/mfenced&gt;&lt;mo&gt;&amp;#xA0;&lt;/mo&gt;&lt;mo&gt;=&lt;/mo&gt;&lt;mo&gt;&amp;#x2009;&lt;/mo&gt;&lt;msqrt&gt;&lt;mfrac&gt;&lt;mrow&gt;&lt;mi mathvariant=\&quot;normal\&quot;&gt;&amp;#x3C0;&lt;/mi&gt;&lt;mfenced&gt;&lt;mrow&gt;&lt;mn&gt;1&lt;/mn&gt;&lt;mo&gt;-&lt;/mo&gt;&lt;mi mathvariant=\&quot;normal\&quot;&gt;&amp;#x3C0;&lt;/mi&gt;&lt;/mrow&gt;&lt;/mfenced&gt;&lt;/mrow&gt;&lt;mi mathvariant=\&quot;normal\&quot;&gt;n&lt;/mi&gt;&lt;/mfrac&gt;&lt;/msqrt&gt;&lt;mo&gt;&amp;#xA0;&lt;/mo&gt;&lt;mo&gt;,&lt;/mo&gt;&lt;mo&gt;&amp;#xA0;&lt;/mo&gt;&lt;mi&gt;s&lt;/mi&gt;&lt;mi&gt;d&lt;/mi&gt;&lt;mfenced&gt;&lt;msub&gt;&lt;mi mathvariant=\&quot;normal\&quot;&gt;&amp;#x3C0;&lt;/mi&gt;&lt;mrow&gt;&lt;mi&gt;f&lt;/mi&gt;&lt;mi&gt;e&lt;/mi&gt;&lt;mi&gt;m&lt;/mi&gt;&lt;mi&gt;a&lt;/mi&gt;&lt;mi&gt;l&lt;/mi&gt;&lt;mi&gt;e&lt;/mi&gt;&lt;/mrow&gt;&lt;/msub&gt;&lt;/mfenced&gt;&lt;mo&gt;&amp;#x2009;&lt;/mo&gt;&lt;mo&gt;=&lt;/mo&gt;&lt;mo&gt;&amp;#x2009;&lt;/mo&gt;&lt;msqrt&gt;&lt;mfrac&gt;&lt;mrow&gt;&lt;mn&gt;0&lt;/mn&gt;&lt;mo&gt;.&lt;/mo&gt;&lt;mn&gt;8774&lt;/mn&gt;&lt;mfenced&gt;&lt;mrow&gt;&lt;mn&gt;1&lt;/mn&gt;&lt;mo&gt;-&lt;/mo&gt;&lt;mn&gt;0&lt;/mn&gt;&lt;mo&gt;.&lt;/mo&gt;&lt;mn&gt;8774&lt;/mn&gt;&lt;/mrow&gt;&lt;/mfenced&gt;&lt;/mrow&gt;&lt;mn&gt;318&lt;/mn&gt;&lt;/mfrac&gt;&lt;/msqrt&gt;&lt;mo&gt;&amp;#xA0;&lt;/mo&gt;&lt;mo&gt;=&lt;/mo&gt;&lt;mo&gt;&amp;#x2009;&lt;/mo&gt;&lt;mn&gt;0&lt;/mn&gt;&lt;mo&gt;.&lt;/mo&gt;&lt;mn&gt;0184&lt;/mn&gt;&lt;mo&gt;&amp;#xA0;&lt;/mo&gt;&lt;mi&gt;o&lt;/mi&gt;&lt;mi&gt;g&lt;/mi&gt;&lt;mo&gt;&amp;#xA0;&lt;/mo&gt;&lt;mi&gt;s&lt;/mi&gt;&lt;mi&gt;d&lt;/mi&gt;&lt;mfenced&gt;&lt;msub&gt;&lt;mi mathvariant=\&quot;normal\&quot;&gt;&amp;#x3C0;&lt;/mi&gt;&lt;mrow&gt;&lt;mi&gt;m&lt;/mi&gt;&lt;mi&gt;a&lt;/mi&gt;&lt;mi&gt;l&lt;/mi&gt;&lt;mi&gt;e&lt;/mi&gt;&lt;/mrow&gt;&lt;/msub&gt;&lt;/mfenced&gt;&lt;mo&gt;&amp;#xA0;&lt;/mo&gt;&lt;mo&gt;=&lt;/mo&gt;&lt;mo&gt;&amp;#xA0;&lt;/mo&gt;&lt;mn&gt;0&lt;/mn&gt;&lt;mo&gt;.&lt;/mo&gt;&lt;mn&gt;0146&lt;/mn&gt;&lt;mo&gt;&amp;#x2009;&lt;/mo&gt;&lt;/mstyle&gt;&lt;/math&gt;&quot;,&quot;truncated&quot;:false}" title="s d open parentheses straight pi close parentheses space equals thin space square root of fraction numerator straight pi open parentheses 1 minus straight pi close parentheses over denominator straight n end fraction end root space comma space s d open parentheses straight pi subscript f e m a l e end subscript close parentheses thin space equals thin space square root of fraction numerator 0.8774 open parentheses 1 minus 0.8774 close parentheses over denominator 318 end fraction end root space equals thin space 0.0184 space o g space s d open parentheses straight pi subscript m a l e end subscript close parentheses space equals space 0.0146 thin space"/>
+          <p:cNvPr id="149" name="Google Shape;149;p20" descr="{&quot;mathml&quot;:&quot;&lt;math style=\&quot;font-family:stix;font-size:16px;\&quot; xmlns=\&quot;http://www.w3.org/1998/Math/MathML\&quot;&gt;&lt;mstyle mathsize=\&quot;16px\&quot;&gt;&lt;mi&gt;s&lt;/mi&gt;&lt;mi&gt;d&lt;/mi&gt;&lt;mfenced&gt;&lt;mi mathvariant=\&quot;normal\&quot;&gt;&amp;#x3C0;&lt;/mi&gt;&lt;/mfenced&gt;&lt;mo&gt;&amp;#xA0;&lt;/mo&gt;&lt;mo&gt;=&lt;/mo&gt;&lt;mo&gt;&amp;#x2009;&lt;/mo&gt;&lt;msqrt&gt;&lt;mfrac&gt;&lt;mrow&gt;&lt;mi mathvariant=\&quot;normal\&quot;&gt;&amp;#x3C0;&lt;/mi&gt;&lt;mfenced&gt;&lt;mrow&gt;&lt;mn&gt;1&lt;/mn&gt;&lt;mo&gt;-&lt;/mo&gt;&lt;mi mathvariant=\&quot;normal\&quot;&gt;&amp;#x3C0;&lt;/mi&gt;&lt;/mrow&gt;&lt;/mfenced&gt;&lt;/mrow&gt;&lt;mi mathvariant=\&quot;normal\&quot;&gt;n&lt;/mi&gt;&lt;/mfrac&gt;&lt;/msqrt&gt;&lt;mo&gt;&amp;#xA0;&lt;/mo&gt;&lt;mo&gt;,&lt;/mo&gt;&lt;mo&gt;&amp;#xA0;&lt;/mo&gt;&lt;mi&gt;s&lt;/mi&gt;&lt;mi&gt;d&lt;/mi&gt;&lt;mfenced&gt;&lt;msub&gt;&lt;mi mathvariant=\&quot;normal\&quot;&gt;&amp;#x3C0;&lt;/mi&gt;&lt;mrow&gt;&lt;mi&gt;f&lt;/mi&gt;&lt;mi&gt;e&lt;/mi&gt;&lt;mi&gt;m&lt;/mi&gt;&lt;mi&gt;a&lt;/mi&gt;&lt;mi&gt;l&lt;/mi&gt;&lt;mi&gt;e&lt;/mi&gt;&lt;/mrow&gt;&lt;/msub&gt;&lt;/mfenced&gt;&lt;mo&gt;&amp;#x2009;&lt;/mo&gt;&lt;mo&gt;=&lt;/mo&gt;&lt;mo&gt;&amp;#x2009;&lt;/mo&gt;&lt;msqrt&gt;&lt;mfrac&gt;&lt;mrow&gt;&lt;mn&gt;0&lt;/mn&gt;&lt;mo&gt;.&lt;/mo&gt;&lt;mn&gt;8774&lt;/mn&gt;&lt;mfenced&gt;&lt;mrow&gt;&lt;mn&gt;1&lt;/mn&gt;&lt;mo&gt;-&lt;/mo&gt;&lt;mn&gt;0&lt;/mn&gt;&lt;mo&gt;.&lt;/mo&gt;&lt;mn&gt;8774&lt;/mn&gt;&lt;/mrow&gt;&lt;/mfenced&gt;&lt;/mrow&gt;&lt;mn&gt;318&lt;/mn&gt;&lt;/mfrac&gt;&lt;/msqrt&gt;&lt;mo&gt;&amp;#xA0;&lt;/mo&gt;&lt;mo&gt;=&lt;/mo&gt;&lt;mo&gt;&amp;#x2009;&lt;/mo&gt;&lt;mn&gt;0&lt;/mn&gt;&lt;mo&gt;.&lt;/mo&gt;&lt;mn&gt;0184&lt;/mn&gt;&lt;mo&gt;&amp;#xA0;&lt;/mo&gt;&lt;mi&gt;o&lt;/mi&gt;&lt;mi&gt;g&lt;/mi&gt;&lt;mo&gt;&amp;#xA0;&lt;/mo&gt;&lt;mi&gt;s&lt;/mi&gt;&lt;mi&gt;d&lt;/mi&gt;&lt;mfenced&gt;&lt;msub&gt;&lt;mi mathvariant=\&quot;normal\&quot;&gt;&amp;#x3C0;&lt;/mi&gt;&lt;mrow&gt;&lt;mi&gt;m&lt;/mi&gt;&lt;mi&gt;a&lt;/mi&gt;&lt;mi&gt;l&lt;/mi&gt;&lt;mi&gt;e&lt;/mi&gt;&lt;/mrow&gt;&lt;/msub&gt;&lt;/mfenced&gt;&lt;mo&gt;&amp;#xA0;&lt;/mo&gt;&lt;mo&gt;=&lt;/mo&gt;&lt;mo&gt;&amp;#xA0;&lt;/mo&gt;&lt;mn&gt;0&lt;/mn&gt;&lt;mo&gt;.&lt;/mo&gt;&lt;mn&gt;0146&lt;/mn&gt;&lt;mo&gt;&amp;#x2009;&lt;/mo&gt;&lt;/mstyle&gt;&lt;/math&gt;&quot;,&quot;truncated&quot;:false}" title="s d open parentheses straight pi close parentheses space equals thin space square root of fraction numerator straight pi open parentheses 1 minus straight pi close parentheses over denominator straight n end fraction end root space comma space s d open parentheses straight pi subscript f e m a l e end subscript close parentheses thin space equals thin space square root of fraction numerator 0.8774 open parentheses 1 minus 0.8774 close parentheses over denominator 318 end fraction end root space equals thin space 0.0184 space o g space s d open parentheses straight pi subscript m a l e end subscript close parentheses space equals space 0.0146 thin space"/>
           <p:cNvPicPr preferRelativeResize="0"/>
           <p:nvPr/>
         </p:nvPicPr>
@@ -25237,6 +25506,34 @@
           <a:xfrm>
             <a:off x="507789" y="4395062"/>
             <a:ext cx="8256322" cy="629531"/>
+          </a:xfrm>
+          <a:prstGeom prst="rect">
+            <a:avLst/>
+          </a:prstGeom>
+          <a:noFill/>
+          <a:ln>
+            <a:noFill/>
+          </a:ln>
+        </p:spPr>
+      </p:pic>
+      <p:pic>
+        <p:nvPicPr>
+          <p:cNvPr id="150" name="Google Shape;150;p20"/>
+          <p:cNvPicPr preferRelativeResize="0"/>
+          <p:nvPr/>
+        </p:nvPicPr>
+        <p:blipFill>
+          <a:blip r:embed="rId6">
+            <a:alphaModFix/>
+          </a:blip>
+          <a:stretch>
+            <a:fillRect/>
+          </a:stretch>
+        </p:blipFill>
+        <p:spPr>
+          <a:xfrm>
+            <a:off x="6440000" y="1139475"/>
+            <a:ext cx="2324100" cy="714375"/>
           </a:xfrm>
           <a:prstGeom prst="rect">
             <a:avLst/>
@@ -25286,7 +25583,7 @@
                                           </p:stCondLst>
                                         </p:cTn>
                                         <p:tgtEl>
-                                          <p:spTgt spid="145">
+                                          <p:spTgt spid="146">
                                             <p:txEl>
                                               <p:pRg st="0" end="0"/>
                                             </p:txEl>
@@ -25335,7 +25632,7 @@
                                           </p:stCondLst>
                                         </p:cTn>
                                         <p:tgtEl>
-                                          <p:spTgt spid="145">
+                                          <p:spTgt spid="146">
                                             <p:txEl>
                                               <p:pRg st="1" end="1"/>
                                             </p:txEl>
@@ -25384,7 +25681,7 @@
                                           </p:stCondLst>
                                         </p:cTn>
                                         <p:tgtEl>
-                                          <p:spTgt spid="145">
+                                          <p:spTgt spid="146">
                                             <p:txEl>
                                               <p:pRg st="2" end="2"/>
                                             </p:txEl>
@@ -25433,7 +25730,7 @@
                                           </p:stCondLst>
                                         </p:cTn>
                                         <p:tgtEl>
-                                          <p:spTgt spid="145">
+                                          <p:spTgt spid="146">
                                             <p:txEl>
                                               <p:pRg st="3" end="3"/>
                                             </p:txEl>
@@ -25482,7 +25779,7 @@
                                           </p:stCondLst>
                                         </p:cTn>
                                         <p:tgtEl>
-                                          <p:spTgt spid="145">
+                                          <p:spTgt spid="146">
                                             <p:txEl>
                                               <p:pRg st="4" end="4"/>
                                             </p:txEl>
@@ -25531,7 +25828,7 @@
                                           </p:stCondLst>
                                         </p:cTn>
                                         <p:tgtEl>
-                                          <p:spTgt spid="145">
+                                          <p:spTgt spid="146">
                                             <p:txEl>
                                               <p:pRg st="5" end="5"/>
                                             </p:txEl>
@@ -25599,6 +25896,96 @@
                       </p:childTnLst>
                     </p:cTn>
                   </p:par>
+                  <p:par>
+                    <p:cTn id="31" fill="hold">
+                      <p:stCondLst>
+                        <p:cond delay="indefinite"/>
+                      </p:stCondLst>
+                      <p:childTnLst>
+                        <p:par>
+                          <p:cTn id="32" fill="hold">
+                            <p:stCondLst>
+                              <p:cond delay="0"/>
+                            </p:stCondLst>
+                            <p:childTnLst>
+                              <p:par>
+                                <p:cTn id="33" presetID="1" presetClass="entr" presetSubtype="0" fill="hold" nodeType="clickEffect">
+                                  <p:stCondLst>
+                                    <p:cond delay="0"/>
+                                  </p:stCondLst>
+                                  <p:childTnLst>
+                                    <p:set>
+                                      <p:cBhvr>
+                                        <p:cTn id="34" dur="1" fill="hold">
+                                          <p:stCondLst>
+                                            <p:cond delay="0"/>
+                                          </p:stCondLst>
+                                        </p:cTn>
+                                        <p:tgtEl>
+                                          <p:spTgt spid="148"/>
+                                        </p:tgtEl>
+                                        <p:attrNameLst>
+                                          <p:attrName>style.visibility</p:attrName>
+                                        </p:attrNameLst>
+                                      </p:cBhvr>
+                                      <p:to>
+                                        <p:strVal val="visible"/>
+                                      </p:to>
+                                    </p:set>
+                                  </p:childTnLst>
+                                </p:cTn>
+                              </p:par>
+                            </p:childTnLst>
+                          </p:cTn>
+                        </p:par>
+                      </p:childTnLst>
+                    </p:cTn>
+                  </p:par>
+                  <p:par>
+                    <p:cTn id="35" fill="hold">
+                      <p:stCondLst>
+                        <p:cond delay="indefinite"/>
+                      </p:stCondLst>
+                      <p:childTnLst>
+                        <p:par>
+                          <p:cTn id="36" fill="hold">
+                            <p:stCondLst>
+                              <p:cond delay="0"/>
+                            </p:stCondLst>
+                            <p:childTnLst>
+                              <p:par>
+                                <p:cTn id="37" presetID="1" presetClass="entr" presetSubtype="0" fill="hold" nodeType="clickEffect">
+                                  <p:stCondLst>
+                                    <p:cond delay="0"/>
+                                  </p:stCondLst>
+                                  <p:childTnLst>
+                                    <p:set>
+                                      <p:cBhvr>
+                                        <p:cTn id="38" dur="1" fill="hold">
+                                          <p:stCondLst>
+                                            <p:cond delay="0"/>
+                                          </p:stCondLst>
+                                        </p:cTn>
+                                        <p:tgtEl>
+                                          <p:spTgt spid="149"/>
+                                        </p:tgtEl>
+                                        <p:attrNameLst>
+                                          <p:attrName>style.visibility</p:attrName>
+                                        </p:attrNameLst>
+                                      </p:cBhvr>
+                                      <p:to>
+                                        <p:strVal val="visible"/>
+                                      </p:to>
+                                    </p:set>
+                                  </p:childTnLst>
+                                </p:cTn>
+                              </p:par>
+                            </p:childTnLst>
+                          </p:cTn>
+                        </p:par>
+                      </p:childTnLst>
+                    </p:cTn>
+                  </p:par>
                 </p:childTnLst>
               </p:cTn>
               <p:prevCondLst>
@@ -25629,7 +26016,7 @@
   <p:cSld>
     <p:spTree>
       <p:nvGrpSpPr>
-        <p:cNvPr id="1" name="Shape 152"/>
+        <p:cNvPr id="1" name="Shape 154"/>
         <p:cNvGrpSpPr/>
         <p:nvPr/>
       </p:nvGrpSpPr>
@@ -25643,7 +26030,7 @@
       </p:grpSpPr>
       <p:sp>
         <p:nvSpPr>
-          <p:cNvPr id="153" name="Google Shape;153;p21"/>
+          <p:cNvPr id="155" name="Google Shape;155;p21"/>
           <p:cNvSpPr txBox="1">
             <a:spLocks noGrp="1"/>
           </p:cNvSpPr>
@@ -25806,7 +26193,7 @@
                                           </p:stCondLst>
                                         </p:cTn>
                                         <p:tgtEl>
-                                          <p:spTgt spid="153">
+                                          <p:spTgt spid="155">
                                             <p:txEl>
                                               <p:pRg st="0" end="0"/>
                                             </p:txEl>
@@ -25855,7 +26242,7 @@
                                           </p:stCondLst>
                                         </p:cTn>
                                         <p:tgtEl>
-                                          <p:spTgt spid="153">
+                                          <p:spTgt spid="155">
                                             <p:txEl>
                                               <p:pRg st="1" end="1"/>
                                             </p:txEl>
@@ -25904,7 +26291,7 @@
                                           </p:stCondLst>
                                         </p:cTn>
                                         <p:tgtEl>
-                                          <p:spTgt spid="153">
+                                          <p:spTgt spid="155">
                                             <p:txEl>
                                               <p:pRg st="2" end="2"/>
                                             </p:txEl>
@@ -25953,7 +26340,7 @@
                                           </p:stCondLst>
                                         </p:cTn>
                                         <p:tgtEl>
-                                          <p:spTgt spid="153">
+                                          <p:spTgt spid="155">
                                             <p:txEl>
                                               <p:pRg st="3" end="3"/>
                                             </p:txEl>
@@ -26002,7 +26389,7 @@
                                           </p:stCondLst>
                                         </p:cTn>
                                         <p:tgtEl>
-                                          <p:spTgt spid="153">
+                                          <p:spTgt spid="155">
                                             <p:txEl>
                                               <p:pRg st="4" end="4"/>
                                             </p:txEl>
@@ -26051,7 +26438,7 @@
                                           </p:stCondLst>
                                         </p:cTn>
                                         <p:tgtEl>
-                                          <p:spTgt spid="153">
+                                          <p:spTgt spid="155">
                                             <p:txEl>
                                               <p:pRg st="5" end="5"/>
                                             </p:txEl>

</xml_diff>

<commit_message>
[Github Actions] render website (via 38bc19534e348b10516a66fcf092d0e49ae897b5)
</commit_message>
<xml_diff>
--- a/files/Modul_4_Behandling_af_kategoriske_data.pptx
+++ b/files/Modul_4_Behandling_af_kategoriske_data.pptx
@@ -12982,7 +12982,7 @@
         </p:spPr>
         <p:txBody>
           <a:bodyPr spcFirstLastPara="1" wrap="square" lIns="91425" tIns="91425" rIns="91425" bIns="91425" anchor="t" anchorCtr="0">
-            <a:normAutofit lnSpcReduction="20000"/>
+            <a:normAutofit fontScale="92500" lnSpcReduction="20000"/>
           </a:bodyPr>
           <a:lstStyle/>
           <a:p>
@@ -13576,7 +13576,7 @@
         </p:spPr>
         <p:txBody>
           <a:bodyPr spcFirstLastPara="1" wrap="square" lIns="91425" tIns="91425" rIns="91425" bIns="91425" anchor="t" anchorCtr="0">
-            <a:normAutofit/>
+            <a:normAutofit lnSpcReduction="10000"/>
           </a:bodyPr>
           <a:lstStyle/>
           <a:p>
@@ -14144,7 +14144,7 @@
         </p:spPr>
         <p:txBody>
           <a:bodyPr spcFirstLastPara="1" wrap="square" lIns="91425" tIns="91425" rIns="91425" bIns="91425" anchor="t" anchorCtr="0">
-            <a:normAutofit lnSpcReduction="10000"/>
+            <a:normAutofit fontScale="92500" lnSpcReduction="10000"/>
           </a:bodyPr>
           <a:lstStyle/>
           <a:p>
@@ -14718,7 +14718,7 @@
         </p:spPr>
         <p:txBody>
           <a:bodyPr spcFirstLastPara="1" wrap="square" lIns="91425" tIns="91425" rIns="91425" bIns="91425" anchor="t" anchorCtr="0">
-            <a:normAutofit/>
+            <a:normAutofit fontScale="92500" lnSpcReduction="10000"/>
           </a:bodyPr>
           <a:lstStyle/>
           <a:p>
@@ -15482,10 +15482,10 @@
               <a:buNone/>
             </a:pPr>
             <a:r>
-              <a:rPr lang="en"/>
+              <a:rPr lang="en" dirty="0"/>
               <a:t>Har vi fundet signifikante resultater? Ifølge RD og RR nej. Hvad siger odds ratio?</a:t>
             </a:r>
-            <a:endParaRPr/>
+            <a:endParaRPr dirty="0"/>
           </a:p>
           <a:p>
             <a:pPr marL="0" lvl="0" indent="0" algn="l" rtl="0">
@@ -15498,10 +15498,10 @@
               <a:buNone/>
             </a:pPr>
             <a:r>
-              <a:rPr lang="en"/>
+              <a:rPr lang="en" dirty="0"/>
               <a:t>Vi kan lave et konfidensinterval. OBS: hvad er fordelingsantagelsen, hvis vi skal lave KI? Er den overholdt for OR?</a:t>
             </a:r>
-            <a:endParaRPr/>
+            <a:endParaRPr dirty="0"/>
           </a:p>
           <a:p>
             <a:pPr marL="0" lvl="0" indent="0" algn="l" rtl="0">
@@ -15514,10 +15514,26 @@
               <a:buNone/>
             </a:pPr>
             <a:r>
-              <a:rPr lang="en"/>
-              <a:t>Log(OR) er approximativt normalfordelt med middelværdi log(OR) og varians 1/C+1/B+1/C+1/D, dvs. Log(OR) ~ N(Log(OR), sqrt(1/C+1/B+1/C+1/D)). Gælder kun, hvis der er nok data (vi har n=654).</a:t>
+              <a:rPr lang="en" dirty="0"/>
+              <a:t>Log(OR) er approximativt normalfordelt med middelværdi log(OR) og varians </a:t>
             </a:r>
-            <a:endParaRPr/>
+            <a:r>
+              <a:rPr lang="en" dirty="0" smtClean="0"/>
+              <a:t>1/A+1/B+1/C+1/D</a:t>
+            </a:r>
+            <a:r>
+              <a:rPr lang="en" dirty="0"/>
+              <a:t>, dvs. Log(OR) ~ N(Log(OR), </a:t>
+            </a:r>
+            <a:r>
+              <a:rPr lang="en" dirty="0" smtClean="0"/>
+              <a:t>sqrt(1/A+1/B+1/C+1/D</a:t>
+            </a:r>
+            <a:r>
+              <a:rPr lang="en" dirty="0"/>
+              <a:t>)). Gælder kun, hvis der er nok data (vi har n=654).</a:t>
+            </a:r>
+            <a:endParaRPr dirty="0"/>
           </a:p>
           <a:p>
             <a:pPr marL="0" lvl="0" indent="0" algn="l" rtl="0">
@@ -15530,10 +15546,10 @@
               <a:buNone/>
             </a:pPr>
             <a:r>
-              <a:rPr lang="en"/>
+              <a:rPr lang="en" dirty="0"/>
               <a:t>Så er KI(Log(OR)) = μ±1.96σ, og KI(OR) = exp(KI(Log(OR))) = exp(μ±1.96σ)</a:t>
             </a:r>
-            <a:endParaRPr/>
+            <a:endParaRPr dirty="0"/>
           </a:p>
           <a:p>
             <a:pPr marL="0" lvl="0" indent="0" algn="l" rtl="0">
@@ -15546,10 +15562,10 @@
               <a:buNone/>
             </a:pPr>
             <a:r>
-              <a:rPr lang="en"/>
+              <a:rPr lang="en" dirty="0"/>
               <a:t>Dvs. exp(log(1.6667)±1.96sqrt(1/39+1/279+1/26+1/310)) = (0.989 , 2.809).</a:t>
             </a:r>
-            <a:endParaRPr/>
+            <a:endParaRPr dirty="0"/>
           </a:p>
         </p:txBody>
       </p:sp>
@@ -15916,13 +15932,45 @@
         </p:spPr>
         <p:txBody>
           <a:bodyPr spcFirstLastPara="1" wrap="square" lIns="91425" tIns="91425" rIns="91425" bIns="91425" anchor="t" anchorCtr="0">
-            <a:normAutofit fontScale="92500" lnSpcReduction="20000"/>
+            <a:normAutofit fontScale="85000" lnSpcReduction="20000"/>
           </a:bodyPr>
           <a:lstStyle/>
           <a:p>
             <a:pPr marL="0" lvl="0" indent="0" algn="l" rtl="0">
               <a:spcBef>
                 <a:spcPts val="0"/>
+              </a:spcBef>
+              <a:spcAft>
+                <a:spcPts val="0"/>
+              </a:spcAft>
+              <a:buNone/>
+            </a:pPr>
+            <a:r>
+              <a:rPr lang="en" dirty="0"/>
+              <a:t>Lav odds ratio + konfidensintervaller for ESTRADL.</a:t>
+            </a:r>
+            <a:endParaRPr dirty="0"/>
+          </a:p>
+          <a:p>
+            <a:pPr marL="0" lvl="0" indent="0" algn="l" rtl="0">
+              <a:spcBef>
+                <a:spcPts val="1200"/>
+              </a:spcBef>
+              <a:spcAft>
+                <a:spcPts val="0"/>
+              </a:spcAft>
+              <a:buNone/>
+            </a:pPr>
+            <a:r>
+              <a:rPr lang="en" dirty="0"/>
+              <a:t>Nullhypotesen om ingen sammenhæng, dvs. π_female = π_male (RD = 0, RR = 1, OR = 1) kan testes via R ved en chi-squared test, hvis der er mere end 5 observationer for hver type. Ellers Fishers test.</a:t>
+            </a:r>
+            <a:endParaRPr dirty="0"/>
+          </a:p>
+          <a:p>
+            <a:pPr marL="0" lvl="0" indent="0" algn="l" rtl="0">
+              <a:spcBef>
+                <a:spcPts val="1200"/>
               </a:spcBef>
               <a:spcAft>
                 <a:spcPts val="0"/>
@@ -15931,7 +15979,11 @@
             </a:pPr>
             <a:r>
               <a:rPr lang="en"/>
-              <a:t>Lav odds ratio + konfidensintervaller for ESTRADL.</a:t>
+              <a:t>Eksempelvis: chisq.test(matrix(c(279,310,39,26), 2, 2),correct=F), hvilket giver p-værdi &gt; </a:t>
+            </a:r>
+            <a:r>
+              <a:rPr lang="en" smtClean="0"/>
+              <a:t>0.05</a:t>
             </a:r>
             <a:endParaRPr/>
           </a:p>
@@ -15946,10 +15998,10 @@
               <a:buNone/>
             </a:pPr>
             <a:r>
-              <a:rPr lang="en"/>
-              <a:t>Nullhypotesen om ingen sammenhæng, dvs. π_female = π_male (RD = 0, RR = 1, OR = 1) kan testes via R ved en chi-squared test, hvis der er mere end 5 observationer for hver type. Ellers Fishers test.</a:t>
+              <a:rPr lang="en" dirty="0"/>
+              <a:t>Da vi har mere mere end 5 obs, kan vi prøve at bruge chi-squared test i R.</a:t>
             </a:r>
-            <a:endParaRPr/>
+            <a:endParaRPr dirty="0"/>
           </a:p>
           <a:p>
             <a:pPr marL="0" lvl="0" indent="0" algn="l" rtl="0">
@@ -15962,10 +16014,10 @@
               <a:buNone/>
             </a:pPr>
             <a:r>
-              <a:rPr lang="en"/>
-              <a:t>Eksempelvis: chisq.test(matrix(c(279,310,39,26), 2, 2),correct=F), hvilket giver p-værdi &gt; 0.05.0</a:t>
+              <a:rPr lang="en" dirty="0"/>
+              <a:t>Prøv desuden at bruge fisher.test() (beregner odds ratio, p-værdi og KI). </a:t>
             </a:r>
-            <a:endParaRPr/>
+            <a:endParaRPr dirty="0"/>
           </a:p>
           <a:p>
             <a:pPr marL="0" lvl="0" indent="0" algn="l" rtl="0">
@@ -15973,47 +16025,15 @@
                 <a:spcPts val="1200"/>
               </a:spcBef>
               <a:spcAft>
-                <a:spcPts val="0"/>
+                <a:spcPts val="1200"/>
               </a:spcAft>
               <a:buNone/>
             </a:pPr>
             <a:r>
-              <a:rPr lang="en"/>
-              <a:t>Da vi har mere mere end 5 obs, kan vi prøve at bruge chi-squared test i R.</a:t>
-            </a:r>
-            <a:endParaRPr/>
-          </a:p>
-          <a:p>
-            <a:pPr marL="0" lvl="0" indent="0" algn="l" rtl="0">
-              <a:spcBef>
-                <a:spcPts val="1200"/>
-              </a:spcBef>
-              <a:spcAft>
-                <a:spcPts val="0"/>
-              </a:spcAft>
-              <a:buNone/>
-            </a:pPr>
-            <a:r>
-              <a:rPr lang="en"/>
-              <a:t>Prøv desuden at bruge fisher.test() (beregner odds ratio, p-værdi og KI). </a:t>
-            </a:r>
-            <a:endParaRPr/>
-          </a:p>
-          <a:p>
-            <a:pPr marL="0" lvl="0" indent="0" algn="l" rtl="0">
-              <a:spcBef>
-                <a:spcPts val="1200"/>
-              </a:spcBef>
-              <a:spcAft>
-                <a:spcPts val="1200"/>
-              </a:spcAft>
-              <a:buNone/>
-            </a:pPr>
-            <a:r>
-              <a:rPr lang="en"/>
+              <a:rPr lang="en" dirty="0"/>
               <a:t>fisher.test() regner odds ratio via estimation i stedet for den faktiske definition, så der er en lille forskel.</a:t>
             </a:r>
-            <a:endParaRPr>
+            <a:endParaRPr dirty="0">
               <a:highlight>
                 <a:srgbClr val="93C47D"/>
               </a:highlight>
@@ -18459,7 +18479,7 @@
         </p:spPr>
         <p:txBody>
           <a:bodyPr spcFirstLastPara="1" wrap="square" lIns="91425" tIns="91425" rIns="91425" bIns="91425" anchor="t" anchorCtr="0">
-            <a:normAutofit/>
+            <a:normAutofit lnSpcReduction="10000"/>
           </a:bodyPr>
           <a:lstStyle/>
           <a:p>
@@ -18775,7 +18795,7 @@
         </p:spPr>
         <p:txBody>
           <a:bodyPr spcFirstLastPara="1" wrap="square" lIns="91425" tIns="91425" rIns="91425" bIns="91425" anchor="t" anchorCtr="0">
-            <a:normAutofit/>
+            <a:normAutofit lnSpcReduction="10000"/>
           </a:bodyPr>
           <a:lstStyle/>
           <a:p>
@@ -19342,7 +19362,7 @@
         </p:spPr>
         <p:txBody>
           <a:bodyPr spcFirstLastPara="1" wrap="square" lIns="91425" tIns="91425" rIns="91425" bIns="91425" anchor="t" anchorCtr="0">
-            <a:normAutofit/>
+            <a:normAutofit lnSpcReduction="10000"/>
           </a:bodyPr>
           <a:lstStyle/>
           <a:p>
@@ -22886,7 +22906,7 @@
         </p:spPr>
         <p:txBody>
           <a:bodyPr spcFirstLastPara="1" wrap="square" lIns="91425" tIns="91425" rIns="91425" bIns="91425" anchor="t" anchorCtr="0">
-            <a:normAutofit lnSpcReduction="10000"/>
+            <a:normAutofit fontScale="92500" lnSpcReduction="10000"/>
           </a:bodyPr>
           <a:lstStyle/>
           <a:p>
@@ -23504,7 +23524,7 @@
         </p:spPr>
         <p:txBody>
           <a:bodyPr spcFirstLastPara="1" wrap="square" lIns="91425" tIns="91425" rIns="91425" bIns="91425" anchor="t" anchorCtr="0">
-            <a:normAutofit lnSpcReduction="10000"/>
+            <a:normAutofit fontScale="92500" lnSpcReduction="10000"/>
           </a:bodyPr>
           <a:lstStyle/>
           <a:p>
@@ -26049,7 +26069,7 @@
         </p:spPr>
         <p:txBody>
           <a:bodyPr spcFirstLastPara="1" wrap="square" lIns="91425" tIns="91425" rIns="91425" bIns="91425" anchor="t" anchorCtr="0">
-            <a:normAutofit lnSpcReduction="10000"/>
+            <a:normAutofit/>
           </a:bodyPr>
           <a:lstStyle/>
           <a:p>

</xml_diff>